<commit_message>
TW edits after peer review
</commit_message>
<xml_diff>
--- a/docs/deployment_guide/images/taskcat-ci-architecture-diagram.pptx
+++ b/docs/deployment_guide/images/taskcat-ci-architecture-diagram.pptx
@@ -8,6 +8,7 @@
     <p:sldId id="256" r:id="rId2"/>
     <p:sldId id="261" r:id="rId3"/>
     <p:sldId id="262" r:id="rId4"/>
+    <p:sldId id="263" r:id="rId5"/>
   </p:sldIdLst>
   <p:sldSz cx="15544800" cy="10058400"/>
   <p:notesSz cx="6858000" cy="9144000"/>
@@ -245,7 +246,7 @@
           <a:p>
             <a:fld id="{04106A3E-CAB3-410A-9213-AB2A4784C8B7}" type="datetimeFigureOut">
               <a:rPr lang="en-US" smtClean="0"/>
-              <a:t>10/11/2022</a:t>
+              <a:t>10/19/2022</a:t>
             </a:fld>
             <a:endParaRPr lang="en-US"/>
           </a:p>
@@ -415,7 +416,7 @@
           <a:p>
             <a:fld id="{04106A3E-CAB3-410A-9213-AB2A4784C8B7}" type="datetimeFigureOut">
               <a:rPr lang="en-US" smtClean="0"/>
-              <a:t>10/11/2022</a:t>
+              <a:t>10/19/2022</a:t>
             </a:fld>
             <a:endParaRPr lang="en-US"/>
           </a:p>
@@ -595,7 +596,7 @@
           <a:p>
             <a:fld id="{04106A3E-CAB3-410A-9213-AB2A4784C8B7}" type="datetimeFigureOut">
               <a:rPr lang="en-US" smtClean="0"/>
-              <a:t>10/11/2022</a:t>
+              <a:t>10/19/2022</a:t>
             </a:fld>
             <a:endParaRPr lang="en-US"/>
           </a:p>
@@ -765,7 +766,7 @@
           <a:p>
             <a:fld id="{04106A3E-CAB3-410A-9213-AB2A4784C8B7}" type="datetimeFigureOut">
               <a:rPr lang="en-US" smtClean="0"/>
-              <a:t>10/11/2022</a:t>
+              <a:t>10/19/2022</a:t>
             </a:fld>
             <a:endParaRPr lang="en-US"/>
           </a:p>
@@ -1009,7 +1010,7 @@
           <a:p>
             <a:fld id="{04106A3E-CAB3-410A-9213-AB2A4784C8B7}" type="datetimeFigureOut">
               <a:rPr lang="en-US" smtClean="0"/>
-              <a:t>10/11/2022</a:t>
+              <a:t>10/19/2022</a:t>
             </a:fld>
             <a:endParaRPr lang="en-US"/>
           </a:p>
@@ -1241,7 +1242,7 @@
           <a:p>
             <a:fld id="{04106A3E-CAB3-410A-9213-AB2A4784C8B7}" type="datetimeFigureOut">
               <a:rPr lang="en-US" smtClean="0"/>
-              <a:t>10/11/2022</a:t>
+              <a:t>10/19/2022</a:t>
             </a:fld>
             <a:endParaRPr lang="en-US"/>
           </a:p>
@@ -1608,7 +1609,7 @@
           <a:p>
             <a:fld id="{04106A3E-CAB3-410A-9213-AB2A4784C8B7}" type="datetimeFigureOut">
               <a:rPr lang="en-US" smtClean="0"/>
-              <a:t>10/11/2022</a:t>
+              <a:t>10/19/2022</a:t>
             </a:fld>
             <a:endParaRPr lang="en-US"/>
           </a:p>
@@ -1726,7 +1727,7 @@
           <a:p>
             <a:fld id="{04106A3E-CAB3-410A-9213-AB2A4784C8B7}" type="datetimeFigureOut">
               <a:rPr lang="en-US" smtClean="0"/>
-              <a:t>10/11/2022</a:t>
+              <a:t>10/19/2022</a:t>
             </a:fld>
             <a:endParaRPr lang="en-US"/>
           </a:p>
@@ -1821,7 +1822,7 @@
           <a:p>
             <a:fld id="{04106A3E-CAB3-410A-9213-AB2A4784C8B7}" type="datetimeFigureOut">
               <a:rPr lang="en-US" smtClean="0"/>
-              <a:t>10/11/2022</a:t>
+              <a:t>10/19/2022</a:t>
             </a:fld>
             <a:endParaRPr lang="en-US"/>
           </a:p>
@@ -2098,7 +2099,7 @@
           <a:p>
             <a:fld id="{04106A3E-CAB3-410A-9213-AB2A4784C8B7}" type="datetimeFigureOut">
               <a:rPr lang="en-US" smtClean="0"/>
-              <a:t>10/11/2022</a:t>
+              <a:t>10/19/2022</a:t>
             </a:fld>
             <a:endParaRPr lang="en-US"/>
           </a:p>
@@ -2355,7 +2356,7 @@
           <a:p>
             <a:fld id="{04106A3E-CAB3-410A-9213-AB2A4784C8B7}" type="datetimeFigureOut">
               <a:rPr lang="en-US" smtClean="0"/>
-              <a:t>10/11/2022</a:t>
+              <a:t>10/19/2022</a:t>
             </a:fld>
             <a:endParaRPr lang="en-US"/>
           </a:p>
@@ -2568,7 +2569,7 @@
           <a:p>
             <a:fld id="{04106A3E-CAB3-410A-9213-AB2A4784C8B7}" type="datetimeFigureOut">
               <a:rPr lang="en-US" smtClean="0"/>
-              <a:t>10/11/2022</a:t>
+              <a:t>10/19/2022</a:t>
             </a:fld>
             <a:endParaRPr lang="en-US"/>
           </a:p>
@@ -11760,7 +11761,7 @@
                 <a:latin typeface="Arial" panose="020B0604020202020204" pitchFamily="34" charset="0"/>
                 <a:cs typeface="Arial" panose="020B0604020202020204" pitchFamily="34" charset="0"/>
               </a:rPr>
-              <a:t>AWS CodePipeline pipeline </a:t>
+              <a:t>AWS CodePipeline</a:t>
             </a:r>
           </a:p>
         </p:txBody>
@@ -13691,6 +13692,3617 @@
     <p:extLst>
       <p:ext uri="{BB962C8B-B14F-4D97-AF65-F5344CB8AC3E}">
         <p14:creationId xmlns:p14="http://schemas.microsoft.com/office/powerpoint/2010/main" val="2871271598"/>
+      </p:ext>
+    </p:extLst>
+  </p:cSld>
+  <p:clrMapOvr>
+    <a:masterClrMapping/>
+  </p:clrMapOvr>
+</p:sld>
+</file>
+
+<file path=ppt/slides/slide4.xml><?xml version="1.0" encoding="utf-8"?>
+<p:sld xmlns:a="http://schemas.openxmlformats.org/drawingml/2006/main" xmlns:r="http://schemas.openxmlformats.org/officeDocument/2006/relationships" xmlns:p="http://schemas.openxmlformats.org/presentationml/2006/main">
+  <p:cSld>
+    <p:spTree>
+      <p:nvGrpSpPr>
+        <p:cNvPr id="1" name=""/>
+        <p:cNvGrpSpPr/>
+        <p:nvPr/>
+      </p:nvGrpSpPr>
+      <p:grpSpPr>
+        <a:xfrm>
+          <a:off x="0" y="0"/>
+          <a:ext cx="0" cy="0"/>
+          <a:chOff x="0" y="0"/>
+          <a:chExt cx="0" cy="0"/>
+        </a:xfrm>
+      </p:grpSpPr>
+      <p:pic>
+        <p:nvPicPr>
+          <p:cNvPr id="3" name="Graphic 17">
+            <a:extLst>
+              <a:ext uri="{FF2B5EF4-FFF2-40B4-BE49-F238E27FC236}">
+                <a16:creationId xmlns:a16="http://schemas.microsoft.com/office/drawing/2014/main" id="{CC1A3AFA-FE54-4BEE-AEBF-48FF74F9D4EE}"/>
+              </a:ext>
+            </a:extLst>
+          </p:cNvPr>
+          <p:cNvPicPr>
+            <a:picLocks noChangeAspect="1" noChangeArrowheads="1"/>
+          </p:cNvPicPr>
+          <p:nvPr/>
+        </p:nvPicPr>
+        <p:blipFill>
+          <a:blip r:embed="rId2">
+            <a:extLst>
+              <a:ext uri="{28A0092B-C50C-407E-A947-70E740481C1C}">
+                <a14:useLocalDpi xmlns:a14="http://schemas.microsoft.com/office/drawing/2010/main" val="0"/>
+              </a:ext>
+            </a:extLst>
+          </a:blip>
+          <a:srcRect/>
+          <a:stretch>
+            <a:fillRect/>
+          </a:stretch>
+        </p:blipFill>
+        <p:spPr bwMode="auto">
+          <a:xfrm>
+            <a:off x="7610856" y="2135750"/>
+            <a:ext cx="762000" cy="762000"/>
+          </a:xfrm>
+          <a:prstGeom prst="rect">
+            <a:avLst/>
+          </a:prstGeom>
+          <a:noFill/>
+          <a:ln>
+            <a:noFill/>
+          </a:ln>
+          <a:extLst>
+            <a:ext uri="{909E8E84-426E-40DD-AFC4-6F175D3DCCD1}">
+              <a14:hiddenFill xmlns:a14="http://schemas.microsoft.com/office/drawing/2010/main">
+                <a:solidFill>
+                  <a:srgbClr val="FFFFFF"/>
+                </a:solidFill>
+              </a14:hiddenFill>
+            </a:ext>
+            <a:ext uri="{91240B29-F687-4F45-9708-019B960494DF}">
+              <a14:hiddenLine xmlns:a14="http://schemas.microsoft.com/office/drawing/2010/main" w="9525">
+                <a:solidFill>
+                  <a:srgbClr val="000000"/>
+                </a:solidFill>
+                <a:miter lim="800000"/>
+                <a:headEnd/>
+                <a:tailEnd/>
+              </a14:hiddenLine>
+            </a:ext>
+          </a:extLst>
+        </p:spPr>
+      </p:pic>
+      <p:sp>
+        <p:nvSpPr>
+          <p:cNvPr id="4" name="TextBox 11">
+            <a:extLst>
+              <a:ext uri="{FF2B5EF4-FFF2-40B4-BE49-F238E27FC236}">
+                <a16:creationId xmlns:a16="http://schemas.microsoft.com/office/drawing/2014/main" id="{B884491E-3855-4C58-85B4-AF40AC8BCAA8}"/>
+              </a:ext>
+            </a:extLst>
+          </p:cNvPr>
+          <p:cNvSpPr txBox="1">
+            <a:spLocks noChangeArrowheads="1"/>
+          </p:cNvSpPr>
+          <p:nvPr/>
+        </p:nvSpPr>
+        <p:spPr bwMode="auto">
+          <a:xfrm>
+            <a:off x="7109206" y="2916876"/>
+            <a:ext cx="1765300" cy="276999"/>
+          </a:xfrm>
+          <a:prstGeom prst="rect">
+            <a:avLst/>
+          </a:prstGeom>
+          <a:noFill/>
+          <a:ln>
+            <a:noFill/>
+          </a:ln>
+          <a:extLst>
+            <a:ext uri="{909E8E84-426E-40DD-AFC4-6F175D3DCCD1}">
+              <a14:hiddenFill xmlns:a14="http://schemas.microsoft.com/office/drawing/2010/main">
+                <a:solidFill>
+                  <a:srgbClr val="FFFFFF"/>
+                </a:solidFill>
+              </a14:hiddenFill>
+            </a:ext>
+            <a:ext uri="{91240B29-F687-4F45-9708-019B960494DF}">
+              <a14:hiddenLine xmlns:a14="http://schemas.microsoft.com/office/drawing/2010/main" w="9525">
+                <a:solidFill>
+                  <a:srgbClr val="000000"/>
+                </a:solidFill>
+                <a:miter lim="800000"/>
+                <a:headEnd/>
+                <a:tailEnd/>
+              </a14:hiddenLine>
+            </a:ext>
+          </a:extLst>
+        </p:spPr>
+        <p:txBody>
+          <a:bodyPr wrap="square">
+            <a:spAutoFit/>
+          </a:bodyPr>
+          <a:lstStyle>
+            <a:lvl1pPr>
+              <a:defRPr>
+                <a:solidFill>
+                  <a:schemeClr val="tx1"/>
+                </a:solidFill>
+                <a:latin typeface="Calibri" panose="020F0502020204030204" pitchFamily="34" charset="0"/>
+              </a:defRPr>
+            </a:lvl1pPr>
+            <a:lvl2pPr marL="742950" indent="-285750">
+              <a:defRPr>
+                <a:solidFill>
+                  <a:schemeClr val="tx1"/>
+                </a:solidFill>
+                <a:latin typeface="Calibri" panose="020F0502020204030204" pitchFamily="34" charset="0"/>
+              </a:defRPr>
+            </a:lvl2pPr>
+            <a:lvl3pPr marL="1143000" indent="-228600">
+              <a:defRPr>
+                <a:solidFill>
+                  <a:schemeClr val="tx1"/>
+                </a:solidFill>
+                <a:latin typeface="Calibri" panose="020F0502020204030204" pitchFamily="34" charset="0"/>
+              </a:defRPr>
+            </a:lvl3pPr>
+            <a:lvl4pPr marL="1600200" indent="-228600">
+              <a:defRPr>
+                <a:solidFill>
+                  <a:schemeClr val="tx1"/>
+                </a:solidFill>
+                <a:latin typeface="Calibri" panose="020F0502020204030204" pitchFamily="34" charset="0"/>
+              </a:defRPr>
+            </a:lvl4pPr>
+            <a:lvl5pPr marL="2057400" indent="-228600">
+              <a:defRPr>
+                <a:solidFill>
+                  <a:schemeClr val="tx1"/>
+                </a:solidFill>
+                <a:latin typeface="Calibri" panose="020F0502020204030204" pitchFamily="34" charset="0"/>
+              </a:defRPr>
+            </a:lvl5pPr>
+            <a:lvl6pPr marL="2514600" indent="-228600" eaLnBrk="0" fontAlgn="base" hangingPunct="0">
+              <a:spcBef>
+                <a:spcPct val="0"/>
+              </a:spcBef>
+              <a:spcAft>
+                <a:spcPct val="0"/>
+              </a:spcAft>
+              <a:defRPr>
+                <a:solidFill>
+                  <a:schemeClr val="tx1"/>
+                </a:solidFill>
+                <a:latin typeface="Calibri" panose="020F0502020204030204" pitchFamily="34" charset="0"/>
+              </a:defRPr>
+            </a:lvl6pPr>
+            <a:lvl7pPr marL="2971800" indent="-228600" eaLnBrk="0" fontAlgn="base" hangingPunct="0">
+              <a:spcBef>
+                <a:spcPct val="0"/>
+              </a:spcBef>
+              <a:spcAft>
+                <a:spcPct val="0"/>
+              </a:spcAft>
+              <a:defRPr>
+                <a:solidFill>
+                  <a:schemeClr val="tx1"/>
+                </a:solidFill>
+                <a:latin typeface="Calibri" panose="020F0502020204030204" pitchFamily="34" charset="0"/>
+              </a:defRPr>
+            </a:lvl7pPr>
+            <a:lvl8pPr marL="3429000" indent="-228600" eaLnBrk="0" fontAlgn="base" hangingPunct="0">
+              <a:spcBef>
+                <a:spcPct val="0"/>
+              </a:spcBef>
+              <a:spcAft>
+                <a:spcPct val="0"/>
+              </a:spcAft>
+              <a:defRPr>
+                <a:solidFill>
+                  <a:schemeClr val="tx1"/>
+                </a:solidFill>
+                <a:latin typeface="Calibri" panose="020F0502020204030204" pitchFamily="34" charset="0"/>
+              </a:defRPr>
+            </a:lvl8pPr>
+            <a:lvl9pPr marL="3886200" indent="-228600" eaLnBrk="0" fontAlgn="base" hangingPunct="0">
+              <a:spcBef>
+                <a:spcPct val="0"/>
+              </a:spcBef>
+              <a:spcAft>
+                <a:spcPct val="0"/>
+              </a:spcAft>
+              <a:defRPr>
+                <a:solidFill>
+                  <a:schemeClr val="tx1"/>
+                </a:solidFill>
+                <a:latin typeface="Calibri" panose="020F0502020204030204" pitchFamily="34" charset="0"/>
+              </a:defRPr>
+            </a:lvl9pPr>
+          </a:lstStyle>
+          <a:p>
+            <a:pPr algn="ctr" eaLnBrk="1" hangingPunct="1"/>
+            <a:r>
+              <a:rPr lang="en-US" altLang="en-US" sz="1200" dirty="0">
+                <a:latin typeface="Arial" panose="020B0604020202020204" pitchFamily="34" charset="0"/>
+                <a:ea typeface="Amazon Ember" panose="020B0603020204020204" pitchFamily="34" charset="0"/>
+                <a:cs typeface="Arial" panose="020B0604020202020204" pitchFamily="34" charset="0"/>
+              </a:rPr>
+              <a:t>AWS Secrets Manager</a:t>
+            </a:r>
+          </a:p>
+        </p:txBody>
+      </p:sp>
+      <p:pic>
+        <p:nvPicPr>
+          <p:cNvPr id="5" name="Graphic 19">
+            <a:extLst>
+              <a:ext uri="{FF2B5EF4-FFF2-40B4-BE49-F238E27FC236}">
+                <a16:creationId xmlns:a16="http://schemas.microsoft.com/office/drawing/2014/main" id="{8C144DBF-0A60-407F-BDE2-208E8DB3CD84}"/>
+              </a:ext>
+            </a:extLst>
+          </p:cNvPr>
+          <p:cNvPicPr>
+            <a:picLocks noChangeAspect="1" noChangeArrowheads="1"/>
+          </p:cNvPicPr>
+          <p:nvPr/>
+        </p:nvPicPr>
+        <p:blipFill>
+          <a:blip r:embed="rId3">
+            <a:extLst>
+              <a:ext uri="{28A0092B-C50C-407E-A947-70E740481C1C}">
+                <a14:useLocalDpi xmlns:a14="http://schemas.microsoft.com/office/drawing/2010/main" val="0"/>
+              </a:ext>
+            </a:extLst>
+          </a:blip>
+          <a:srcRect/>
+          <a:stretch>
+            <a:fillRect/>
+          </a:stretch>
+        </p:blipFill>
+        <p:spPr bwMode="auto">
+          <a:xfrm>
+            <a:off x="7610856" y="3546348"/>
+            <a:ext cx="762000" cy="762000"/>
+          </a:xfrm>
+          <a:prstGeom prst="rect">
+            <a:avLst/>
+          </a:prstGeom>
+          <a:noFill/>
+          <a:ln>
+            <a:noFill/>
+          </a:ln>
+          <a:extLst>
+            <a:ext uri="{909E8E84-426E-40DD-AFC4-6F175D3DCCD1}">
+              <a14:hiddenFill xmlns:a14="http://schemas.microsoft.com/office/drawing/2010/main">
+                <a:solidFill>
+                  <a:srgbClr val="FFFFFF"/>
+                </a:solidFill>
+              </a14:hiddenFill>
+            </a:ext>
+            <a:ext uri="{91240B29-F687-4F45-9708-019B960494DF}">
+              <a14:hiddenLine xmlns:a14="http://schemas.microsoft.com/office/drawing/2010/main" w="9525">
+                <a:solidFill>
+                  <a:srgbClr val="000000"/>
+                </a:solidFill>
+                <a:miter lim="800000"/>
+                <a:headEnd/>
+                <a:tailEnd/>
+              </a14:hiddenLine>
+            </a:ext>
+          </a:extLst>
+        </p:spPr>
+      </p:pic>
+      <p:sp>
+        <p:nvSpPr>
+          <p:cNvPr id="6" name="TextBox 11">
+            <a:extLst>
+              <a:ext uri="{FF2B5EF4-FFF2-40B4-BE49-F238E27FC236}">
+                <a16:creationId xmlns:a16="http://schemas.microsoft.com/office/drawing/2014/main" id="{6D9F63C4-AA0B-4B1F-ACDD-225BB545EA5F}"/>
+              </a:ext>
+            </a:extLst>
+          </p:cNvPr>
+          <p:cNvSpPr txBox="1">
+            <a:spLocks noChangeArrowheads="1"/>
+          </p:cNvSpPr>
+          <p:nvPr/>
+        </p:nvSpPr>
+        <p:spPr bwMode="auto">
+          <a:xfrm>
+            <a:off x="6845681" y="4299278"/>
+            <a:ext cx="2292350" cy="276999"/>
+          </a:xfrm>
+          <a:prstGeom prst="rect">
+            <a:avLst/>
+          </a:prstGeom>
+          <a:noFill/>
+          <a:ln>
+            <a:noFill/>
+          </a:ln>
+          <a:extLst>
+            <a:ext uri="{909E8E84-426E-40DD-AFC4-6F175D3DCCD1}">
+              <a14:hiddenFill xmlns:a14="http://schemas.microsoft.com/office/drawing/2010/main">
+                <a:solidFill>
+                  <a:srgbClr val="FFFFFF"/>
+                </a:solidFill>
+              </a14:hiddenFill>
+            </a:ext>
+            <a:ext uri="{91240B29-F687-4F45-9708-019B960494DF}">
+              <a14:hiddenLine xmlns:a14="http://schemas.microsoft.com/office/drawing/2010/main" w="9525">
+                <a:solidFill>
+                  <a:srgbClr val="000000"/>
+                </a:solidFill>
+                <a:miter lim="800000"/>
+                <a:headEnd/>
+                <a:tailEnd/>
+              </a14:hiddenLine>
+            </a:ext>
+          </a:extLst>
+        </p:spPr>
+        <p:txBody>
+          <a:bodyPr>
+            <a:spAutoFit/>
+          </a:bodyPr>
+          <a:lstStyle>
+            <a:lvl1pPr>
+              <a:defRPr>
+                <a:solidFill>
+                  <a:schemeClr val="tx1"/>
+                </a:solidFill>
+                <a:latin typeface="Calibri" panose="020F0502020204030204" pitchFamily="34" charset="0"/>
+              </a:defRPr>
+            </a:lvl1pPr>
+            <a:lvl2pPr marL="742950" indent="-285750">
+              <a:defRPr>
+                <a:solidFill>
+                  <a:schemeClr val="tx1"/>
+                </a:solidFill>
+                <a:latin typeface="Calibri" panose="020F0502020204030204" pitchFamily="34" charset="0"/>
+              </a:defRPr>
+            </a:lvl2pPr>
+            <a:lvl3pPr marL="1143000" indent="-228600">
+              <a:defRPr>
+                <a:solidFill>
+                  <a:schemeClr val="tx1"/>
+                </a:solidFill>
+                <a:latin typeface="Calibri" panose="020F0502020204030204" pitchFamily="34" charset="0"/>
+              </a:defRPr>
+            </a:lvl3pPr>
+            <a:lvl4pPr marL="1600200" indent="-228600">
+              <a:defRPr>
+                <a:solidFill>
+                  <a:schemeClr val="tx1"/>
+                </a:solidFill>
+                <a:latin typeface="Calibri" panose="020F0502020204030204" pitchFamily="34" charset="0"/>
+              </a:defRPr>
+            </a:lvl4pPr>
+            <a:lvl5pPr marL="2057400" indent="-228600">
+              <a:defRPr>
+                <a:solidFill>
+                  <a:schemeClr val="tx1"/>
+                </a:solidFill>
+                <a:latin typeface="Calibri" panose="020F0502020204030204" pitchFamily="34" charset="0"/>
+              </a:defRPr>
+            </a:lvl5pPr>
+            <a:lvl6pPr marL="2514600" indent="-228600" eaLnBrk="0" fontAlgn="base" hangingPunct="0">
+              <a:spcBef>
+                <a:spcPct val="0"/>
+              </a:spcBef>
+              <a:spcAft>
+                <a:spcPct val="0"/>
+              </a:spcAft>
+              <a:defRPr>
+                <a:solidFill>
+                  <a:schemeClr val="tx1"/>
+                </a:solidFill>
+                <a:latin typeface="Calibri" panose="020F0502020204030204" pitchFamily="34" charset="0"/>
+              </a:defRPr>
+            </a:lvl6pPr>
+            <a:lvl7pPr marL="2971800" indent="-228600" eaLnBrk="0" fontAlgn="base" hangingPunct="0">
+              <a:spcBef>
+                <a:spcPct val="0"/>
+              </a:spcBef>
+              <a:spcAft>
+                <a:spcPct val="0"/>
+              </a:spcAft>
+              <a:defRPr>
+                <a:solidFill>
+                  <a:schemeClr val="tx1"/>
+                </a:solidFill>
+                <a:latin typeface="Calibri" panose="020F0502020204030204" pitchFamily="34" charset="0"/>
+              </a:defRPr>
+            </a:lvl7pPr>
+            <a:lvl8pPr marL="3429000" indent="-228600" eaLnBrk="0" fontAlgn="base" hangingPunct="0">
+              <a:spcBef>
+                <a:spcPct val="0"/>
+              </a:spcBef>
+              <a:spcAft>
+                <a:spcPct val="0"/>
+              </a:spcAft>
+              <a:defRPr>
+                <a:solidFill>
+                  <a:schemeClr val="tx1"/>
+                </a:solidFill>
+                <a:latin typeface="Calibri" panose="020F0502020204030204" pitchFamily="34" charset="0"/>
+              </a:defRPr>
+            </a:lvl8pPr>
+            <a:lvl9pPr marL="3886200" indent="-228600" eaLnBrk="0" fontAlgn="base" hangingPunct="0">
+              <a:spcBef>
+                <a:spcPct val="0"/>
+              </a:spcBef>
+              <a:spcAft>
+                <a:spcPct val="0"/>
+              </a:spcAft>
+              <a:defRPr>
+                <a:solidFill>
+                  <a:schemeClr val="tx1"/>
+                </a:solidFill>
+                <a:latin typeface="Calibri" panose="020F0502020204030204" pitchFamily="34" charset="0"/>
+              </a:defRPr>
+            </a:lvl9pPr>
+          </a:lstStyle>
+          <a:p>
+            <a:pPr algn="ctr" eaLnBrk="1" hangingPunct="1"/>
+            <a:r>
+              <a:rPr lang="en-US" altLang="en-US" sz="1200" dirty="0">
+                <a:latin typeface="Arial" panose="020B0604020202020204" pitchFamily="34" charset="0"/>
+                <a:ea typeface="Amazon Ember" panose="020B0603020204020204" pitchFamily="34" charset="0"/>
+                <a:cs typeface="Arial" panose="020B0604020202020204" pitchFamily="34" charset="0"/>
+              </a:rPr>
+              <a:t>AWS CodeBuild</a:t>
+            </a:r>
+          </a:p>
+        </p:txBody>
+      </p:sp>
+      <p:sp>
+        <p:nvSpPr>
+          <p:cNvPr id="8" name="TextBox 11">
+            <a:extLst>
+              <a:ext uri="{FF2B5EF4-FFF2-40B4-BE49-F238E27FC236}">
+                <a16:creationId xmlns:a16="http://schemas.microsoft.com/office/drawing/2014/main" id="{0B62BA7C-6EAE-4593-9A6E-9803A6701C35}"/>
+              </a:ext>
+            </a:extLst>
+          </p:cNvPr>
+          <p:cNvSpPr txBox="1">
+            <a:spLocks noChangeArrowheads="1"/>
+          </p:cNvSpPr>
+          <p:nvPr/>
+        </p:nvSpPr>
+        <p:spPr bwMode="auto">
+          <a:xfrm>
+            <a:off x="8079202" y="4299278"/>
+            <a:ext cx="2292350" cy="276999"/>
+          </a:xfrm>
+          <a:prstGeom prst="rect">
+            <a:avLst/>
+          </a:prstGeom>
+          <a:noFill/>
+          <a:ln>
+            <a:noFill/>
+          </a:ln>
+          <a:extLst>
+            <a:ext uri="{909E8E84-426E-40DD-AFC4-6F175D3DCCD1}">
+              <a14:hiddenFill xmlns:a14="http://schemas.microsoft.com/office/drawing/2010/main">
+                <a:solidFill>
+                  <a:srgbClr val="FFFFFF"/>
+                </a:solidFill>
+              </a14:hiddenFill>
+            </a:ext>
+            <a:ext uri="{91240B29-F687-4F45-9708-019B960494DF}">
+              <a14:hiddenLine xmlns:a14="http://schemas.microsoft.com/office/drawing/2010/main" w="9525">
+                <a:solidFill>
+                  <a:srgbClr val="000000"/>
+                </a:solidFill>
+                <a:miter lim="800000"/>
+                <a:headEnd/>
+                <a:tailEnd/>
+              </a14:hiddenLine>
+            </a:ext>
+          </a:extLst>
+        </p:spPr>
+        <p:txBody>
+          <a:bodyPr>
+            <a:spAutoFit/>
+          </a:bodyPr>
+          <a:lstStyle>
+            <a:lvl1pPr>
+              <a:defRPr>
+                <a:solidFill>
+                  <a:schemeClr val="tx1"/>
+                </a:solidFill>
+                <a:latin typeface="Calibri" panose="020F0502020204030204" pitchFamily="34" charset="0"/>
+              </a:defRPr>
+            </a:lvl1pPr>
+            <a:lvl2pPr marL="742950" indent="-285750">
+              <a:defRPr>
+                <a:solidFill>
+                  <a:schemeClr val="tx1"/>
+                </a:solidFill>
+                <a:latin typeface="Calibri" panose="020F0502020204030204" pitchFamily="34" charset="0"/>
+              </a:defRPr>
+            </a:lvl2pPr>
+            <a:lvl3pPr marL="1143000" indent="-228600">
+              <a:defRPr>
+                <a:solidFill>
+                  <a:schemeClr val="tx1"/>
+                </a:solidFill>
+                <a:latin typeface="Calibri" panose="020F0502020204030204" pitchFamily="34" charset="0"/>
+              </a:defRPr>
+            </a:lvl3pPr>
+            <a:lvl4pPr marL="1600200" indent="-228600">
+              <a:defRPr>
+                <a:solidFill>
+                  <a:schemeClr val="tx1"/>
+                </a:solidFill>
+                <a:latin typeface="Calibri" panose="020F0502020204030204" pitchFamily="34" charset="0"/>
+              </a:defRPr>
+            </a:lvl4pPr>
+            <a:lvl5pPr marL="2057400" indent="-228600">
+              <a:defRPr>
+                <a:solidFill>
+                  <a:schemeClr val="tx1"/>
+                </a:solidFill>
+                <a:latin typeface="Calibri" panose="020F0502020204030204" pitchFamily="34" charset="0"/>
+              </a:defRPr>
+            </a:lvl5pPr>
+            <a:lvl6pPr marL="2514600" indent="-228600" eaLnBrk="0" fontAlgn="base" hangingPunct="0">
+              <a:spcBef>
+                <a:spcPct val="0"/>
+              </a:spcBef>
+              <a:spcAft>
+                <a:spcPct val="0"/>
+              </a:spcAft>
+              <a:defRPr>
+                <a:solidFill>
+                  <a:schemeClr val="tx1"/>
+                </a:solidFill>
+                <a:latin typeface="Calibri" panose="020F0502020204030204" pitchFamily="34" charset="0"/>
+              </a:defRPr>
+            </a:lvl6pPr>
+            <a:lvl7pPr marL="2971800" indent="-228600" eaLnBrk="0" fontAlgn="base" hangingPunct="0">
+              <a:spcBef>
+                <a:spcPct val="0"/>
+              </a:spcBef>
+              <a:spcAft>
+                <a:spcPct val="0"/>
+              </a:spcAft>
+              <a:defRPr>
+                <a:solidFill>
+                  <a:schemeClr val="tx1"/>
+                </a:solidFill>
+                <a:latin typeface="Calibri" panose="020F0502020204030204" pitchFamily="34" charset="0"/>
+              </a:defRPr>
+            </a:lvl7pPr>
+            <a:lvl8pPr marL="3429000" indent="-228600" eaLnBrk="0" fontAlgn="base" hangingPunct="0">
+              <a:spcBef>
+                <a:spcPct val="0"/>
+              </a:spcBef>
+              <a:spcAft>
+                <a:spcPct val="0"/>
+              </a:spcAft>
+              <a:defRPr>
+                <a:solidFill>
+                  <a:schemeClr val="tx1"/>
+                </a:solidFill>
+                <a:latin typeface="Calibri" panose="020F0502020204030204" pitchFamily="34" charset="0"/>
+              </a:defRPr>
+            </a:lvl8pPr>
+            <a:lvl9pPr marL="3886200" indent="-228600" eaLnBrk="0" fontAlgn="base" hangingPunct="0">
+              <a:spcBef>
+                <a:spcPct val="0"/>
+              </a:spcBef>
+              <a:spcAft>
+                <a:spcPct val="0"/>
+              </a:spcAft>
+              <a:defRPr>
+                <a:solidFill>
+                  <a:schemeClr val="tx1"/>
+                </a:solidFill>
+                <a:latin typeface="Calibri" panose="020F0502020204030204" pitchFamily="34" charset="0"/>
+              </a:defRPr>
+            </a:lvl9pPr>
+          </a:lstStyle>
+          <a:p>
+            <a:pPr algn="ctr" eaLnBrk="1" hangingPunct="1"/>
+            <a:r>
+              <a:rPr lang="en-US" altLang="en-US" sz="1200" dirty="0" err="1">
+                <a:latin typeface="Arial" panose="020B0604020202020204" pitchFamily="34" charset="0"/>
+                <a:ea typeface="Amazon Ember" panose="020B0603020204020204" pitchFamily="34" charset="0"/>
+                <a:cs typeface="Arial" panose="020B0604020202020204" pitchFamily="34" charset="0"/>
+              </a:rPr>
+              <a:t>TaskCat</a:t>
+            </a:r>
+            <a:endParaRPr lang="en-US" altLang="en-US" sz="1200" dirty="0">
+              <a:latin typeface="Arial" panose="020B0604020202020204" pitchFamily="34" charset="0"/>
+              <a:ea typeface="Amazon Ember" panose="020B0603020204020204" pitchFamily="34" charset="0"/>
+              <a:cs typeface="Arial" panose="020B0604020202020204" pitchFamily="34" charset="0"/>
+            </a:endParaRPr>
+          </a:p>
+        </p:txBody>
+      </p:sp>
+      <p:cxnSp>
+        <p:nvCxnSpPr>
+          <p:cNvPr id="9" name="Straight Arrow Connector 8">
+            <a:extLst>
+              <a:ext uri="{FF2B5EF4-FFF2-40B4-BE49-F238E27FC236}">
+                <a16:creationId xmlns:a16="http://schemas.microsoft.com/office/drawing/2014/main" id="{688A742C-08D4-4E73-A891-95FE36A0A050}"/>
+              </a:ext>
+            </a:extLst>
+          </p:cNvPr>
+          <p:cNvCxnSpPr>
+            <a:cxnSpLocks/>
+            <a:stCxn id="5" idx="0"/>
+            <a:endCxn id="4" idx="2"/>
+          </p:cNvCxnSpPr>
+          <p:nvPr/>
+        </p:nvCxnSpPr>
+        <p:spPr>
+          <a:xfrm flipV="1">
+            <a:off x="7991856" y="3193875"/>
+            <a:ext cx="0" cy="352473"/>
+          </a:xfrm>
+          <a:prstGeom prst="straightConnector1">
+            <a:avLst/>
+          </a:prstGeom>
+          <a:ln w="12700">
+            <a:solidFill>
+              <a:srgbClr val="545B64"/>
+            </a:solidFill>
+            <a:headEnd type="none" w="med" len="sm"/>
+            <a:tailEnd type="arrow" w="med" len="sm"/>
+          </a:ln>
+        </p:spPr>
+        <p:style>
+          <a:lnRef idx="1">
+            <a:schemeClr val="accent1"/>
+          </a:lnRef>
+          <a:fillRef idx="0">
+            <a:schemeClr val="accent1"/>
+          </a:fillRef>
+          <a:effectRef idx="0">
+            <a:schemeClr val="accent1"/>
+          </a:effectRef>
+          <a:fontRef idx="minor">
+            <a:schemeClr val="tx1"/>
+          </a:fontRef>
+        </p:style>
+      </p:cxnSp>
+      <p:cxnSp>
+        <p:nvCxnSpPr>
+          <p:cNvPr id="10" name="Straight Arrow Connector 9">
+            <a:extLst>
+              <a:ext uri="{FF2B5EF4-FFF2-40B4-BE49-F238E27FC236}">
+                <a16:creationId xmlns:a16="http://schemas.microsoft.com/office/drawing/2014/main" id="{5D27361C-6F7F-4039-924C-77ED3BDD8011}"/>
+              </a:ext>
+            </a:extLst>
+          </p:cNvPr>
+          <p:cNvCxnSpPr>
+            <a:cxnSpLocks/>
+            <a:stCxn id="5" idx="3"/>
+            <a:endCxn id="19" idx="1"/>
+          </p:cNvCxnSpPr>
+          <p:nvPr/>
+        </p:nvCxnSpPr>
+        <p:spPr>
+          <a:xfrm>
+            <a:off x="8372856" y="3927348"/>
+            <a:ext cx="553785" cy="0"/>
+          </a:xfrm>
+          <a:prstGeom prst="straightConnector1">
+            <a:avLst/>
+          </a:prstGeom>
+          <a:ln w="12700">
+            <a:solidFill>
+              <a:srgbClr val="545B64"/>
+            </a:solidFill>
+            <a:headEnd type="none" w="med" len="sm"/>
+            <a:tailEnd type="arrow" w="med" len="sm"/>
+          </a:ln>
+        </p:spPr>
+        <p:style>
+          <a:lnRef idx="1">
+            <a:schemeClr val="accent1"/>
+          </a:lnRef>
+          <a:fillRef idx="0">
+            <a:schemeClr val="accent1"/>
+          </a:fillRef>
+          <a:effectRef idx="0">
+            <a:schemeClr val="accent1"/>
+          </a:effectRef>
+          <a:fontRef idx="minor">
+            <a:schemeClr val="tx1"/>
+          </a:fontRef>
+        </p:style>
+      </p:cxnSp>
+      <p:cxnSp>
+        <p:nvCxnSpPr>
+          <p:cNvPr id="11" name="Straight Arrow Connector 10">
+            <a:extLst>
+              <a:ext uri="{FF2B5EF4-FFF2-40B4-BE49-F238E27FC236}">
+                <a16:creationId xmlns:a16="http://schemas.microsoft.com/office/drawing/2014/main" id="{9126FF32-6254-482D-A66D-BA06AB8EECE9}"/>
+              </a:ext>
+            </a:extLst>
+          </p:cNvPr>
+          <p:cNvCxnSpPr>
+            <a:cxnSpLocks/>
+            <a:stCxn id="5" idx="1"/>
+            <a:endCxn id="48" idx="3"/>
+          </p:cNvCxnSpPr>
+          <p:nvPr/>
+        </p:nvCxnSpPr>
+        <p:spPr>
+          <a:xfrm flipH="1">
+            <a:off x="7029913" y="3927348"/>
+            <a:ext cx="580943" cy="0"/>
+          </a:xfrm>
+          <a:prstGeom prst="straightConnector1">
+            <a:avLst/>
+          </a:prstGeom>
+          <a:ln w="12700">
+            <a:solidFill>
+              <a:srgbClr val="545B64"/>
+            </a:solidFill>
+            <a:headEnd type="none" w="med" len="sm"/>
+            <a:tailEnd type="arrow" w="med" len="sm"/>
+          </a:ln>
+        </p:spPr>
+        <p:style>
+          <a:lnRef idx="1">
+            <a:schemeClr val="accent1"/>
+          </a:lnRef>
+          <a:fillRef idx="0">
+            <a:schemeClr val="accent1"/>
+          </a:fillRef>
+          <a:effectRef idx="0">
+            <a:schemeClr val="accent1"/>
+          </a:effectRef>
+          <a:fontRef idx="minor">
+            <a:schemeClr val="tx1"/>
+          </a:fontRef>
+        </p:style>
+      </p:cxnSp>
+      <p:sp>
+        <p:nvSpPr>
+          <p:cNvPr id="15" name="TextBox 28">
+            <a:extLst>
+              <a:ext uri="{FF2B5EF4-FFF2-40B4-BE49-F238E27FC236}">
+                <a16:creationId xmlns:a16="http://schemas.microsoft.com/office/drawing/2014/main" id="{19F08E4A-97C9-4805-9D71-79037B311B78}"/>
+              </a:ext>
+            </a:extLst>
+          </p:cNvPr>
+          <p:cNvSpPr txBox="1">
+            <a:spLocks noChangeArrowheads="1"/>
+          </p:cNvSpPr>
+          <p:nvPr/>
+        </p:nvSpPr>
+        <p:spPr bwMode="auto">
+          <a:xfrm>
+            <a:off x="8631652" y="2924570"/>
+            <a:ext cx="1187450" cy="261610"/>
+          </a:xfrm>
+          <a:prstGeom prst="rect">
+            <a:avLst/>
+          </a:prstGeom>
+          <a:noFill/>
+          <a:ln>
+            <a:noFill/>
+          </a:ln>
+          <a:extLst>
+            <a:ext uri="{909E8E84-426E-40DD-AFC4-6F175D3DCCD1}">
+              <a14:hiddenFill xmlns:a14="http://schemas.microsoft.com/office/drawing/2010/main">
+                <a:solidFill>
+                  <a:srgbClr val="FFFFFF"/>
+                </a:solidFill>
+              </a14:hiddenFill>
+            </a:ext>
+            <a:ext uri="{91240B29-F687-4F45-9708-019B960494DF}">
+              <a14:hiddenLine xmlns:a14="http://schemas.microsoft.com/office/drawing/2010/main" w="9525">
+                <a:solidFill>
+                  <a:srgbClr val="000000"/>
+                </a:solidFill>
+                <a:miter lim="800000"/>
+                <a:headEnd/>
+                <a:tailEnd/>
+              </a14:hiddenLine>
+            </a:ext>
+          </a:extLst>
+        </p:spPr>
+        <p:txBody>
+          <a:bodyPr>
+            <a:spAutoFit/>
+          </a:bodyPr>
+          <a:lstStyle>
+            <a:lvl1pPr>
+              <a:defRPr>
+                <a:solidFill>
+                  <a:schemeClr val="tx1"/>
+                </a:solidFill>
+                <a:latin typeface="Calibri" panose="020F0502020204030204" pitchFamily="34" charset="0"/>
+              </a:defRPr>
+            </a:lvl1pPr>
+            <a:lvl2pPr marL="742950" indent="-285750">
+              <a:defRPr>
+                <a:solidFill>
+                  <a:schemeClr val="tx1"/>
+                </a:solidFill>
+                <a:latin typeface="Calibri" panose="020F0502020204030204" pitchFamily="34" charset="0"/>
+              </a:defRPr>
+            </a:lvl2pPr>
+            <a:lvl3pPr marL="1143000" indent="-228600">
+              <a:defRPr>
+                <a:solidFill>
+                  <a:schemeClr val="tx1"/>
+                </a:solidFill>
+                <a:latin typeface="Calibri" panose="020F0502020204030204" pitchFamily="34" charset="0"/>
+              </a:defRPr>
+            </a:lvl3pPr>
+            <a:lvl4pPr marL="1600200" indent="-228600">
+              <a:defRPr>
+                <a:solidFill>
+                  <a:schemeClr val="tx1"/>
+                </a:solidFill>
+                <a:latin typeface="Calibri" panose="020F0502020204030204" pitchFamily="34" charset="0"/>
+              </a:defRPr>
+            </a:lvl4pPr>
+            <a:lvl5pPr marL="2057400" indent="-228600">
+              <a:defRPr>
+                <a:solidFill>
+                  <a:schemeClr val="tx1"/>
+                </a:solidFill>
+                <a:latin typeface="Calibri" panose="020F0502020204030204" pitchFamily="34" charset="0"/>
+              </a:defRPr>
+            </a:lvl5pPr>
+            <a:lvl6pPr marL="2514600" indent="-228600" eaLnBrk="0" fontAlgn="base" hangingPunct="0">
+              <a:spcBef>
+                <a:spcPct val="0"/>
+              </a:spcBef>
+              <a:spcAft>
+                <a:spcPct val="0"/>
+              </a:spcAft>
+              <a:defRPr>
+                <a:solidFill>
+                  <a:schemeClr val="tx1"/>
+                </a:solidFill>
+                <a:latin typeface="Calibri" panose="020F0502020204030204" pitchFamily="34" charset="0"/>
+              </a:defRPr>
+            </a:lvl6pPr>
+            <a:lvl7pPr marL="2971800" indent="-228600" eaLnBrk="0" fontAlgn="base" hangingPunct="0">
+              <a:spcBef>
+                <a:spcPct val="0"/>
+              </a:spcBef>
+              <a:spcAft>
+                <a:spcPct val="0"/>
+              </a:spcAft>
+              <a:defRPr>
+                <a:solidFill>
+                  <a:schemeClr val="tx1"/>
+                </a:solidFill>
+                <a:latin typeface="Calibri" panose="020F0502020204030204" pitchFamily="34" charset="0"/>
+              </a:defRPr>
+            </a:lvl7pPr>
+            <a:lvl8pPr marL="3429000" indent="-228600" eaLnBrk="0" fontAlgn="base" hangingPunct="0">
+              <a:spcBef>
+                <a:spcPct val="0"/>
+              </a:spcBef>
+              <a:spcAft>
+                <a:spcPct val="0"/>
+              </a:spcAft>
+              <a:defRPr>
+                <a:solidFill>
+                  <a:schemeClr val="tx1"/>
+                </a:solidFill>
+                <a:latin typeface="Calibri" panose="020F0502020204030204" pitchFamily="34" charset="0"/>
+              </a:defRPr>
+            </a:lvl8pPr>
+            <a:lvl9pPr marL="3886200" indent="-228600" eaLnBrk="0" fontAlgn="base" hangingPunct="0">
+              <a:spcBef>
+                <a:spcPct val="0"/>
+              </a:spcBef>
+              <a:spcAft>
+                <a:spcPct val="0"/>
+              </a:spcAft>
+              <a:defRPr>
+                <a:solidFill>
+                  <a:schemeClr val="tx1"/>
+                </a:solidFill>
+                <a:latin typeface="Calibri" panose="020F0502020204030204" pitchFamily="34" charset="0"/>
+              </a:defRPr>
+            </a:lvl9pPr>
+          </a:lstStyle>
+          <a:p>
+            <a:pPr algn="ctr" eaLnBrk="1" hangingPunct="1"/>
+            <a:r>
+              <a:rPr lang="en-US" altLang="en-US" sz="1100" dirty="0">
+                <a:latin typeface="Arial" panose="020B0604020202020204" pitchFamily="34" charset="0"/>
+                <a:ea typeface="Amazon Ember" panose="020B0603020204020204" pitchFamily="34" charset="0"/>
+                <a:cs typeface="Arial" panose="020B0604020202020204" pitchFamily="34" charset="0"/>
+              </a:rPr>
+              <a:t>Templates</a:t>
+            </a:r>
+          </a:p>
+        </p:txBody>
+      </p:sp>
+      <p:pic>
+        <p:nvPicPr>
+          <p:cNvPr id="16" name="Graphic 36">
+            <a:extLst>
+              <a:ext uri="{FF2B5EF4-FFF2-40B4-BE49-F238E27FC236}">
+                <a16:creationId xmlns:a16="http://schemas.microsoft.com/office/drawing/2014/main" id="{D4E791B5-6CF3-432A-84AB-E3230B84CCA0}"/>
+              </a:ext>
+            </a:extLst>
+          </p:cNvPr>
+          <p:cNvPicPr>
+            <a:picLocks noChangeAspect="1" noChangeArrowheads="1"/>
+          </p:cNvPicPr>
+          <p:nvPr/>
+        </p:nvPicPr>
+        <p:blipFill>
+          <a:blip r:embed="rId4">
+            <a:extLst>
+              <a:ext uri="{28A0092B-C50C-407E-A947-70E740481C1C}">
+                <a14:useLocalDpi xmlns:a14="http://schemas.microsoft.com/office/drawing/2010/main" val="0"/>
+              </a:ext>
+            </a:extLst>
+          </a:blip>
+          <a:srcRect/>
+          <a:stretch>
+            <a:fillRect/>
+          </a:stretch>
+        </p:blipFill>
+        <p:spPr bwMode="auto">
+          <a:xfrm>
+            <a:off x="8996777" y="2288150"/>
+            <a:ext cx="457200" cy="457200"/>
+          </a:xfrm>
+          <a:prstGeom prst="rect">
+            <a:avLst/>
+          </a:prstGeom>
+          <a:noFill/>
+          <a:ln>
+            <a:noFill/>
+          </a:ln>
+          <a:extLst>
+            <a:ext uri="{909E8E84-426E-40DD-AFC4-6F175D3DCCD1}">
+              <a14:hiddenFill xmlns:a14="http://schemas.microsoft.com/office/drawing/2010/main">
+                <a:solidFill>
+                  <a:srgbClr val="FFFFFF"/>
+                </a:solidFill>
+              </a14:hiddenFill>
+            </a:ext>
+            <a:ext uri="{91240B29-F687-4F45-9708-019B960494DF}">
+              <a14:hiddenLine xmlns:a14="http://schemas.microsoft.com/office/drawing/2010/main" w="9525">
+                <a:solidFill>
+                  <a:srgbClr val="000000"/>
+                </a:solidFill>
+                <a:miter lim="800000"/>
+                <a:headEnd/>
+                <a:tailEnd/>
+              </a14:hiddenLine>
+            </a:ext>
+          </a:extLst>
+        </p:spPr>
+      </p:pic>
+      <p:cxnSp>
+        <p:nvCxnSpPr>
+          <p:cNvPr id="17" name="Straight Arrow Connector 16">
+            <a:extLst>
+              <a:ext uri="{FF2B5EF4-FFF2-40B4-BE49-F238E27FC236}">
+                <a16:creationId xmlns:a16="http://schemas.microsoft.com/office/drawing/2014/main" id="{2EEE01CD-7034-466B-B917-32DA22EE2833}"/>
+              </a:ext>
+            </a:extLst>
+          </p:cNvPr>
+          <p:cNvCxnSpPr>
+            <a:cxnSpLocks/>
+            <a:stCxn id="19" idx="0"/>
+            <a:endCxn id="15" idx="2"/>
+          </p:cNvCxnSpPr>
+          <p:nvPr/>
+        </p:nvCxnSpPr>
+        <p:spPr>
+          <a:xfrm flipH="1" flipV="1">
+            <a:off x="9225377" y="3186180"/>
+            <a:ext cx="1" cy="361692"/>
+          </a:xfrm>
+          <a:prstGeom prst="straightConnector1">
+            <a:avLst/>
+          </a:prstGeom>
+          <a:ln w="12700">
+            <a:solidFill>
+              <a:srgbClr val="545B64"/>
+            </a:solidFill>
+            <a:headEnd type="none" w="med" len="sm"/>
+            <a:tailEnd type="arrow" w="med" len="sm"/>
+          </a:ln>
+        </p:spPr>
+        <p:style>
+          <a:lnRef idx="1">
+            <a:schemeClr val="accent1"/>
+          </a:lnRef>
+          <a:fillRef idx="0">
+            <a:schemeClr val="accent1"/>
+          </a:fillRef>
+          <a:effectRef idx="0">
+            <a:schemeClr val="accent1"/>
+          </a:effectRef>
+          <a:fontRef idx="minor">
+            <a:schemeClr val="tx1"/>
+          </a:fontRef>
+        </p:style>
+      </p:cxnSp>
+      <p:pic>
+        <p:nvPicPr>
+          <p:cNvPr id="19" name="Picture 18">
+            <a:extLst>
+              <a:ext uri="{FF2B5EF4-FFF2-40B4-BE49-F238E27FC236}">
+                <a16:creationId xmlns:a16="http://schemas.microsoft.com/office/drawing/2014/main" id="{BAF9B802-4177-46CA-9D6A-FDF8DC957FF3}"/>
+              </a:ext>
+            </a:extLst>
+          </p:cNvPr>
+          <p:cNvPicPr>
+            <a:picLocks noChangeAspect="1"/>
+          </p:cNvPicPr>
+          <p:nvPr/>
+        </p:nvPicPr>
+        <p:blipFill>
+          <a:blip r:embed="rId5">
+            <a:extLst>
+              <a:ext uri="{28A0092B-C50C-407E-A947-70E740481C1C}">
+                <a14:useLocalDpi xmlns:a14="http://schemas.microsoft.com/office/drawing/2010/main" val="0"/>
+              </a:ext>
+            </a:extLst>
+          </a:blip>
+          <a:stretch>
+            <a:fillRect/>
+          </a:stretch>
+        </p:blipFill>
+        <p:spPr>
+          <a:xfrm>
+            <a:off x="8926641" y="3547872"/>
+            <a:ext cx="597473" cy="758952"/>
+          </a:xfrm>
+          <a:prstGeom prst="rect">
+            <a:avLst/>
+          </a:prstGeom>
+        </p:spPr>
+      </p:pic>
+      <p:sp>
+        <p:nvSpPr>
+          <p:cNvPr id="23" name="TextBox 17">
+            <a:extLst>
+              <a:ext uri="{FF2B5EF4-FFF2-40B4-BE49-F238E27FC236}">
+                <a16:creationId xmlns:a16="http://schemas.microsoft.com/office/drawing/2014/main" id="{C7C13FD0-182B-40EB-B0D7-4FF26E4749C5}"/>
+              </a:ext>
+            </a:extLst>
+          </p:cNvPr>
+          <p:cNvSpPr txBox="1">
+            <a:spLocks noChangeArrowheads="1"/>
+          </p:cNvSpPr>
+          <p:nvPr/>
+        </p:nvSpPr>
+        <p:spPr bwMode="auto">
+          <a:xfrm>
+            <a:off x="10098559" y="4299278"/>
+            <a:ext cx="1362074" cy="261610"/>
+          </a:xfrm>
+          <a:prstGeom prst="rect">
+            <a:avLst/>
+          </a:prstGeom>
+          <a:noFill/>
+          <a:ln>
+            <a:noFill/>
+          </a:ln>
+          <a:extLst>
+            <a:ext uri="{909E8E84-426E-40DD-AFC4-6F175D3DCCD1}">
+              <a14:hiddenFill xmlns:a14="http://schemas.microsoft.com/office/drawing/2010/main">
+                <a:solidFill>
+                  <a:srgbClr val="FFFFFF"/>
+                </a:solidFill>
+              </a14:hiddenFill>
+            </a:ext>
+            <a:ext uri="{91240B29-F687-4F45-9708-019B960494DF}">
+              <a14:hiddenLine xmlns:a14="http://schemas.microsoft.com/office/drawing/2010/main" w="9525">
+                <a:solidFill>
+                  <a:srgbClr val="000000"/>
+                </a:solidFill>
+                <a:miter lim="800000"/>
+                <a:headEnd/>
+                <a:tailEnd/>
+              </a14:hiddenLine>
+            </a:ext>
+          </a:extLst>
+        </p:spPr>
+        <p:txBody>
+          <a:bodyPr wrap="square">
+            <a:spAutoFit/>
+          </a:bodyPr>
+          <a:lstStyle>
+            <a:lvl1pPr>
+              <a:defRPr>
+                <a:solidFill>
+                  <a:schemeClr val="tx1"/>
+                </a:solidFill>
+                <a:latin typeface="Calibri" panose="020F0502020204030204" pitchFamily="34" charset="0"/>
+              </a:defRPr>
+            </a:lvl1pPr>
+            <a:lvl2pPr marL="742950" indent="-285750">
+              <a:defRPr>
+                <a:solidFill>
+                  <a:schemeClr val="tx1"/>
+                </a:solidFill>
+                <a:latin typeface="Calibri" panose="020F0502020204030204" pitchFamily="34" charset="0"/>
+              </a:defRPr>
+            </a:lvl2pPr>
+            <a:lvl3pPr marL="1143000" indent="-228600">
+              <a:defRPr>
+                <a:solidFill>
+                  <a:schemeClr val="tx1"/>
+                </a:solidFill>
+                <a:latin typeface="Calibri" panose="020F0502020204030204" pitchFamily="34" charset="0"/>
+              </a:defRPr>
+            </a:lvl3pPr>
+            <a:lvl4pPr marL="1600200" indent="-228600">
+              <a:defRPr>
+                <a:solidFill>
+                  <a:schemeClr val="tx1"/>
+                </a:solidFill>
+                <a:latin typeface="Calibri" panose="020F0502020204030204" pitchFamily="34" charset="0"/>
+              </a:defRPr>
+            </a:lvl4pPr>
+            <a:lvl5pPr marL="2057400" indent="-228600">
+              <a:defRPr>
+                <a:solidFill>
+                  <a:schemeClr val="tx1"/>
+                </a:solidFill>
+                <a:latin typeface="Calibri" panose="020F0502020204030204" pitchFamily="34" charset="0"/>
+              </a:defRPr>
+            </a:lvl5pPr>
+            <a:lvl6pPr marL="2514600" indent="-228600" eaLnBrk="0" fontAlgn="base" hangingPunct="0">
+              <a:spcBef>
+                <a:spcPct val="0"/>
+              </a:spcBef>
+              <a:spcAft>
+                <a:spcPct val="0"/>
+              </a:spcAft>
+              <a:defRPr>
+                <a:solidFill>
+                  <a:schemeClr val="tx1"/>
+                </a:solidFill>
+                <a:latin typeface="Calibri" panose="020F0502020204030204" pitchFamily="34" charset="0"/>
+              </a:defRPr>
+            </a:lvl6pPr>
+            <a:lvl7pPr marL="2971800" indent="-228600" eaLnBrk="0" fontAlgn="base" hangingPunct="0">
+              <a:spcBef>
+                <a:spcPct val="0"/>
+              </a:spcBef>
+              <a:spcAft>
+                <a:spcPct val="0"/>
+              </a:spcAft>
+              <a:defRPr>
+                <a:solidFill>
+                  <a:schemeClr val="tx1"/>
+                </a:solidFill>
+                <a:latin typeface="Calibri" panose="020F0502020204030204" pitchFamily="34" charset="0"/>
+              </a:defRPr>
+            </a:lvl7pPr>
+            <a:lvl8pPr marL="3429000" indent="-228600" eaLnBrk="0" fontAlgn="base" hangingPunct="0">
+              <a:spcBef>
+                <a:spcPct val="0"/>
+              </a:spcBef>
+              <a:spcAft>
+                <a:spcPct val="0"/>
+              </a:spcAft>
+              <a:defRPr>
+                <a:solidFill>
+                  <a:schemeClr val="tx1"/>
+                </a:solidFill>
+                <a:latin typeface="Calibri" panose="020F0502020204030204" pitchFamily="34" charset="0"/>
+              </a:defRPr>
+            </a:lvl8pPr>
+            <a:lvl9pPr marL="3886200" indent="-228600" eaLnBrk="0" fontAlgn="base" hangingPunct="0">
+              <a:spcBef>
+                <a:spcPct val="0"/>
+              </a:spcBef>
+              <a:spcAft>
+                <a:spcPct val="0"/>
+              </a:spcAft>
+              <a:defRPr>
+                <a:solidFill>
+                  <a:schemeClr val="tx1"/>
+                </a:solidFill>
+                <a:latin typeface="Calibri" panose="020F0502020204030204" pitchFamily="34" charset="0"/>
+              </a:defRPr>
+            </a:lvl9pPr>
+          </a:lstStyle>
+          <a:p>
+            <a:pPr algn="ctr" eaLnBrk="1" hangingPunct="1"/>
+            <a:r>
+              <a:rPr lang="en-US" altLang="en-US" sz="1100" dirty="0">
+                <a:latin typeface="Arial" panose="020B0604020202020204" pitchFamily="34" charset="0"/>
+                <a:ea typeface="Amazon Ember" panose="020B0603020204020204" pitchFamily="34" charset="0"/>
+                <a:cs typeface="Arial" panose="020B0604020202020204" pitchFamily="34" charset="0"/>
+              </a:rPr>
+              <a:t>Lambda function</a:t>
+            </a:r>
+          </a:p>
+        </p:txBody>
+      </p:sp>
+      <p:pic>
+        <p:nvPicPr>
+          <p:cNvPr id="24" name="Graphic 13">
+            <a:extLst>
+              <a:ext uri="{FF2B5EF4-FFF2-40B4-BE49-F238E27FC236}">
+                <a16:creationId xmlns:a16="http://schemas.microsoft.com/office/drawing/2014/main" id="{053941AD-7367-4B5E-A728-2F316FDD0AB8}"/>
+              </a:ext>
+            </a:extLst>
+          </p:cNvPr>
+          <p:cNvPicPr>
+            <a:picLocks noChangeAspect="1" noChangeArrowheads="1"/>
+          </p:cNvPicPr>
+          <p:nvPr/>
+        </p:nvPicPr>
+        <p:blipFill>
+          <a:blip r:embed="rId6">
+            <a:extLst>
+              <a:ext uri="{28A0092B-C50C-407E-A947-70E740481C1C}">
+                <a14:useLocalDpi xmlns:a14="http://schemas.microsoft.com/office/drawing/2010/main" val="0"/>
+              </a:ext>
+            </a:extLst>
+          </a:blip>
+          <a:srcRect/>
+          <a:stretch>
+            <a:fillRect/>
+          </a:stretch>
+        </p:blipFill>
+        <p:spPr bwMode="auto">
+          <a:xfrm>
+            <a:off x="10550996" y="3698748"/>
+            <a:ext cx="457200" cy="457200"/>
+          </a:xfrm>
+          <a:prstGeom prst="rect">
+            <a:avLst/>
+          </a:prstGeom>
+          <a:noFill/>
+          <a:ln>
+            <a:noFill/>
+          </a:ln>
+          <a:extLst>
+            <a:ext uri="{909E8E84-426E-40DD-AFC4-6F175D3DCCD1}">
+              <a14:hiddenFill xmlns:a14="http://schemas.microsoft.com/office/drawing/2010/main">
+                <a:solidFill>
+                  <a:srgbClr val="FFFFFF"/>
+                </a:solidFill>
+              </a14:hiddenFill>
+            </a:ext>
+            <a:ext uri="{91240B29-F687-4F45-9708-019B960494DF}">
+              <a14:hiddenLine xmlns:a14="http://schemas.microsoft.com/office/drawing/2010/main" w="9525">
+                <a:solidFill>
+                  <a:srgbClr val="000000"/>
+                </a:solidFill>
+                <a:miter lim="800000"/>
+                <a:headEnd/>
+                <a:tailEnd/>
+              </a14:hiddenLine>
+            </a:ext>
+          </a:extLst>
+        </p:spPr>
+      </p:pic>
+      <p:cxnSp>
+        <p:nvCxnSpPr>
+          <p:cNvPr id="25" name="Straight Arrow Connector 24">
+            <a:extLst>
+              <a:ext uri="{FF2B5EF4-FFF2-40B4-BE49-F238E27FC236}">
+                <a16:creationId xmlns:a16="http://schemas.microsoft.com/office/drawing/2014/main" id="{FDF93F13-7606-4E1E-BC50-29F94C8D4795}"/>
+              </a:ext>
+            </a:extLst>
+          </p:cNvPr>
+          <p:cNvCxnSpPr>
+            <a:cxnSpLocks/>
+            <a:stCxn id="50" idx="3"/>
+            <a:endCxn id="52" idx="1"/>
+          </p:cNvCxnSpPr>
+          <p:nvPr/>
+        </p:nvCxnSpPr>
+        <p:spPr>
+          <a:xfrm>
+            <a:off x="9729216" y="3927348"/>
+            <a:ext cx="456020" cy="0"/>
+          </a:xfrm>
+          <a:prstGeom prst="straightConnector1">
+            <a:avLst/>
+          </a:prstGeom>
+          <a:ln w="12700">
+            <a:solidFill>
+              <a:srgbClr val="545B64"/>
+            </a:solidFill>
+            <a:headEnd type="none" w="med" len="sm"/>
+            <a:tailEnd type="arrow" w="med" len="sm"/>
+          </a:ln>
+        </p:spPr>
+        <p:style>
+          <a:lnRef idx="1">
+            <a:schemeClr val="accent1"/>
+          </a:lnRef>
+          <a:fillRef idx="0">
+            <a:schemeClr val="accent1"/>
+          </a:fillRef>
+          <a:effectRef idx="0">
+            <a:schemeClr val="accent1"/>
+          </a:effectRef>
+          <a:fontRef idx="minor">
+            <a:schemeClr val="tx1"/>
+          </a:fontRef>
+        </p:style>
+      </p:cxnSp>
+      <p:cxnSp>
+        <p:nvCxnSpPr>
+          <p:cNvPr id="29" name="Straight Arrow Connector 28">
+            <a:extLst>
+              <a:ext uri="{FF2B5EF4-FFF2-40B4-BE49-F238E27FC236}">
+                <a16:creationId xmlns:a16="http://schemas.microsoft.com/office/drawing/2014/main" id="{49D284E7-0C59-49A0-9C8D-6A8081416B11}"/>
+              </a:ext>
+            </a:extLst>
+          </p:cNvPr>
+          <p:cNvCxnSpPr>
+            <a:cxnSpLocks/>
+            <a:stCxn id="49" idx="3"/>
+            <a:endCxn id="50" idx="1"/>
+          </p:cNvCxnSpPr>
+          <p:nvPr/>
+        </p:nvCxnSpPr>
+        <p:spPr>
+          <a:xfrm>
+            <a:off x="5797496" y="3927348"/>
+            <a:ext cx="457000" cy="0"/>
+          </a:xfrm>
+          <a:prstGeom prst="straightConnector1">
+            <a:avLst/>
+          </a:prstGeom>
+          <a:ln w="12700">
+            <a:solidFill>
+              <a:srgbClr val="545B64"/>
+            </a:solidFill>
+            <a:headEnd type="none" w="med" len="sm"/>
+            <a:tailEnd type="arrow" w="med" len="sm"/>
+          </a:ln>
+        </p:spPr>
+        <p:style>
+          <a:lnRef idx="1">
+            <a:schemeClr val="accent1"/>
+          </a:lnRef>
+          <a:fillRef idx="0">
+            <a:schemeClr val="accent1"/>
+          </a:fillRef>
+          <a:effectRef idx="0">
+            <a:schemeClr val="accent1"/>
+          </a:effectRef>
+          <a:fontRef idx="minor">
+            <a:schemeClr val="tx1"/>
+          </a:fontRef>
+        </p:style>
+      </p:cxnSp>
+      <p:pic>
+        <p:nvPicPr>
+          <p:cNvPr id="32" name="Graphic 24">
+            <a:extLst>
+              <a:ext uri="{FF2B5EF4-FFF2-40B4-BE49-F238E27FC236}">
+                <a16:creationId xmlns:a16="http://schemas.microsoft.com/office/drawing/2014/main" id="{5BD7DF9A-34BB-4698-9B0B-AE489696F6DA}"/>
+              </a:ext>
+            </a:extLst>
+          </p:cNvPr>
+          <p:cNvPicPr>
+            <a:picLocks noChangeAspect="1" noChangeArrowheads="1"/>
+          </p:cNvPicPr>
+          <p:nvPr/>
+        </p:nvPicPr>
+        <p:blipFill>
+          <a:blip r:embed="rId7">
+            <a:extLst>
+              <a:ext uri="{96DAC541-7B7A-43D3-8B79-37D633B846F1}">
+                <asvg:svgBlip xmlns:asvg="http://schemas.microsoft.com/office/drawing/2016/SVG/main" r:embed="rId8"/>
+              </a:ext>
+            </a:extLst>
+          </a:blip>
+          <a:srcRect/>
+          <a:stretch/>
+        </p:blipFill>
+        <p:spPr bwMode="auto">
+          <a:xfrm>
+            <a:off x="4968186" y="3692398"/>
+            <a:ext cx="469900" cy="469900"/>
+          </a:xfrm>
+          <a:prstGeom prst="rect">
+            <a:avLst/>
+          </a:prstGeom>
+          <a:noFill/>
+          <a:ln>
+            <a:noFill/>
+          </a:ln>
+          <a:extLst>
+            <a:ext uri="{909E8E84-426E-40DD-AFC4-6F175D3DCCD1}">
+              <a14:hiddenFill xmlns:a14="http://schemas.microsoft.com/office/drawing/2010/main">
+                <a:solidFill>
+                  <a:srgbClr val="FFFFFF"/>
+                </a:solidFill>
+              </a14:hiddenFill>
+            </a:ext>
+            <a:ext uri="{91240B29-F687-4F45-9708-019B960494DF}">
+              <a14:hiddenLine xmlns:a14="http://schemas.microsoft.com/office/drawing/2010/main" w="9525">
+                <a:solidFill>
+                  <a:srgbClr val="000000"/>
+                </a:solidFill>
+                <a:miter lim="800000"/>
+                <a:headEnd/>
+                <a:tailEnd/>
+              </a14:hiddenLine>
+            </a:ext>
+          </a:extLst>
+        </p:spPr>
+      </p:pic>
+      <p:sp>
+        <p:nvSpPr>
+          <p:cNvPr id="33" name="TextBox 25">
+            <a:extLst>
+              <a:ext uri="{FF2B5EF4-FFF2-40B4-BE49-F238E27FC236}">
+                <a16:creationId xmlns:a16="http://schemas.microsoft.com/office/drawing/2014/main" id="{7C306EF9-2BE0-4C3F-85C6-D8F7AB2B72AD}"/>
+              </a:ext>
+            </a:extLst>
+          </p:cNvPr>
+          <p:cNvSpPr txBox="1">
+            <a:spLocks noChangeArrowheads="1"/>
+          </p:cNvSpPr>
+          <p:nvPr/>
+        </p:nvSpPr>
+        <p:spPr bwMode="auto">
+          <a:xfrm>
+            <a:off x="4666561" y="4299278"/>
+            <a:ext cx="1073150" cy="261610"/>
+          </a:xfrm>
+          <a:prstGeom prst="rect">
+            <a:avLst/>
+          </a:prstGeom>
+          <a:noFill/>
+          <a:ln>
+            <a:noFill/>
+          </a:ln>
+          <a:extLst>
+            <a:ext uri="{909E8E84-426E-40DD-AFC4-6F175D3DCCD1}">
+              <a14:hiddenFill xmlns:a14="http://schemas.microsoft.com/office/drawing/2010/main">
+                <a:solidFill>
+                  <a:srgbClr val="FFFFFF"/>
+                </a:solidFill>
+              </a14:hiddenFill>
+            </a:ext>
+            <a:ext uri="{91240B29-F687-4F45-9708-019B960494DF}">
+              <a14:hiddenLine xmlns:a14="http://schemas.microsoft.com/office/drawing/2010/main" w="9525">
+                <a:solidFill>
+                  <a:srgbClr val="000000"/>
+                </a:solidFill>
+                <a:miter lim="800000"/>
+                <a:headEnd/>
+                <a:tailEnd/>
+              </a14:hiddenLine>
+            </a:ext>
+          </a:extLst>
+        </p:spPr>
+        <p:txBody>
+          <a:bodyPr>
+            <a:spAutoFit/>
+          </a:bodyPr>
+          <a:lstStyle>
+            <a:lvl1pPr>
+              <a:defRPr>
+                <a:solidFill>
+                  <a:schemeClr val="tx1"/>
+                </a:solidFill>
+                <a:latin typeface="Calibri" panose="020F0502020204030204" pitchFamily="34" charset="0"/>
+              </a:defRPr>
+            </a:lvl1pPr>
+            <a:lvl2pPr marL="742950" indent="-285750">
+              <a:defRPr>
+                <a:solidFill>
+                  <a:schemeClr val="tx1"/>
+                </a:solidFill>
+                <a:latin typeface="Calibri" panose="020F0502020204030204" pitchFamily="34" charset="0"/>
+              </a:defRPr>
+            </a:lvl2pPr>
+            <a:lvl3pPr marL="1143000" indent="-228600">
+              <a:defRPr>
+                <a:solidFill>
+                  <a:schemeClr val="tx1"/>
+                </a:solidFill>
+                <a:latin typeface="Calibri" panose="020F0502020204030204" pitchFamily="34" charset="0"/>
+              </a:defRPr>
+            </a:lvl3pPr>
+            <a:lvl4pPr marL="1600200" indent="-228600">
+              <a:defRPr>
+                <a:solidFill>
+                  <a:schemeClr val="tx1"/>
+                </a:solidFill>
+                <a:latin typeface="Calibri" panose="020F0502020204030204" pitchFamily="34" charset="0"/>
+              </a:defRPr>
+            </a:lvl4pPr>
+            <a:lvl5pPr marL="2057400" indent="-228600">
+              <a:defRPr>
+                <a:solidFill>
+                  <a:schemeClr val="tx1"/>
+                </a:solidFill>
+                <a:latin typeface="Calibri" panose="020F0502020204030204" pitchFamily="34" charset="0"/>
+              </a:defRPr>
+            </a:lvl5pPr>
+            <a:lvl6pPr marL="2514600" indent="-228600" eaLnBrk="0" fontAlgn="base" hangingPunct="0">
+              <a:spcBef>
+                <a:spcPct val="0"/>
+              </a:spcBef>
+              <a:spcAft>
+                <a:spcPct val="0"/>
+              </a:spcAft>
+              <a:defRPr>
+                <a:solidFill>
+                  <a:schemeClr val="tx1"/>
+                </a:solidFill>
+                <a:latin typeface="Calibri" panose="020F0502020204030204" pitchFamily="34" charset="0"/>
+              </a:defRPr>
+            </a:lvl6pPr>
+            <a:lvl7pPr marL="2971800" indent="-228600" eaLnBrk="0" fontAlgn="base" hangingPunct="0">
+              <a:spcBef>
+                <a:spcPct val="0"/>
+              </a:spcBef>
+              <a:spcAft>
+                <a:spcPct val="0"/>
+              </a:spcAft>
+              <a:defRPr>
+                <a:solidFill>
+                  <a:schemeClr val="tx1"/>
+                </a:solidFill>
+                <a:latin typeface="Calibri" panose="020F0502020204030204" pitchFamily="34" charset="0"/>
+              </a:defRPr>
+            </a:lvl7pPr>
+            <a:lvl8pPr marL="3429000" indent="-228600" eaLnBrk="0" fontAlgn="base" hangingPunct="0">
+              <a:spcBef>
+                <a:spcPct val="0"/>
+              </a:spcBef>
+              <a:spcAft>
+                <a:spcPct val="0"/>
+              </a:spcAft>
+              <a:defRPr>
+                <a:solidFill>
+                  <a:schemeClr val="tx1"/>
+                </a:solidFill>
+                <a:latin typeface="Calibri" panose="020F0502020204030204" pitchFamily="34" charset="0"/>
+              </a:defRPr>
+            </a:lvl8pPr>
+            <a:lvl9pPr marL="3886200" indent="-228600" eaLnBrk="0" fontAlgn="base" hangingPunct="0">
+              <a:spcBef>
+                <a:spcPct val="0"/>
+              </a:spcBef>
+              <a:spcAft>
+                <a:spcPct val="0"/>
+              </a:spcAft>
+              <a:defRPr>
+                <a:solidFill>
+                  <a:schemeClr val="tx1"/>
+                </a:solidFill>
+                <a:latin typeface="Calibri" panose="020F0502020204030204" pitchFamily="34" charset="0"/>
+              </a:defRPr>
+            </a:lvl9pPr>
+          </a:lstStyle>
+          <a:p>
+            <a:pPr algn="ctr" eaLnBrk="1" hangingPunct="1"/>
+            <a:r>
+              <a:rPr lang="en-US" altLang="en-US" sz="1100" dirty="0">
+                <a:solidFill>
+                  <a:srgbClr val="000000"/>
+                </a:solidFill>
+                <a:latin typeface="Arial" panose="020B0604020202020204" pitchFamily="34" charset="0"/>
+                <a:cs typeface="Arial" panose="020B0604020202020204" pitchFamily="34" charset="0"/>
+              </a:rPr>
+              <a:t>Source code</a:t>
+            </a:r>
+          </a:p>
+        </p:txBody>
+      </p:sp>
+      <p:sp>
+        <p:nvSpPr>
+          <p:cNvPr id="34" name="Rectangle 33">
+            <a:extLst>
+              <a:ext uri="{FF2B5EF4-FFF2-40B4-BE49-F238E27FC236}">
+                <a16:creationId xmlns:a16="http://schemas.microsoft.com/office/drawing/2014/main" id="{F2C226CF-325A-453B-9486-3BA919225574}"/>
+              </a:ext>
+            </a:extLst>
+          </p:cNvPr>
+          <p:cNvSpPr/>
+          <p:nvPr/>
+        </p:nvSpPr>
+        <p:spPr>
+          <a:xfrm>
+            <a:off x="4096032" y="1251641"/>
+            <a:ext cx="7772400" cy="5072157"/>
+          </a:xfrm>
+          <a:prstGeom prst="rect">
+            <a:avLst/>
+          </a:prstGeom>
+          <a:noFill/>
+          <a:ln w="12700">
+            <a:solidFill>
+              <a:srgbClr val="3A47CB"/>
+            </a:solidFill>
+          </a:ln>
+        </p:spPr>
+        <p:style>
+          <a:lnRef idx="2">
+            <a:schemeClr val="accent1">
+              <a:shade val="50000"/>
+            </a:schemeClr>
+          </a:lnRef>
+          <a:fillRef idx="1">
+            <a:schemeClr val="accent1"/>
+          </a:fillRef>
+          <a:effectRef idx="0">
+            <a:schemeClr val="accent1"/>
+          </a:effectRef>
+          <a:fontRef idx="minor">
+            <a:schemeClr val="lt1"/>
+          </a:fontRef>
+        </p:style>
+        <p:txBody>
+          <a:bodyPr lIns="502920" tIns="91440"/>
+          <a:lstStyle/>
+          <a:p>
+            <a:pPr eaLnBrk="1" fontAlgn="auto" hangingPunct="1">
+              <a:spcBef>
+                <a:spcPts val="0"/>
+              </a:spcBef>
+              <a:spcAft>
+                <a:spcPts val="0"/>
+              </a:spcAft>
+              <a:defRPr/>
+            </a:pPr>
+            <a:r>
+              <a:rPr lang="en-US" sz="1200" dirty="0">
+                <a:solidFill>
+                  <a:srgbClr val="3A47CB"/>
+                </a:solidFill>
+                <a:latin typeface="Arial" panose="020B0604020202020204" pitchFamily="34" charset="0"/>
+                <a:cs typeface="Arial" panose="020B0604020202020204" pitchFamily="34" charset="0"/>
+              </a:rPr>
+              <a:t>AWS CodePipeline</a:t>
+            </a:r>
+          </a:p>
+        </p:txBody>
+      </p:sp>
+      <p:pic>
+        <p:nvPicPr>
+          <p:cNvPr id="35" name="Graphic 34">
+            <a:extLst>
+              <a:ext uri="{FF2B5EF4-FFF2-40B4-BE49-F238E27FC236}">
+                <a16:creationId xmlns:a16="http://schemas.microsoft.com/office/drawing/2014/main" id="{86D2FD10-EED4-46DA-BBD0-860A38496AF9}"/>
+              </a:ext>
+            </a:extLst>
+          </p:cNvPr>
+          <p:cNvPicPr>
+            <a:picLocks noChangeAspect="1"/>
+          </p:cNvPicPr>
+          <p:nvPr/>
+        </p:nvPicPr>
+        <p:blipFill>
+          <a:blip r:embed="rId9">
+            <a:extLst>
+              <a:ext uri="{28A0092B-C50C-407E-A947-70E740481C1C}">
+                <a14:useLocalDpi xmlns:a14="http://schemas.microsoft.com/office/drawing/2010/main" val="0"/>
+              </a:ext>
+              <a:ext uri="{96DAC541-7B7A-43D3-8B79-37D633B846F1}">
+                <asvg:svgBlip xmlns:asvg="http://schemas.microsoft.com/office/drawing/2016/SVG/main" r:embed="rId10"/>
+              </a:ext>
+            </a:extLst>
+          </a:blip>
+          <a:srcRect/>
+          <a:stretch/>
+        </p:blipFill>
+        <p:spPr>
+          <a:xfrm>
+            <a:off x="4096512" y="1247917"/>
+            <a:ext cx="394721" cy="402907"/>
+          </a:xfrm>
+          <a:prstGeom prst="rect">
+            <a:avLst/>
+          </a:prstGeom>
+        </p:spPr>
+      </p:pic>
+      <p:sp>
+        <p:nvSpPr>
+          <p:cNvPr id="36" name="Rectangle 35">
+            <a:extLst>
+              <a:ext uri="{FF2B5EF4-FFF2-40B4-BE49-F238E27FC236}">
+                <a16:creationId xmlns:a16="http://schemas.microsoft.com/office/drawing/2014/main" id="{74254B5D-06EE-4D28-BF05-5463D6F1933F}"/>
+              </a:ext>
+            </a:extLst>
+          </p:cNvPr>
+          <p:cNvSpPr/>
+          <p:nvPr/>
+        </p:nvSpPr>
+        <p:spPr>
+          <a:xfrm>
+            <a:off x="3568466" y="760396"/>
+            <a:ext cx="8686800" cy="5890661"/>
+          </a:xfrm>
+          <a:prstGeom prst="rect">
+            <a:avLst/>
+          </a:prstGeom>
+          <a:noFill/>
+          <a:ln w="12700">
+            <a:solidFill>
+              <a:schemeClr val="tx1"/>
+            </a:solidFill>
+          </a:ln>
+        </p:spPr>
+        <p:style>
+          <a:lnRef idx="2">
+            <a:schemeClr val="accent1">
+              <a:shade val="50000"/>
+            </a:schemeClr>
+          </a:lnRef>
+          <a:fillRef idx="1">
+            <a:schemeClr val="accent1"/>
+          </a:fillRef>
+          <a:effectRef idx="0">
+            <a:schemeClr val="accent1"/>
+          </a:effectRef>
+          <a:fontRef idx="minor">
+            <a:schemeClr val="lt1"/>
+          </a:fontRef>
+        </p:style>
+        <p:txBody>
+          <a:bodyPr lIns="502920" tIns="91440"/>
+          <a:lstStyle/>
+          <a:p>
+            <a:pPr eaLnBrk="1" fontAlgn="auto" hangingPunct="1">
+              <a:spcBef>
+                <a:spcPts val="0"/>
+              </a:spcBef>
+              <a:spcAft>
+                <a:spcPts val="0"/>
+              </a:spcAft>
+              <a:defRPr/>
+            </a:pPr>
+            <a:r>
+              <a:rPr lang="en-US" sz="1200" dirty="0">
+                <a:solidFill>
+                  <a:sysClr val="windowText" lastClr="000000"/>
+                </a:solidFill>
+                <a:latin typeface="Arial" panose="020B0604020202020204" pitchFamily="34" charset="0"/>
+                <a:cs typeface="Arial" panose="020B0604020202020204" pitchFamily="34" charset="0"/>
+              </a:rPr>
+              <a:t>AWS Cloud</a:t>
+            </a:r>
+          </a:p>
+        </p:txBody>
+      </p:sp>
+      <p:pic>
+        <p:nvPicPr>
+          <p:cNvPr id="37" name="Graphic 36">
+            <a:extLst>
+              <a:ext uri="{FF2B5EF4-FFF2-40B4-BE49-F238E27FC236}">
+                <a16:creationId xmlns:a16="http://schemas.microsoft.com/office/drawing/2014/main" id="{2D6102D5-A4A9-441A-BCF7-4334A91673C3}"/>
+              </a:ext>
+            </a:extLst>
+          </p:cNvPr>
+          <p:cNvPicPr>
+            <a:picLocks noChangeAspect="1"/>
+          </p:cNvPicPr>
+          <p:nvPr/>
+        </p:nvPicPr>
+        <p:blipFill>
+          <a:blip r:embed="rId11">
+            <a:extLst>
+              <a:ext uri="{96DAC541-7B7A-43D3-8B79-37D633B846F1}">
+                <asvg:svgBlip xmlns:asvg="http://schemas.microsoft.com/office/drawing/2016/SVG/main" r:embed="rId12"/>
+              </a:ext>
+            </a:extLst>
+          </a:blip>
+          <a:srcRect/>
+          <a:stretch/>
+        </p:blipFill>
+        <p:spPr>
+          <a:xfrm>
+            <a:off x="3568466" y="760396"/>
+            <a:ext cx="381000" cy="381000"/>
+          </a:xfrm>
+          <a:prstGeom prst="rect">
+            <a:avLst/>
+          </a:prstGeom>
+        </p:spPr>
+      </p:pic>
+      <p:cxnSp>
+        <p:nvCxnSpPr>
+          <p:cNvPr id="38" name="Straight Arrow Connector 37">
+            <a:extLst>
+              <a:ext uri="{FF2B5EF4-FFF2-40B4-BE49-F238E27FC236}">
+                <a16:creationId xmlns:a16="http://schemas.microsoft.com/office/drawing/2014/main" id="{4C7B26E6-6E20-4136-AD4B-39EBD0C9D317}"/>
+              </a:ext>
+            </a:extLst>
+          </p:cNvPr>
+          <p:cNvCxnSpPr>
+            <a:cxnSpLocks/>
+            <a:stCxn id="46" idx="3"/>
+            <a:endCxn id="49" idx="1"/>
+          </p:cNvCxnSpPr>
+          <p:nvPr/>
+        </p:nvCxnSpPr>
+        <p:spPr>
+          <a:xfrm>
+            <a:off x="2686775" y="3927348"/>
+            <a:ext cx="1922001" cy="0"/>
+          </a:xfrm>
+          <a:prstGeom prst="straightConnector1">
+            <a:avLst/>
+          </a:prstGeom>
+          <a:ln w="12700">
+            <a:solidFill>
+              <a:srgbClr val="545B64"/>
+            </a:solidFill>
+            <a:headEnd type="none" w="med" len="sm"/>
+            <a:tailEnd type="arrow" w="med" len="sm"/>
+          </a:ln>
+        </p:spPr>
+        <p:style>
+          <a:lnRef idx="1">
+            <a:schemeClr val="accent1"/>
+          </a:lnRef>
+          <a:fillRef idx="0">
+            <a:schemeClr val="accent1"/>
+          </a:fillRef>
+          <a:effectRef idx="0">
+            <a:schemeClr val="accent1"/>
+          </a:effectRef>
+          <a:fontRef idx="minor">
+            <a:schemeClr val="tx1"/>
+          </a:fontRef>
+        </p:style>
+      </p:cxnSp>
+      <p:sp>
+        <p:nvSpPr>
+          <p:cNvPr id="39" name="TextBox 20">
+            <a:extLst>
+              <a:ext uri="{FF2B5EF4-FFF2-40B4-BE49-F238E27FC236}">
+                <a16:creationId xmlns:a16="http://schemas.microsoft.com/office/drawing/2014/main" id="{013A152C-294B-480C-95FD-2B2A682FBA2F}"/>
+              </a:ext>
+            </a:extLst>
+          </p:cNvPr>
+          <p:cNvSpPr txBox="1">
+            <a:spLocks noChangeArrowheads="1"/>
+          </p:cNvSpPr>
+          <p:nvPr/>
+        </p:nvSpPr>
+        <p:spPr bwMode="auto">
+          <a:xfrm>
+            <a:off x="1989282" y="4206093"/>
+            <a:ext cx="939073" cy="461665"/>
+          </a:xfrm>
+          <a:prstGeom prst="rect">
+            <a:avLst/>
+          </a:prstGeom>
+          <a:noFill/>
+          <a:ln>
+            <a:noFill/>
+          </a:ln>
+          <a:extLst>
+            <a:ext uri="{909E8E84-426E-40DD-AFC4-6F175D3DCCD1}">
+              <a14:hiddenFill xmlns:a14="http://schemas.microsoft.com/office/drawing/2010/main">
+                <a:solidFill>
+                  <a:srgbClr val="FFFFFF"/>
+                </a:solidFill>
+              </a14:hiddenFill>
+            </a:ext>
+            <a:ext uri="{91240B29-F687-4F45-9708-019B960494DF}">
+              <a14:hiddenLine xmlns:a14="http://schemas.microsoft.com/office/drawing/2010/main" w="9525">
+                <a:solidFill>
+                  <a:srgbClr val="000000"/>
+                </a:solidFill>
+                <a:miter lim="800000"/>
+                <a:headEnd/>
+                <a:tailEnd/>
+              </a14:hiddenLine>
+            </a:ext>
+          </a:extLst>
+        </p:spPr>
+        <p:txBody>
+          <a:bodyPr wrap="square">
+            <a:spAutoFit/>
+          </a:bodyPr>
+          <a:lstStyle>
+            <a:lvl1pPr>
+              <a:defRPr>
+                <a:solidFill>
+                  <a:schemeClr val="tx1"/>
+                </a:solidFill>
+                <a:latin typeface="Calibri" panose="020F0502020204030204" pitchFamily="34" charset="0"/>
+              </a:defRPr>
+            </a:lvl1pPr>
+            <a:lvl2pPr marL="742950" indent="-285750">
+              <a:defRPr>
+                <a:solidFill>
+                  <a:schemeClr val="tx1"/>
+                </a:solidFill>
+                <a:latin typeface="Calibri" panose="020F0502020204030204" pitchFamily="34" charset="0"/>
+              </a:defRPr>
+            </a:lvl2pPr>
+            <a:lvl3pPr marL="1143000" indent="-228600">
+              <a:defRPr>
+                <a:solidFill>
+                  <a:schemeClr val="tx1"/>
+                </a:solidFill>
+                <a:latin typeface="Calibri" panose="020F0502020204030204" pitchFamily="34" charset="0"/>
+              </a:defRPr>
+            </a:lvl3pPr>
+            <a:lvl4pPr marL="1600200" indent="-228600">
+              <a:defRPr>
+                <a:solidFill>
+                  <a:schemeClr val="tx1"/>
+                </a:solidFill>
+                <a:latin typeface="Calibri" panose="020F0502020204030204" pitchFamily="34" charset="0"/>
+              </a:defRPr>
+            </a:lvl4pPr>
+            <a:lvl5pPr marL="2057400" indent="-228600">
+              <a:defRPr>
+                <a:solidFill>
+                  <a:schemeClr val="tx1"/>
+                </a:solidFill>
+                <a:latin typeface="Calibri" panose="020F0502020204030204" pitchFamily="34" charset="0"/>
+              </a:defRPr>
+            </a:lvl5pPr>
+            <a:lvl6pPr marL="2514600" indent="-228600" eaLnBrk="0" fontAlgn="base" hangingPunct="0">
+              <a:spcBef>
+                <a:spcPct val="0"/>
+              </a:spcBef>
+              <a:spcAft>
+                <a:spcPct val="0"/>
+              </a:spcAft>
+              <a:defRPr>
+                <a:solidFill>
+                  <a:schemeClr val="tx1"/>
+                </a:solidFill>
+                <a:latin typeface="Calibri" panose="020F0502020204030204" pitchFamily="34" charset="0"/>
+              </a:defRPr>
+            </a:lvl6pPr>
+            <a:lvl7pPr marL="2971800" indent="-228600" eaLnBrk="0" fontAlgn="base" hangingPunct="0">
+              <a:spcBef>
+                <a:spcPct val="0"/>
+              </a:spcBef>
+              <a:spcAft>
+                <a:spcPct val="0"/>
+              </a:spcAft>
+              <a:defRPr>
+                <a:solidFill>
+                  <a:schemeClr val="tx1"/>
+                </a:solidFill>
+                <a:latin typeface="Calibri" panose="020F0502020204030204" pitchFamily="34" charset="0"/>
+              </a:defRPr>
+            </a:lvl7pPr>
+            <a:lvl8pPr marL="3429000" indent="-228600" eaLnBrk="0" fontAlgn="base" hangingPunct="0">
+              <a:spcBef>
+                <a:spcPct val="0"/>
+              </a:spcBef>
+              <a:spcAft>
+                <a:spcPct val="0"/>
+              </a:spcAft>
+              <a:defRPr>
+                <a:solidFill>
+                  <a:schemeClr val="tx1"/>
+                </a:solidFill>
+                <a:latin typeface="Calibri" panose="020F0502020204030204" pitchFamily="34" charset="0"/>
+              </a:defRPr>
+            </a:lvl8pPr>
+            <a:lvl9pPr marL="3886200" indent="-228600" eaLnBrk="0" fontAlgn="base" hangingPunct="0">
+              <a:spcBef>
+                <a:spcPct val="0"/>
+              </a:spcBef>
+              <a:spcAft>
+                <a:spcPct val="0"/>
+              </a:spcAft>
+              <a:defRPr>
+                <a:solidFill>
+                  <a:schemeClr val="tx1"/>
+                </a:solidFill>
+                <a:latin typeface="Calibri" panose="020F0502020204030204" pitchFamily="34" charset="0"/>
+              </a:defRPr>
+            </a:lvl9pPr>
+          </a:lstStyle>
+          <a:p>
+            <a:pPr algn="ctr" eaLnBrk="1" hangingPunct="1"/>
+            <a:r>
+              <a:rPr lang="en-US" altLang="en-US" sz="1200" dirty="0">
+                <a:latin typeface="Arial" panose="020B0604020202020204" pitchFamily="34" charset="0"/>
+                <a:ea typeface="Amazon Ember" panose="020B0603020204020204" pitchFamily="34" charset="0"/>
+                <a:cs typeface="Arial" panose="020B0604020202020204" pitchFamily="34" charset="0"/>
+              </a:rPr>
+              <a:t>GitHub</a:t>
+            </a:r>
+          </a:p>
+          <a:p>
+            <a:pPr algn="ctr" eaLnBrk="1" hangingPunct="1"/>
+            <a:r>
+              <a:rPr lang="en-US" altLang="en-US" sz="1200" dirty="0">
+                <a:latin typeface="Arial" panose="020B0604020202020204" pitchFamily="34" charset="0"/>
+                <a:ea typeface="Amazon Ember" panose="020B0603020204020204" pitchFamily="34" charset="0"/>
+                <a:cs typeface="Arial" panose="020B0604020202020204" pitchFamily="34" charset="0"/>
+              </a:rPr>
+              <a:t>repository</a:t>
+            </a:r>
+          </a:p>
+        </p:txBody>
+      </p:sp>
+      <p:pic>
+        <p:nvPicPr>
+          <p:cNvPr id="40" name="Graphic 23">
+            <a:extLst>
+              <a:ext uri="{FF2B5EF4-FFF2-40B4-BE49-F238E27FC236}">
+                <a16:creationId xmlns:a16="http://schemas.microsoft.com/office/drawing/2014/main" id="{05320C7C-70AD-4AF3-9D3F-EEA5DF1F0111}"/>
+              </a:ext>
+            </a:extLst>
+          </p:cNvPr>
+          <p:cNvPicPr>
+            <a:picLocks noChangeAspect="1" noChangeArrowheads="1"/>
+          </p:cNvPicPr>
+          <p:nvPr/>
+        </p:nvPicPr>
+        <p:blipFill>
+          <a:blip r:embed="rId13">
+            <a:extLst>
+              <a:ext uri="{96DAC541-7B7A-43D3-8B79-37D633B846F1}">
+                <asvg:svgBlip xmlns:asvg="http://schemas.microsoft.com/office/drawing/2016/SVG/main" r:embed="rId14"/>
+              </a:ext>
+            </a:extLst>
+          </a:blip>
+          <a:srcRect/>
+          <a:stretch/>
+        </p:blipFill>
+        <p:spPr bwMode="auto">
+          <a:xfrm flipH="1">
+            <a:off x="874327" y="3692398"/>
+            <a:ext cx="469900" cy="469900"/>
+          </a:xfrm>
+          <a:prstGeom prst="rect">
+            <a:avLst/>
+          </a:prstGeom>
+          <a:noFill/>
+          <a:ln>
+            <a:noFill/>
+          </a:ln>
+          <a:extLst>
+            <a:ext uri="{909E8E84-426E-40DD-AFC4-6F175D3DCCD1}">
+              <a14:hiddenFill xmlns:a14="http://schemas.microsoft.com/office/drawing/2010/main">
+                <a:solidFill>
+                  <a:srgbClr val="FFFFFF"/>
+                </a:solidFill>
+              </a14:hiddenFill>
+            </a:ext>
+            <a:ext uri="{91240B29-F687-4F45-9708-019B960494DF}">
+              <a14:hiddenLine xmlns:a14="http://schemas.microsoft.com/office/drawing/2010/main" w="9525">
+                <a:solidFill>
+                  <a:srgbClr val="000000"/>
+                </a:solidFill>
+                <a:miter lim="800000"/>
+                <a:headEnd/>
+                <a:tailEnd/>
+              </a14:hiddenLine>
+            </a:ext>
+          </a:extLst>
+        </p:spPr>
+      </p:pic>
+      <p:sp>
+        <p:nvSpPr>
+          <p:cNvPr id="41" name="TextBox 40">
+            <a:extLst>
+              <a:ext uri="{FF2B5EF4-FFF2-40B4-BE49-F238E27FC236}">
+                <a16:creationId xmlns:a16="http://schemas.microsoft.com/office/drawing/2014/main" id="{9C2B69EE-E239-42DB-84F2-5CF39597B3E7}"/>
+              </a:ext>
+            </a:extLst>
+          </p:cNvPr>
+          <p:cNvSpPr txBox="1">
+            <a:spLocks noChangeArrowheads="1"/>
+          </p:cNvSpPr>
+          <p:nvPr/>
+        </p:nvSpPr>
+        <p:spPr bwMode="auto">
+          <a:xfrm>
+            <a:off x="578405" y="4206093"/>
+            <a:ext cx="1073150" cy="261610"/>
+          </a:xfrm>
+          <a:prstGeom prst="rect">
+            <a:avLst/>
+          </a:prstGeom>
+          <a:noFill/>
+          <a:ln>
+            <a:noFill/>
+          </a:ln>
+          <a:extLst>
+            <a:ext uri="{909E8E84-426E-40DD-AFC4-6F175D3DCCD1}">
+              <a14:hiddenFill xmlns:a14="http://schemas.microsoft.com/office/drawing/2010/main">
+                <a:solidFill>
+                  <a:srgbClr val="FFFFFF"/>
+                </a:solidFill>
+              </a14:hiddenFill>
+            </a:ext>
+            <a:ext uri="{91240B29-F687-4F45-9708-019B960494DF}">
+              <a14:hiddenLine xmlns:a14="http://schemas.microsoft.com/office/drawing/2010/main" w="9525">
+                <a:solidFill>
+                  <a:srgbClr val="000000"/>
+                </a:solidFill>
+                <a:miter lim="800000"/>
+                <a:headEnd/>
+                <a:tailEnd/>
+              </a14:hiddenLine>
+            </a:ext>
+          </a:extLst>
+        </p:spPr>
+        <p:txBody>
+          <a:bodyPr>
+            <a:spAutoFit/>
+          </a:bodyPr>
+          <a:lstStyle>
+            <a:lvl1pPr>
+              <a:defRPr>
+                <a:solidFill>
+                  <a:schemeClr val="tx1"/>
+                </a:solidFill>
+                <a:latin typeface="Calibri" panose="020F0502020204030204" pitchFamily="34" charset="0"/>
+              </a:defRPr>
+            </a:lvl1pPr>
+            <a:lvl2pPr marL="742950" indent="-285750">
+              <a:defRPr>
+                <a:solidFill>
+                  <a:schemeClr val="tx1"/>
+                </a:solidFill>
+                <a:latin typeface="Calibri" panose="020F0502020204030204" pitchFamily="34" charset="0"/>
+              </a:defRPr>
+            </a:lvl2pPr>
+            <a:lvl3pPr marL="1143000" indent="-228600">
+              <a:defRPr>
+                <a:solidFill>
+                  <a:schemeClr val="tx1"/>
+                </a:solidFill>
+                <a:latin typeface="Calibri" panose="020F0502020204030204" pitchFamily="34" charset="0"/>
+              </a:defRPr>
+            </a:lvl3pPr>
+            <a:lvl4pPr marL="1600200" indent="-228600">
+              <a:defRPr>
+                <a:solidFill>
+                  <a:schemeClr val="tx1"/>
+                </a:solidFill>
+                <a:latin typeface="Calibri" panose="020F0502020204030204" pitchFamily="34" charset="0"/>
+              </a:defRPr>
+            </a:lvl4pPr>
+            <a:lvl5pPr marL="2057400" indent="-228600">
+              <a:defRPr>
+                <a:solidFill>
+                  <a:schemeClr val="tx1"/>
+                </a:solidFill>
+                <a:latin typeface="Calibri" panose="020F0502020204030204" pitchFamily="34" charset="0"/>
+              </a:defRPr>
+            </a:lvl5pPr>
+            <a:lvl6pPr marL="2514600" indent="-228600" eaLnBrk="0" fontAlgn="base" hangingPunct="0">
+              <a:spcBef>
+                <a:spcPct val="0"/>
+              </a:spcBef>
+              <a:spcAft>
+                <a:spcPct val="0"/>
+              </a:spcAft>
+              <a:defRPr>
+                <a:solidFill>
+                  <a:schemeClr val="tx1"/>
+                </a:solidFill>
+                <a:latin typeface="Calibri" panose="020F0502020204030204" pitchFamily="34" charset="0"/>
+              </a:defRPr>
+            </a:lvl6pPr>
+            <a:lvl7pPr marL="2971800" indent="-228600" eaLnBrk="0" fontAlgn="base" hangingPunct="0">
+              <a:spcBef>
+                <a:spcPct val="0"/>
+              </a:spcBef>
+              <a:spcAft>
+                <a:spcPct val="0"/>
+              </a:spcAft>
+              <a:defRPr>
+                <a:solidFill>
+                  <a:schemeClr val="tx1"/>
+                </a:solidFill>
+                <a:latin typeface="Calibri" panose="020F0502020204030204" pitchFamily="34" charset="0"/>
+              </a:defRPr>
+            </a:lvl7pPr>
+            <a:lvl8pPr marL="3429000" indent="-228600" eaLnBrk="0" fontAlgn="base" hangingPunct="0">
+              <a:spcBef>
+                <a:spcPct val="0"/>
+              </a:spcBef>
+              <a:spcAft>
+                <a:spcPct val="0"/>
+              </a:spcAft>
+              <a:defRPr>
+                <a:solidFill>
+                  <a:schemeClr val="tx1"/>
+                </a:solidFill>
+                <a:latin typeface="Calibri" panose="020F0502020204030204" pitchFamily="34" charset="0"/>
+              </a:defRPr>
+            </a:lvl8pPr>
+            <a:lvl9pPr marL="3886200" indent="-228600" eaLnBrk="0" fontAlgn="base" hangingPunct="0">
+              <a:spcBef>
+                <a:spcPct val="0"/>
+              </a:spcBef>
+              <a:spcAft>
+                <a:spcPct val="0"/>
+              </a:spcAft>
+              <a:defRPr>
+                <a:solidFill>
+                  <a:schemeClr val="tx1"/>
+                </a:solidFill>
+                <a:latin typeface="Calibri" panose="020F0502020204030204" pitchFamily="34" charset="0"/>
+              </a:defRPr>
+            </a:lvl9pPr>
+          </a:lstStyle>
+          <a:p>
+            <a:pPr algn="ctr" eaLnBrk="1" hangingPunct="1"/>
+            <a:r>
+              <a:rPr lang="en-US" altLang="en-US" sz="1100" dirty="0">
+                <a:solidFill>
+                  <a:srgbClr val="000000"/>
+                </a:solidFill>
+                <a:latin typeface="Arial" panose="020B0604020202020204" pitchFamily="34" charset="0"/>
+                <a:cs typeface="Arial" panose="020B0604020202020204" pitchFamily="34" charset="0"/>
+              </a:rPr>
+              <a:t>Git users</a:t>
+            </a:r>
+          </a:p>
+        </p:txBody>
+      </p:sp>
+      <p:cxnSp>
+        <p:nvCxnSpPr>
+          <p:cNvPr id="42" name="Straight Arrow Connector 41">
+            <a:extLst>
+              <a:ext uri="{FF2B5EF4-FFF2-40B4-BE49-F238E27FC236}">
+                <a16:creationId xmlns:a16="http://schemas.microsoft.com/office/drawing/2014/main" id="{57637A97-C9A1-4A61-8B35-F773AB513875}"/>
+              </a:ext>
+            </a:extLst>
+          </p:cNvPr>
+          <p:cNvCxnSpPr>
+            <a:cxnSpLocks/>
+            <a:stCxn id="40" idx="1"/>
+            <a:endCxn id="46" idx="1"/>
+          </p:cNvCxnSpPr>
+          <p:nvPr/>
+        </p:nvCxnSpPr>
+        <p:spPr>
+          <a:xfrm>
+            <a:off x="1344227" y="3927348"/>
+            <a:ext cx="872648" cy="0"/>
+          </a:xfrm>
+          <a:prstGeom prst="straightConnector1">
+            <a:avLst/>
+          </a:prstGeom>
+          <a:ln w="12700">
+            <a:solidFill>
+              <a:srgbClr val="545B64"/>
+            </a:solidFill>
+            <a:headEnd type="none" w="med" len="sm"/>
+            <a:tailEnd type="arrow" w="med" len="sm"/>
+          </a:ln>
+        </p:spPr>
+        <p:style>
+          <a:lnRef idx="1">
+            <a:schemeClr val="accent1"/>
+          </a:lnRef>
+          <a:fillRef idx="0">
+            <a:schemeClr val="accent1"/>
+          </a:fillRef>
+          <a:effectRef idx="0">
+            <a:schemeClr val="accent1"/>
+          </a:effectRef>
+          <a:fontRef idx="minor">
+            <a:schemeClr val="tx1"/>
+          </a:fontRef>
+        </p:style>
+      </p:cxnSp>
+      <p:sp>
+        <p:nvSpPr>
+          <p:cNvPr id="43" name="TextBox 40">
+            <a:extLst>
+              <a:ext uri="{FF2B5EF4-FFF2-40B4-BE49-F238E27FC236}">
+                <a16:creationId xmlns:a16="http://schemas.microsoft.com/office/drawing/2014/main" id="{3C11B670-9716-4D55-A4AB-88DE0B42C8A1}"/>
+              </a:ext>
+            </a:extLst>
+          </p:cNvPr>
+          <p:cNvSpPr txBox="1">
+            <a:spLocks noChangeArrowheads="1"/>
+          </p:cNvSpPr>
+          <p:nvPr/>
+        </p:nvSpPr>
+        <p:spPr bwMode="auto">
+          <a:xfrm>
+            <a:off x="1209197" y="3659711"/>
+            <a:ext cx="1073150" cy="261610"/>
+          </a:xfrm>
+          <a:prstGeom prst="rect">
+            <a:avLst/>
+          </a:prstGeom>
+          <a:noFill/>
+          <a:ln>
+            <a:noFill/>
+          </a:ln>
+          <a:extLst>
+            <a:ext uri="{909E8E84-426E-40DD-AFC4-6F175D3DCCD1}">
+              <a14:hiddenFill xmlns:a14="http://schemas.microsoft.com/office/drawing/2010/main">
+                <a:solidFill>
+                  <a:srgbClr val="FFFFFF"/>
+                </a:solidFill>
+              </a14:hiddenFill>
+            </a:ext>
+            <a:ext uri="{91240B29-F687-4F45-9708-019B960494DF}">
+              <a14:hiddenLine xmlns:a14="http://schemas.microsoft.com/office/drawing/2010/main" w="9525">
+                <a:solidFill>
+                  <a:srgbClr val="000000"/>
+                </a:solidFill>
+                <a:miter lim="800000"/>
+                <a:headEnd/>
+                <a:tailEnd/>
+              </a14:hiddenLine>
+            </a:ext>
+          </a:extLst>
+        </p:spPr>
+        <p:txBody>
+          <a:bodyPr>
+            <a:spAutoFit/>
+          </a:bodyPr>
+          <a:lstStyle>
+            <a:lvl1pPr>
+              <a:defRPr>
+                <a:solidFill>
+                  <a:schemeClr val="tx1"/>
+                </a:solidFill>
+                <a:latin typeface="Calibri" panose="020F0502020204030204" pitchFamily="34" charset="0"/>
+              </a:defRPr>
+            </a:lvl1pPr>
+            <a:lvl2pPr marL="742950" indent="-285750">
+              <a:defRPr>
+                <a:solidFill>
+                  <a:schemeClr val="tx1"/>
+                </a:solidFill>
+                <a:latin typeface="Calibri" panose="020F0502020204030204" pitchFamily="34" charset="0"/>
+              </a:defRPr>
+            </a:lvl2pPr>
+            <a:lvl3pPr marL="1143000" indent="-228600">
+              <a:defRPr>
+                <a:solidFill>
+                  <a:schemeClr val="tx1"/>
+                </a:solidFill>
+                <a:latin typeface="Calibri" panose="020F0502020204030204" pitchFamily="34" charset="0"/>
+              </a:defRPr>
+            </a:lvl3pPr>
+            <a:lvl4pPr marL="1600200" indent="-228600">
+              <a:defRPr>
+                <a:solidFill>
+                  <a:schemeClr val="tx1"/>
+                </a:solidFill>
+                <a:latin typeface="Calibri" panose="020F0502020204030204" pitchFamily="34" charset="0"/>
+              </a:defRPr>
+            </a:lvl4pPr>
+            <a:lvl5pPr marL="2057400" indent="-228600">
+              <a:defRPr>
+                <a:solidFill>
+                  <a:schemeClr val="tx1"/>
+                </a:solidFill>
+                <a:latin typeface="Calibri" panose="020F0502020204030204" pitchFamily="34" charset="0"/>
+              </a:defRPr>
+            </a:lvl5pPr>
+            <a:lvl6pPr marL="2514600" indent="-228600" eaLnBrk="0" fontAlgn="base" hangingPunct="0">
+              <a:spcBef>
+                <a:spcPct val="0"/>
+              </a:spcBef>
+              <a:spcAft>
+                <a:spcPct val="0"/>
+              </a:spcAft>
+              <a:defRPr>
+                <a:solidFill>
+                  <a:schemeClr val="tx1"/>
+                </a:solidFill>
+                <a:latin typeface="Calibri" panose="020F0502020204030204" pitchFamily="34" charset="0"/>
+              </a:defRPr>
+            </a:lvl6pPr>
+            <a:lvl7pPr marL="2971800" indent="-228600" eaLnBrk="0" fontAlgn="base" hangingPunct="0">
+              <a:spcBef>
+                <a:spcPct val="0"/>
+              </a:spcBef>
+              <a:spcAft>
+                <a:spcPct val="0"/>
+              </a:spcAft>
+              <a:defRPr>
+                <a:solidFill>
+                  <a:schemeClr val="tx1"/>
+                </a:solidFill>
+                <a:latin typeface="Calibri" panose="020F0502020204030204" pitchFamily="34" charset="0"/>
+              </a:defRPr>
+            </a:lvl7pPr>
+            <a:lvl8pPr marL="3429000" indent="-228600" eaLnBrk="0" fontAlgn="base" hangingPunct="0">
+              <a:spcBef>
+                <a:spcPct val="0"/>
+              </a:spcBef>
+              <a:spcAft>
+                <a:spcPct val="0"/>
+              </a:spcAft>
+              <a:defRPr>
+                <a:solidFill>
+                  <a:schemeClr val="tx1"/>
+                </a:solidFill>
+                <a:latin typeface="Calibri" panose="020F0502020204030204" pitchFamily="34" charset="0"/>
+              </a:defRPr>
+            </a:lvl8pPr>
+            <a:lvl9pPr marL="3886200" indent="-228600" eaLnBrk="0" fontAlgn="base" hangingPunct="0">
+              <a:spcBef>
+                <a:spcPct val="0"/>
+              </a:spcBef>
+              <a:spcAft>
+                <a:spcPct val="0"/>
+              </a:spcAft>
+              <a:defRPr>
+                <a:solidFill>
+                  <a:schemeClr val="tx1"/>
+                </a:solidFill>
+                <a:latin typeface="Calibri" panose="020F0502020204030204" pitchFamily="34" charset="0"/>
+              </a:defRPr>
+            </a:lvl9pPr>
+          </a:lstStyle>
+          <a:p>
+            <a:pPr algn="ctr" eaLnBrk="1" hangingPunct="1"/>
+            <a:r>
+              <a:rPr lang="en-US" altLang="en-US" sz="1100" i="1" dirty="0">
+                <a:solidFill>
+                  <a:srgbClr val="000000"/>
+                </a:solidFill>
+                <a:latin typeface="Arial" panose="020B0604020202020204" pitchFamily="34" charset="0"/>
+                <a:cs typeface="Arial" panose="020B0604020202020204" pitchFamily="34" charset="0"/>
+              </a:rPr>
+              <a:t>Git push</a:t>
+            </a:r>
+          </a:p>
+        </p:txBody>
+      </p:sp>
+      <p:sp>
+        <p:nvSpPr>
+          <p:cNvPr id="44" name="TextBox 40">
+            <a:extLst>
+              <a:ext uri="{FF2B5EF4-FFF2-40B4-BE49-F238E27FC236}">
+                <a16:creationId xmlns:a16="http://schemas.microsoft.com/office/drawing/2014/main" id="{8034EF50-177D-47CA-8045-C48596BC2495}"/>
+              </a:ext>
+            </a:extLst>
+          </p:cNvPr>
+          <p:cNvSpPr txBox="1">
+            <a:spLocks noChangeArrowheads="1"/>
+          </p:cNvSpPr>
+          <p:nvPr/>
+        </p:nvSpPr>
+        <p:spPr bwMode="auto">
+          <a:xfrm>
+            <a:off x="2554405" y="3662143"/>
+            <a:ext cx="1073150" cy="261610"/>
+          </a:xfrm>
+          <a:prstGeom prst="rect">
+            <a:avLst/>
+          </a:prstGeom>
+          <a:noFill/>
+          <a:ln>
+            <a:noFill/>
+          </a:ln>
+          <a:extLst>
+            <a:ext uri="{909E8E84-426E-40DD-AFC4-6F175D3DCCD1}">
+              <a14:hiddenFill xmlns:a14="http://schemas.microsoft.com/office/drawing/2010/main">
+                <a:solidFill>
+                  <a:srgbClr val="FFFFFF"/>
+                </a:solidFill>
+              </a14:hiddenFill>
+            </a:ext>
+            <a:ext uri="{91240B29-F687-4F45-9708-019B960494DF}">
+              <a14:hiddenLine xmlns:a14="http://schemas.microsoft.com/office/drawing/2010/main" w="9525">
+                <a:solidFill>
+                  <a:srgbClr val="000000"/>
+                </a:solidFill>
+                <a:miter lim="800000"/>
+                <a:headEnd/>
+                <a:tailEnd/>
+              </a14:hiddenLine>
+            </a:ext>
+          </a:extLst>
+        </p:spPr>
+        <p:txBody>
+          <a:bodyPr>
+            <a:spAutoFit/>
+          </a:bodyPr>
+          <a:lstStyle>
+            <a:lvl1pPr>
+              <a:defRPr>
+                <a:solidFill>
+                  <a:schemeClr val="tx1"/>
+                </a:solidFill>
+                <a:latin typeface="Calibri" panose="020F0502020204030204" pitchFamily="34" charset="0"/>
+              </a:defRPr>
+            </a:lvl1pPr>
+            <a:lvl2pPr marL="742950" indent="-285750">
+              <a:defRPr>
+                <a:solidFill>
+                  <a:schemeClr val="tx1"/>
+                </a:solidFill>
+                <a:latin typeface="Calibri" panose="020F0502020204030204" pitchFamily="34" charset="0"/>
+              </a:defRPr>
+            </a:lvl2pPr>
+            <a:lvl3pPr marL="1143000" indent="-228600">
+              <a:defRPr>
+                <a:solidFill>
+                  <a:schemeClr val="tx1"/>
+                </a:solidFill>
+                <a:latin typeface="Calibri" panose="020F0502020204030204" pitchFamily="34" charset="0"/>
+              </a:defRPr>
+            </a:lvl3pPr>
+            <a:lvl4pPr marL="1600200" indent="-228600">
+              <a:defRPr>
+                <a:solidFill>
+                  <a:schemeClr val="tx1"/>
+                </a:solidFill>
+                <a:latin typeface="Calibri" panose="020F0502020204030204" pitchFamily="34" charset="0"/>
+              </a:defRPr>
+            </a:lvl4pPr>
+            <a:lvl5pPr marL="2057400" indent="-228600">
+              <a:defRPr>
+                <a:solidFill>
+                  <a:schemeClr val="tx1"/>
+                </a:solidFill>
+                <a:latin typeface="Calibri" panose="020F0502020204030204" pitchFamily="34" charset="0"/>
+              </a:defRPr>
+            </a:lvl5pPr>
+            <a:lvl6pPr marL="2514600" indent="-228600" eaLnBrk="0" fontAlgn="base" hangingPunct="0">
+              <a:spcBef>
+                <a:spcPct val="0"/>
+              </a:spcBef>
+              <a:spcAft>
+                <a:spcPct val="0"/>
+              </a:spcAft>
+              <a:defRPr>
+                <a:solidFill>
+                  <a:schemeClr val="tx1"/>
+                </a:solidFill>
+                <a:latin typeface="Calibri" panose="020F0502020204030204" pitchFamily="34" charset="0"/>
+              </a:defRPr>
+            </a:lvl6pPr>
+            <a:lvl7pPr marL="2971800" indent="-228600" eaLnBrk="0" fontAlgn="base" hangingPunct="0">
+              <a:spcBef>
+                <a:spcPct val="0"/>
+              </a:spcBef>
+              <a:spcAft>
+                <a:spcPct val="0"/>
+              </a:spcAft>
+              <a:defRPr>
+                <a:solidFill>
+                  <a:schemeClr val="tx1"/>
+                </a:solidFill>
+                <a:latin typeface="Calibri" panose="020F0502020204030204" pitchFamily="34" charset="0"/>
+              </a:defRPr>
+            </a:lvl7pPr>
+            <a:lvl8pPr marL="3429000" indent="-228600" eaLnBrk="0" fontAlgn="base" hangingPunct="0">
+              <a:spcBef>
+                <a:spcPct val="0"/>
+              </a:spcBef>
+              <a:spcAft>
+                <a:spcPct val="0"/>
+              </a:spcAft>
+              <a:defRPr>
+                <a:solidFill>
+                  <a:schemeClr val="tx1"/>
+                </a:solidFill>
+                <a:latin typeface="Calibri" panose="020F0502020204030204" pitchFamily="34" charset="0"/>
+              </a:defRPr>
+            </a:lvl8pPr>
+            <a:lvl9pPr marL="3886200" indent="-228600" eaLnBrk="0" fontAlgn="base" hangingPunct="0">
+              <a:spcBef>
+                <a:spcPct val="0"/>
+              </a:spcBef>
+              <a:spcAft>
+                <a:spcPct val="0"/>
+              </a:spcAft>
+              <a:defRPr>
+                <a:solidFill>
+                  <a:schemeClr val="tx1"/>
+                </a:solidFill>
+                <a:latin typeface="Calibri" panose="020F0502020204030204" pitchFamily="34" charset="0"/>
+              </a:defRPr>
+            </a:lvl9pPr>
+          </a:lstStyle>
+          <a:p>
+            <a:pPr algn="ctr" eaLnBrk="1" hangingPunct="1"/>
+            <a:r>
+              <a:rPr lang="en-US" altLang="en-US" sz="1100" i="1" dirty="0">
+                <a:solidFill>
+                  <a:srgbClr val="000000"/>
+                </a:solidFill>
+                <a:latin typeface="Arial" panose="020B0604020202020204" pitchFamily="34" charset="0"/>
+                <a:cs typeface="Arial" panose="020B0604020202020204" pitchFamily="34" charset="0"/>
+              </a:rPr>
+              <a:t>Git webhook</a:t>
+            </a:r>
+          </a:p>
+        </p:txBody>
+      </p:sp>
+      <p:cxnSp>
+        <p:nvCxnSpPr>
+          <p:cNvPr id="45" name="Connector: Elbow 44">
+            <a:extLst>
+              <a:ext uri="{FF2B5EF4-FFF2-40B4-BE49-F238E27FC236}">
+                <a16:creationId xmlns:a16="http://schemas.microsoft.com/office/drawing/2014/main" id="{CFF48790-94C8-477D-8A56-B300936E5E23}"/>
+              </a:ext>
+            </a:extLst>
+          </p:cNvPr>
+          <p:cNvCxnSpPr>
+            <a:cxnSpLocks/>
+            <a:stCxn id="23" idx="2"/>
+            <a:endCxn id="39" idx="2"/>
+          </p:cNvCxnSpPr>
+          <p:nvPr/>
+        </p:nvCxnSpPr>
+        <p:spPr>
+          <a:xfrm rot="5400000">
+            <a:off x="6565773" y="453935"/>
+            <a:ext cx="106870" cy="8320777"/>
+          </a:xfrm>
+          <a:prstGeom prst="bentConnector3">
+            <a:avLst>
+              <a:gd name="adj1" fmla="val 2277328"/>
+            </a:avLst>
+          </a:prstGeom>
+          <a:ln w="12700">
+            <a:solidFill>
+              <a:srgbClr val="545B64"/>
+            </a:solidFill>
+            <a:tailEnd type="arrow" w="med" len="sm"/>
+          </a:ln>
+        </p:spPr>
+        <p:style>
+          <a:lnRef idx="1">
+            <a:schemeClr val="accent1"/>
+          </a:lnRef>
+          <a:fillRef idx="0">
+            <a:schemeClr val="accent1"/>
+          </a:fillRef>
+          <a:effectRef idx="0">
+            <a:schemeClr val="accent1"/>
+          </a:effectRef>
+          <a:fontRef idx="minor">
+            <a:schemeClr val="tx1"/>
+          </a:fontRef>
+        </p:style>
+      </p:cxnSp>
+      <p:pic>
+        <p:nvPicPr>
+          <p:cNvPr id="46" name="Graphic 14">
+            <a:extLst>
+              <a:ext uri="{FF2B5EF4-FFF2-40B4-BE49-F238E27FC236}">
+                <a16:creationId xmlns:a16="http://schemas.microsoft.com/office/drawing/2014/main" id="{3BD5CDA9-C199-418F-9D87-469A520CD327}"/>
+              </a:ext>
+            </a:extLst>
+          </p:cNvPr>
+          <p:cNvPicPr>
+            <a:picLocks noChangeAspect="1" noChangeArrowheads="1"/>
+          </p:cNvPicPr>
+          <p:nvPr/>
+        </p:nvPicPr>
+        <p:blipFill>
+          <a:blip r:embed="rId15">
+            <a:extLst>
+              <a:ext uri="{96DAC541-7B7A-43D3-8B79-37D633B846F1}">
+                <asvg:svgBlip xmlns:asvg="http://schemas.microsoft.com/office/drawing/2016/SVG/main" r:embed="rId16"/>
+              </a:ext>
+            </a:extLst>
+          </a:blip>
+          <a:srcRect/>
+          <a:stretch/>
+        </p:blipFill>
+        <p:spPr bwMode="auto">
+          <a:xfrm>
+            <a:off x="2216875" y="3692398"/>
+            <a:ext cx="469900" cy="469900"/>
+          </a:xfrm>
+          <a:prstGeom prst="rect">
+            <a:avLst/>
+          </a:prstGeom>
+          <a:noFill/>
+          <a:ln>
+            <a:noFill/>
+          </a:ln>
+          <a:extLst>
+            <a:ext uri="{909E8E84-426E-40DD-AFC4-6F175D3DCCD1}">
+              <a14:hiddenFill xmlns:a14="http://schemas.microsoft.com/office/drawing/2010/main">
+                <a:solidFill>
+                  <a:srgbClr val="FFFFFF"/>
+                </a:solidFill>
+              </a14:hiddenFill>
+            </a:ext>
+            <a:ext uri="{91240B29-F687-4F45-9708-019B960494DF}">
+              <a14:hiddenLine xmlns:a14="http://schemas.microsoft.com/office/drawing/2010/main" w="9525">
+                <a:solidFill>
+                  <a:srgbClr val="000000"/>
+                </a:solidFill>
+                <a:miter lim="800000"/>
+                <a:headEnd/>
+                <a:tailEnd/>
+              </a14:hiddenLine>
+            </a:ext>
+          </a:extLst>
+        </p:spPr>
+      </p:pic>
+      <p:sp>
+        <p:nvSpPr>
+          <p:cNvPr id="51" name="TextBox 40">
+            <a:extLst>
+              <a:ext uri="{FF2B5EF4-FFF2-40B4-BE49-F238E27FC236}">
+                <a16:creationId xmlns:a16="http://schemas.microsoft.com/office/drawing/2014/main" id="{847F1131-5875-46BE-BEDF-6084DDA599E3}"/>
+              </a:ext>
+            </a:extLst>
+          </p:cNvPr>
+          <p:cNvSpPr txBox="1">
+            <a:spLocks noChangeArrowheads="1"/>
+          </p:cNvSpPr>
+          <p:nvPr/>
+        </p:nvSpPr>
+        <p:spPr bwMode="auto">
+          <a:xfrm>
+            <a:off x="5923820" y="6732704"/>
+            <a:ext cx="1073150" cy="261610"/>
+          </a:xfrm>
+          <a:prstGeom prst="rect">
+            <a:avLst/>
+          </a:prstGeom>
+          <a:noFill/>
+          <a:ln>
+            <a:noFill/>
+          </a:ln>
+          <a:extLst>
+            <a:ext uri="{909E8E84-426E-40DD-AFC4-6F175D3DCCD1}">
+              <a14:hiddenFill xmlns:a14="http://schemas.microsoft.com/office/drawing/2010/main">
+                <a:solidFill>
+                  <a:srgbClr val="FFFFFF"/>
+                </a:solidFill>
+              </a14:hiddenFill>
+            </a:ext>
+            <a:ext uri="{91240B29-F687-4F45-9708-019B960494DF}">
+              <a14:hiddenLine xmlns:a14="http://schemas.microsoft.com/office/drawing/2010/main" w="9525">
+                <a:solidFill>
+                  <a:srgbClr val="000000"/>
+                </a:solidFill>
+                <a:miter lim="800000"/>
+                <a:headEnd/>
+                <a:tailEnd/>
+              </a14:hiddenLine>
+            </a:ext>
+          </a:extLst>
+        </p:spPr>
+        <p:txBody>
+          <a:bodyPr>
+            <a:spAutoFit/>
+          </a:bodyPr>
+          <a:lstStyle>
+            <a:lvl1pPr>
+              <a:defRPr>
+                <a:solidFill>
+                  <a:schemeClr val="tx1"/>
+                </a:solidFill>
+                <a:latin typeface="Calibri" panose="020F0502020204030204" pitchFamily="34" charset="0"/>
+              </a:defRPr>
+            </a:lvl1pPr>
+            <a:lvl2pPr marL="742950" indent="-285750">
+              <a:defRPr>
+                <a:solidFill>
+                  <a:schemeClr val="tx1"/>
+                </a:solidFill>
+                <a:latin typeface="Calibri" panose="020F0502020204030204" pitchFamily="34" charset="0"/>
+              </a:defRPr>
+            </a:lvl2pPr>
+            <a:lvl3pPr marL="1143000" indent="-228600">
+              <a:defRPr>
+                <a:solidFill>
+                  <a:schemeClr val="tx1"/>
+                </a:solidFill>
+                <a:latin typeface="Calibri" panose="020F0502020204030204" pitchFamily="34" charset="0"/>
+              </a:defRPr>
+            </a:lvl3pPr>
+            <a:lvl4pPr marL="1600200" indent="-228600">
+              <a:defRPr>
+                <a:solidFill>
+                  <a:schemeClr val="tx1"/>
+                </a:solidFill>
+                <a:latin typeface="Calibri" panose="020F0502020204030204" pitchFamily="34" charset="0"/>
+              </a:defRPr>
+            </a:lvl4pPr>
+            <a:lvl5pPr marL="2057400" indent="-228600">
+              <a:defRPr>
+                <a:solidFill>
+                  <a:schemeClr val="tx1"/>
+                </a:solidFill>
+                <a:latin typeface="Calibri" panose="020F0502020204030204" pitchFamily="34" charset="0"/>
+              </a:defRPr>
+            </a:lvl5pPr>
+            <a:lvl6pPr marL="2514600" indent="-228600" eaLnBrk="0" fontAlgn="base" hangingPunct="0">
+              <a:spcBef>
+                <a:spcPct val="0"/>
+              </a:spcBef>
+              <a:spcAft>
+                <a:spcPct val="0"/>
+              </a:spcAft>
+              <a:defRPr>
+                <a:solidFill>
+                  <a:schemeClr val="tx1"/>
+                </a:solidFill>
+                <a:latin typeface="Calibri" panose="020F0502020204030204" pitchFamily="34" charset="0"/>
+              </a:defRPr>
+            </a:lvl6pPr>
+            <a:lvl7pPr marL="2971800" indent="-228600" eaLnBrk="0" fontAlgn="base" hangingPunct="0">
+              <a:spcBef>
+                <a:spcPct val="0"/>
+              </a:spcBef>
+              <a:spcAft>
+                <a:spcPct val="0"/>
+              </a:spcAft>
+              <a:defRPr>
+                <a:solidFill>
+                  <a:schemeClr val="tx1"/>
+                </a:solidFill>
+                <a:latin typeface="Calibri" panose="020F0502020204030204" pitchFamily="34" charset="0"/>
+              </a:defRPr>
+            </a:lvl7pPr>
+            <a:lvl8pPr marL="3429000" indent="-228600" eaLnBrk="0" fontAlgn="base" hangingPunct="0">
+              <a:spcBef>
+                <a:spcPct val="0"/>
+              </a:spcBef>
+              <a:spcAft>
+                <a:spcPct val="0"/>
+              </a:spcAft>
+              <a:defRPr>
+                <a:solidFill>
+                  <a:schemeClr val="tx1"/>
+                </a:solidFill>
+                <a:latin typeface="Calibri" panose="020F0502020204030204" pitchFamily="34" charset="0"/>
+              </a:defRPr>
+            </a:lvl8pPr>
+            <a:lvl9pPr marL="3886200" indent="-228600" eaLnBrk="0" fontAlgn="base" hangingPunct="0">
+              <a:spcBef>
+                <a:spcPct val="0"/>
+              </a:spcBef>
+              <a:spcAft>
+                <a:spcPct val="0"/>
+              </a:spcAft>
+              <a:defRPr>
+                <a:solidFill>
+                  <a:schemeClr val="tx1"/>
+                </a:solidFill>
+                <a:latin typeface="Calibri" panose="020F0502020204030204" pitchFamily="34" charset="0"/>
+              </a:defRPr>
+            </a:lvl9pPr>
+          </a:lstStyle>
+          <a:p>
+            <a:pPr algn="ctr" eaLnBrk="1" hangingPunct="1"/>
+            <a:r>
+              <a:rPr lang="en-US" altLang="en-US" sz="1100" i="1" dirty="0">
+                <a:solidFill>
+                  <a:srgbClr val="000000"/>
+                </a:solidFill>
+                <a:latin typeface="Arial" panose="020B0604020202020204" pitchFamily="34" charset="0"/>
+                <a:cs typeface="Arial" panose="020B0604020202020204" pitchFamily="34" charset="0"/>
+              </a:rPr>
+              <a:t>Git merge</a:t>
+            </a:r>
+          </a:p>
+        </p:txBody>
+      </p:sp>
+      <p:sp>
+        <p:nvSpPr>
+          <p:cNvPr id="47" name="TextBox 20">
+            <a:extLst>
+              <a:ext uri="{FF2B5EF4-FFF2-40B4-BE49-F238E27FC236}">
+                <a16:creationId xmlns:a16="http://schemas.microsoft.com/office/drawing/2014/main" id="{F1D56B38-82F8-490E-9F38-6DA9DAEB602A}"/>
+              </a:ext>
+            </a:extLst>
+          </p:cNvPr>
+          <p:cNvSpPr txBox="1">
+            <a:spLocks noChangeArrowheads="1"/>
+          </p:cNvSpPr>
+          <p:nvPr/>
+        </p:nvSpPr>
+        <p:spPr bwMode="auto">
+          <a:xfrm>
+            <a:off x="6154063" y="4299278"/>
+            <a:ext cx="1293490" cy="261610"/>
+          </a:xfrm>
+          <a:prstGeom prst="rect">
+            <a:avLst/>
+          </a:prstGeom>
+          <a:noFill/>
+          <a:ln>
+            <a:noFill/>
+          </a:ln>
+          <a:extLst>
+            <a:ext uri="{909E8E84-426E-40DD-AFC4-6F175D3DCCD1}">
+              <a14:hiddenFill xmlns:a14="http://schemas.microsoft.com/office/drawing/2010/main">
+                <a:solidFill>
+                  <a:srgbClr val="FFFFFF"/>
+                </a:solidFill>
+              </a14:hiddenFill>
+            </a:ext>
+            <a:ext uri="{91240B29-F687-4F45-9708-019B960494DF}">
+              <a14:hiddenLine xmlns:a14="http://schemas.microsoft.com/office/drawing/2010/main" w="9525">
+                <a:solidFill>
+                  <a:srgbClr val="000000"/>
+                </a:solidFill>
+                <a:miter lim="800000"/>
+                <a:headEnd/>
+                <a:tailEnd/>
+              </a14:hiddenLine>
+            </a:ext>
+          </a:extLst>
+        </p:spPr>
+        <p:txBody>
+          <a:bodyPr wrap="square">
+            <a:spAutoFit/>
+          </a:bodyPr>
+          <a:lstStyle>
+            <a:lvl1pPr>
+              <a:defRPr>
+                <a:solidFill>
+                  <a:schemeClr val="tx1"/>
+                </a:solidFill>
+                <a:latin typeface="Calibri" panose="020F0502020204030204" pitchFamily="34" charset="0"/>
+              </a:defRPr>
+            </a:lvl1pPr>
+            <a:lvl2pPr marL="742950" indent="-285750">
+              <a:defRPr>
+                <a:solidFill>
+                  <a:schemeClr val="tx1"/>
+                </a:solidFill>
+                <a:latin typeface="Calibri" panose="020F0502020204030204" pitchFamily="34" charset="0"/>
+              </a:defRPr>
+            </a:lvl2pPr>
+            <a:lvl3pPr marL="1143000" indent="-228600">
+              <a:defRPr>
+                <a:solidFill>
+                  <a:schemeClr val="tx1"/>
+                </a:solidFill>
+                <a:latin typeface="Calibri" panose="020F0502020204030204" pitchFamily="34" charset="0"/>
+              </a:defRPr>
+            </a:lvl3pPr>
+            <a:lvl4pPr marL="1600200" indent="-228600">
+              <a:defRPr>
+                <a:solidFill>
+                  <a:schemeClr val="tx1"/>
+                </a:solidFill>
+                <a:latin typeface="Calibri" panose="020F0502020204030204" pitchFamily="34" charset="0"/>
+              </a:defRPr>
+            </a:lvl4pPr>
+            <a:lvl5pPr marL="2057400" indent="-228600">
+              <a:defRPr>
+                <a:solidFill>
+                  <a:schemeClr val="tx1"/>
+                </a:solidFill>
+                <a:latin typeface="Calibri" panose="020F0502020204030204" pitchFamily="34" charset="0"/>
+              </a:defRPr>
+            </a:lvl5pPr>
+            <a:lvl6pPr marL="2514600" indent="-228600" eaLnBrk="0" fontAlgn="base" hangingPunct="0">
+              <a:spcBef>
+                <a:spcPct val="0"/>
+              </a:spcBef>
+              <a:spcAft>
+                <a:spcPct val="0"/>
+              </a:spcAft>
+              <a:defRPr>
+                <a:solidFill>
+                  <a:schemeClr val="tx1"/>
+                </a:solidFill>
+                <a:latin typeface="Calibri" panose="020F0502020204030204" pitchFamily="34" charset="0"/>
+              </a:defRPr>
+            </a:lvl6pPr>
+            <a:lvl7pPr marL="2971800" indent="-228600" eaLnBrk="0" fontAlgn="base" hangingPunct="0">
+              <a:spcBef>
+                <a:spcPct val="0"/>
+              </a:spcBef>
+              <a:spcAft>
+                <a:spcPct val="0"/>
+              </a:spcAft>
+              <a:defRPr>
+                <a:solidFill>
+                  <a:schemeClr val="tx1"/>
+                </a:solidFill>
+                <a:latin typeface="Calibri" panose="020F0502020204030204" pitchFamily="34" charset="0"/>
+              </a:defRPr>
+            </a:lvl7pPr>
+            <a:lvl8pPr marL="3429000" indent="-228600" eaLnBrk="0" fontAlgn="base" hangingPunct="0">
+              <a:spcBef>
+                <a:spcPct val="0"/>
+              </a:spcBef>
+              <a:spcAft>
+                <a:spcPct val="0"/>
+              </a:spcAft>
+              <a:defRPr>
+                <a:solidFill>
+                  <a:schemeClr val="tx1"/>
+                </a:solidFill>
+                <a:latin typeface="Calibri" panose="020F0502020204030204" pitchFamily="34" charset="0"/>
+              </a:defRPr>
+            </a:lvl8pPr>
+            <a:lvl9pPr marL="3886200" indent="-228600" eaLnBrk="0" fontAlgn="base" hangingPunct="0">
+              <a:spcBef>
+                <a:spcPct val="0"/>
+              </a:spcBef>
+              <a:spcAft>
+                <a:spcPct val="0"/>
+              </a:spcAft>
+              <a:defRPr>
+                <a:solidFill>
+                  <a:schemeClr val="tx1"/>
+                </a:solidFill>
+                <a:latin typeface="Calibri" panose="020F0502020204030204" pitchFamily="34" charset="0"/>
+              </a:defRPr>
+            </a:lvl9pPr>
+          </a:lstStyle>
+          <a:p>
+            <a:pPr algn="ctr" eaLnBrk="1" hangingPunct="1"/>
+            <a:r>
+              <a:rPr lang="en-US" altLang="en-US" sz="1100" dirty="0">
+                <a:latin typeface="Arial" panose="020B0604020202020204" pitchFamily="34" charset="0"/>
+                <a:ea typeface="Amazon Ember" panose="020B0603020204020204" pitchFamily="34" charset="0"/>
+                <a:cs typeface="Arial" panose="020B0604020202020204" pitchFamily="34" charset="0"/>
+              </a:rPr>
+              <a:t>Artifacts</a:t>
+            </a:r>
+          </a:p>
+        </p:txBody>
+      </p:sp>
+      <p:pic>
+        <p:nvPicPr>
+          <p:cNvPr id="48" name="Graphic 31">
+            <a:extLst>
+              <a:ext uri="{FF2B5EF4-FFF2-40B4-BE49-F238E27FC236}">
+                <a16:creationId xmlns:a16="http://schemas.microsoft.com/office/drawing/2014/main" id="{35B3171A-E3FC-4C65-A276-94C7435F81A7}"/>
+              </a:ext>
+            </a:extLst>
+          </p:cNvPr>
+          <p:cNvPicPr>
+            <a:picLocks noChangeAspect="1" noChangeArrowheads="1"/>
+          </p:cNvPicPr>
+          <p:nvPr/>
+        </p:nvPicPr>
+        <p:blipFill>
+          <a:blip r:embed="rId17">
+            <a:extLst>
+              <a:ext uri="{28A0092B-C50C-407E-A947-70E740481C1C}">
+                <a14:useLocalDpi xmlns:a14="http://schemas.microsoft.com/office/drawing/2010/main" val="0"/>
+              </a:ext>
+            </a:extLst>
+          </a:blip>
+          <a:srcRect/>
+          <a:stretch>
+            <a:fillRect/>
+          </a:stretch>
+        </p:blipFill>
+        <p:spPr bwMode="auto">
+          <a:xfrm>
+            <a:off x="6571703" y="3698748"/>
+            <a:ext cx="458210" cy="457200"/>
+          </a:xfrm>
+          <a:prstGeom prst="rect">
+            <a:avLst/>
+          </a:prstGeom>
+          <a:noFill/>
+          <a:ln>
+            <a:noFill/>
+          </a:ln>
+          <a:extLst>
+            <a:ext uri="{909E8E84-426E-40DD-AFC4-6F175D3DCCD1}">
+              <a14:hiddenFill xmlns:a14="http://schemas.microsoft.com/office/drawing/2010/main">
+                <a:solidFill>
+                  <a:srgbClr val="FFFFFF"/>
+                </a:solidFill>
+              </a14:hiddenFill>
+            </a:ext>
+            <a:ext uri="{91240B29-F687-4F45-9708-019B960494DF}">
+              <a14:hiddenLine xmlns:a14="http://schemas.microsoft.com/office/drawing/2010/main" w="9525">
+                <a:solidFill>
+                  <a:srgbClr val="000000"/>
+                </a:solidFill>
+                <a:miter lim="800000"/>
+                <a:headEnd/>
+                <a:tailEnd/>
+              </a14:hiddenLine>
+            </a:ext>
+          </a:extLst>
+        </p:spPr>
+      </p:pic>
+      <p:cxnSp>
+        <p:nvCxnSpPr>
+          <p:cNvPr id="53" name="Straight Arrow Connector 52">
+            <a:extLst>
+              <a:ext uri="{FF2B5EF4-FFF2-40B4-BE49-F238E27FC236}">
+                <a16:creationId xmlns:a16="http://schemas.microsoft.com/office/drawing/2014/main" id="{70711F76-A7F4-4D2D-B72E-06CFF4683EE1}"/>
+              </a:ext>
+            </a:extLst>
+          </p:cNvPr>
+          <p:cNvCxnSpPr>
+            <a:cxnSpLocks/>
+            <a:stCxn id="8" idx="2"/>
+            <a:endCxn id="55" idx="0"/>
+          </p:cNvCxnSpPr>
+          <p:nvPr/>
+        </p:nvCxnSpPr>
+        <p:spPr>
+          <a:xfrm>
+            <a:off x="9225377" y="4576277"/>
+            <a:ext cx="0" cy="520563"/>
+          </a:xfrm>
+          <a:prstGeom prst="straightConnector1">
+            <a:avLst/>
+          </a:prstGeom>
+          <a:ln w="12700">
+            <a:solidFill>
+              <a:srgbClr val="545B64"/>
+            </a:solidFill>
+            <a:headEnd type="none" w="med" len="sm"/>
+            <a:tailEnd type="arrow" w="med" len="sm"/>
+          </a:ln>
+        </p:spPr>
+        <p:style>
+          <a:lnRef idx="1">
+            <a:schemeClr val="accent1"/>
+          </a:lnRef>
+          <a:fillRef idx="0">
+            <a:schemeClr val="accent1"/>
+          </a:fillRef>
+          <a:effectRef idx="0">
+            <a:schemeClr val="accent1"/>
+          </a:effectRef>
+          <a:fontRef idx="minor">
+            <a:schemeClr val="tx1"/>
+          </a:fontRef>
+        </p:style>
+      </p:cxnSp>
+      <p:sp>
+        <p:nvSpPr>
+          <p:cNvPr id="54" name="TextBox 20">
+            <a:extLst>
+              <a:ext uri="{FF2B5EF4-FFF2-40B4-BE49-F238E27FC236}">
+                <a16:creationId xmlns:a16="http://schemas.microsoft.com/office/drawing/2014/main" id="{ECA387C6-EC8D-415F-A1EA-23703090C6A0}"/>
+              </a:ext>
+            </a:extLst>
+          </p:cNvPr>
+          <p:cNvSpPr txBox="1">
+            <a:spLocks noChangeArrowheads="1"/>
+          </p:cNvSpPr>
+          <p:nvPr/>
+        </p:nvSpPr>
+        <p:spPr bwMode="auto">
+          <a:xfrm>
+            <a:off x="8578632" y="5522954"/>
+            <a:ext cx="1293490" cy="261610"/>
+          </a:xfrm>
+          <a:prstGeom prst="rect">
+            <a:avLst/>
+          </a:prstGeom>
+          <a:noFill/>
+          <a:ln>
+            <a:noFill/>
+          </a:ln>
+          <a:extLst>
+            <a:ext uri="{909E8E84-426E-40DD-AFC4-6F175D3DCCD1}">
+              <a14:hiddenFill xmlns:a14="http://schemas.microsoft.com/office/drawing/2010/main">
+                <a:solidFill>
+                  <a:srgbClr val="FFFFFF"/>
+                </a:solidFill>
+              </a14:hiddenFill>
+            </a:ext>
+            <a:ext uri="{91240B29-F687-4F45-9708-019B960494DF}">
+              <a14:hiddenLine xmlns:a14="http://schemas.microsoft.com/office/drawing/2010/main" w="9525">
+                <a:solidFill>
+                  <a:srgbClr val="000000"/>
+                </a:solidFill>
+                <a:miter lim="800000"/>
+                <a:headEnd/>
+                <a:tailEnd/>
+              </a14:hiddenLine>
+            </a:ext>
+          </a:extLst>
+        </p:spPr>
+        <p:txBody>
+          <a:bodyPr wrap="square">
+            <a:spAutoFit/>
+          </a:bodyPr>
+          <a:lstStyle>
+            <a:lvl1pPr>
+              <a:defRPr>
+                <a:solidFill>
+                  <a:schemeClr val="tx1"/>
+                </a:solidFill>
+                <a:latin typeface="Calibri" panose="020F0502020204030204" pitchFamily="34" charset="0"/>
+              </a:defRPr>
+            </a:lvl1pPr>
+            <a:lvl2pPr marL="742950" indent="-285750">
+              <a:defRPr>
+                <a:solidFill>
+                  <a:schemeClr val="tx1"/>
+                </a:solidFill>
+                <a:latin typeface="Calibri" panose="020F0502020204030204" pitchFamily="34" charset="0"/>
+              </a:defRPr>
+            </a:lvl2pPr>
+            <a:lvl3pPr marL="1143000" indent="-228600">
+              <a:defRPr>
+                <a:solidFill>
+                  <a:schemeClr val="tx1"/>
+                </a:solidFill>
+                <a:latin typeface="Calibri" panose="020F0502020204030204" pitchFamily="34" charset="0"/>
+              </a:defRPr>
+            </a:lvl3pPr>
+            <a:lvl4pPr marL="1600200" indent="-228600">
+              <a:defRPr>
+                <a:solidFill>
+                  <a:schemeClr val="tx1"/>
+                </a:solidFill>
+                <a:latin typeface="Calibri" panose="020F0502020204030204" pitchFamily="34" charset="0"/>
+              </a:defRPr>
+            </a:lvl4pPr>
+            <a:lvl5pPr marL="2057400" indent="-228600">
+              <a:defRPr>
+                <a:solidFill>
+                  <a:schemeClr val="tx1"/>
+                </a:solidFill>
+                <a:latin typeface="Calibri" panose="020F0502020204030204" pitchFamily="34" charset="0"/>
+              </a:defRPr>
+            </a:lvl5pPr>
+            <a:lvl6pPr marL="2514600" indent="-228600" eaLnBrk="0" fontAlgn="base" hangingPunct="0">
+              <a:spcBef>
+                <a:spcPct val="0"/>
+              </a:spcBef>
+              <a:spcAft>
+                <a:spcPct val="0"/>
+              </a:spcAft>
+              <a:defRPr>
+                <a:solidFill>
+                  <a:schemeClr val="tx1"/>
+                </a:solidFill>
+                <a:latin typeface="Calibri" panose="020F0502020204030204" pitchFamily="34" charset="0"/>
+              </a:defRPr>
+            </a:lvl6pPr>
+            <a:lvl7pPr marL="2971800" indent="-228600" eaLnBrk="0" fontAlgn="base" hangingPunct="0">
+              <a:spcBef>
+                <a:spcPct val="0"/>
+              </a:spcBef>
+              <a:spcAft>
+                <a:spcPct val="0"/>
+              </a:spcAft>
+              <a:defRPr>
+                <a:solidFill>
+                  <a:schemeClr val="tx1"/>
+                </a:solidFill>
+                <a:latin typeface="Calibri" panose="020F0502020204030204" pitchFamily="34" charset="0"/>
+              </a:defRPr>
+            </a:lvl7pPr>
+            <a:lvl8pPr marL="3429000" indent="-228600" eaLnBrk="0" fontAlgn="base" hangingPunct="0">
+              <a:spcBef>
+                <a:spcPct val="0"/>
+              </a:spcBef>
+              <a:spcAft>
+                <a:spcPct val="0"/>
+              </a:spcAft>
+              <a:defRPr>
+                <a:solidFill>
+                  <a:schemeClr val="tx1"/>
+                </a:solidFill>
+                <a:latin typeface="Calibri" panose="020F0502020204030204" pitchFamily="34" charset="0"/>
+              </a:defRPr>
+            </a:lvl8pPr>
+            <a:lvl9pPr marL="3886200" indent="-228600" eaLnBrk="0" fontAlgn="base" hangingPunct="0">
+              <a:spcBef>
+                <a:spcPct val="0"/>
+              </a:spcBef>
+              <a:spcAft>
+                <a:spcPct val="0"/>
+              </a:spcAft>
+              <a:defRPr>
+                <a:solidFill>
+                  <a:schemeClr val="tx1"/>
+                </a:solidFill>
+                <a:latin typeface="Calibri" panose="020F0502020204030204" pitchFamily="34" charset="0"/>
+              </a:defRPr>
+            </a:lvl9pPr>
+          </a:lstStyle>
+          <a:p>
+            <a:pPr algn="ctr" eaLnBrk="1" hangingPunct="1"/>
+            <a:r>
+              <a:rPr lang="en-US" altLang="en-US" sz="1100" dirty="0">
+                <a:latin typeface="Arial" panose="020B0604020202020204" pitchFamily="34" charset="0"/>
+                <a:ea typeface="Amazon Ember" panose="020B0603020204020204" pitchFamily="34" charset="0"/>
+                <a:cs typeface="Arial" panose="020B0604020202020204" pitchFamily="34" charset="0"/>
+              </a:rPr>
+              <a:t>Reports</a:t>
+            </a:r>
+          </a:p>
+        </p:txBody>
+      </p:sp>
+      <p:pic>
+        <p:nvPicPr>
+          <p:cNvPr id="55" name="Graphic 31">
+            <a:extLst>
+              <a:ext uri="{FF2B5EF4-FFF2-40B4-BE49-F238E27FC236}">
+                <a16:creationId xmlns:a16="http://schemas.microsoft.com/office/drawing/2014/main" id="{554CCA09-1EAF-4B18-B6EA-363BD3033D43}"/>
+              </a:ext>
+            </a:extLst>
+          </p:cNvPr>
+          <p:cNvPicPr>
+            <a:picLocks noChangeAspect="1" noChangeArrowheads="1"/>
+          </p:cNvPicPr>
+          <p:nvPr/>
+        </p:nvPicPr>
+        <p:blipFill>
+          <a:blip r:embed="rId17">
+            <a:extLst>
+              <a:ext uri="{28A0092B-C50C-407E-A947-70E740481C1C}">
+                <a14:useLocalDpi xmlns:a14="http://schemas.microsoft.com/office/drawing/2010/main" val="0"/>
+              </a:ext>
+            </a:extLst>
+          </a:blip>
+          <a:srcRect/>
+          <a:stretch>
+            <a:fillRect/>
+          </a:stretch>
+        </p:blipFill>
+        <p:spPr bwMode="auto">
+          <a:xfrm>
+            <a:off x="8996272" y="5096840"/>
+            <a:ext cx="458210" cy="457200"/>
+          </a:xfrm>
+          <a:prstGeom prst="rect">
+            <a:avLst/>
+          </a:prstGeom>
+          <a:noFill/>
+          <a:ln>
+            <a:noFill/>
+          </a:ln>
+          <a:extLst>
+            <a:ext uri="{909E8E84-426E-40DD-AFC4-6F175D3DCCD1}">
+              <a14:hiddenFill xmlns:a14="http://schemas.microsoft.com/office/drawing/2010/main">
+                <a:solidFill>
+                  <a:srgbClr val="FFFFFF"/>
+                </a:solidFill>
+              </a14:hiddenFill>
+            </a:ext>
+            <a:ext uri="{91240B29-F687-4F45-9708-019B960494DF}">
+              <a14:hiddenLine xmlns:a14="http://schemas.microsoft.com/office/drawing/2010/main" w="9525">
+                <a:solidFill>
+                  <a:srgbClr val="000000"/>
+                </a:solidFill>
+                <a:miter lim="800000"/>
+                <a:headEnd/>
+                <a:tailEnd/>
+              </a14:hiddenLine>
+            </a:ext>
+          </a:extLst>
+        </p:spPr>
+      </p:pic>
+      <p:sp>
+        <p:nvSpPr>
+          <p:cNvPr id="49" name="Rectangle 48">
+            <a:extLst>
+              <a:ext uri="{FF2B5EF4-FFF2-40B4-BE49-F238E27FC236}">
+                <a16:creationId xmlns:a16="http://schemas.microsoft.com/office/drawing/2014/main" id="{F770D78D-C40A-494F-990A-EE34B22F3894}"/>
+              </a:ext>
+            </a:extLst>
+          </p:cNvPr>
+          <p:cNvSpPr/>
+          <p:nvPr/>
+        </p:nvSpPr>
+        <p:spPr>
+          <a:xfrm>
+            <a:off x="4608776" y="1746504"/>
+            <a:ext cx="1188720" cy="4361688"/>
+          </a:xfrm>
+          <a:prstGeom prst="rect">
+            <a:avLst/>
+          </a:prstGeom>
+          <a:noFill/>
+          <a:ln w="12700">
+            <a:solidFill>
+              <a:srgbClr val="5A6B86"/>
+            </a:solidFill>
+            <a:prstDash val="dash"/>
+          </a:ln>
+        </p:spPr>
+        <p:style>
+          <a:lnRef idx="2">
+            <a:schemeClr val="accent1">
+              <a:shade val="50000"/>
+            </a:schemeClr>
+          </a:lnRef>
+          <a:fillRef idx="1">
+            <a:schemeClr val="accent1"/>
+          </a:fillRef>
+          <a:effectRef idx="0">
+            <a:schemeClr val="accent1"/>
+          </a:effectRef>
+          <a:fontRef idx="minor">
+            <a:schemeClr val="lt1"/>
+          </a:fontRef>
+        </p:style>
+        <p:txBody>
+          <a:bodyPr tIns="91440"/>
+          <a:lstStyle/>
+          <a:p>
+            <a:pPr algn="ctr" eaLnBrk="1" fontAlgn="auto" hangingPunct="1">
+              <a:spcBef>
+                <a:spcPts val="0"/>
+              </a:spcBef>
+              <a:spcAft>
+                <a:spcPts val="0"/>
+              </a:spcAft>
+              <a:defRPr/>
+            </a:pPr>
+            <a:r>
+              <a:rPr lang="en-US" sz="1200" dirty="0">
+                <a:solidFill>
+                  <a:srgbClr val="5A6B86"/>
+                </a:solidFill>
+                <a:latin typeface="Arial" panose="020B0604020202020204" pitchFamily="34" charset="0"/>
+                <a:cs typeface="Arial" panose="020B0604020202020204" pitchFamily="34" charset="0"/>
+              </a:rPr>
+              <a:t>Source stage</a:t>
+            </a:r>
+          </a:p>
+        </p:txBody>
+      </p:sp>
+      <p:sp>
+        <p:nvSpPr>
+          <p:cNvPr id="50" name="Rectangle 49">
+            <a:extLst>
+              <a:ext uri="{FF2B5EF4-FFF2-40B4-BE49-F238E27FC236}">
+                <a16:creationId xmlns:a16="http://schemas.microsoft.com/office/drawing/2014/main" id="{189C16A1-083C-4DC5-BE10-6C1D5D2AB111}"/>
+              </a:ext>
+            </a:extLst>
+          </p:cNvPr>
+          <p:cNvSpPr/>
+          <p:nvPr/>
+        </p:nvSpPr>
+        <p:spPr>
+          <a:xfrm>
+            <a:off x="6254496" y="1746504"/>
+            <a:ext cx="3474720" cy="4361688"/>
+          </a:xfrm>
+          <a:prstGeom prst="rect">
+            <a:avLst/>
+          </a:prstGeom>
+          <a:noFill/>
+          <a:ln w="12700">
+            <a:solidFill>
+              <a:srgbClr val="5A6B86"/>
+            </a:solidFill>
+            <a:prstDash val="dash"/>
+          </a:ln>
+        </p:spPr>
+        <p:style>
+          <a:lnRef idx="2">
+            <a:schemeClr val="accent1">
+              <a:shade val="50000"/>
+            </a:schemeClr>
+          </a:lnRef>
+          <a:fillRef idx="1">
+            <a:schemeClr val="accent1"/>
+          </a:fillRef>
+          <a:effectRef idx="0">
+            <a:schemeClr val="accent1"/>
+          </a:effectRef>
+          <a:fontRef idx="minor">
+            <a:schemeClr val="lt1"/>
+          </a:fontRef>
+        </p:style>
+        <p:txBody>
+          <a:bodyPr tIns="91440"/>
+          <a:lstStyle/>
+          <a:p>
+            <a:pPr algn="ctr" eaLnBrk="1" fontAlgn="auto" hangingPunct="1">
+              <a:spcBef>
+                <a:spcPts val="0"/>
+              </a:spcBef>
+              <a:spcAft>
+                <a:spcPts val="0"/>
+              </a:spcAft>
+              <a:defRPr/>
+            </a:pPr>
+            <a:r>
+              <a:rPr lang="en-US" sz="1200" dirty="0">
+                <a:solidFill>
+                  <a:srgbClr val="5A6B86"/>
+                </a:solidFill>
+                <a:latin typeface="Arial" panose="020B0604020202020204" pitchFamily="34" charset="0"/>
+                <a:cs typeface="Arial" panose="020B0604020202020204" pitchFamily="34" charset="0"/>
+              </a:rPr>
+              <a:t>Build/test stage</a:t>
+            </a:r>
+          </a:p>
+        </p:txBody>
+      </p:sp>
+      <p:sp>
+        <p:nvSpPr>
+          <p:cNvPr id="52" name="Rectangle 51">
+            <a:extLst>
+              <a:ext uri="{FF2B5EF4-FFF2-40B4-BE49-F238E27FC236}">
+                <a16:creationId xmlns:a16="http://schemas.microsoft.com/office/drawing/2014/main" id="{525BDAC8-77AD-4D8B-94E6-5692060878A2}"/>
+              </a:ext>
+            </a:extLst>
+          </p:cNvPr>
+          <p:cNvSpPr/>
+          <p:nvPr/>
+        </p:nvSpPr>
+        <p:spPr>
+          <a:xfrm>
+            <a:off x="10185236" y="1746504"/>
+            <a:ext cx="1188720" cy="4361688"/>
+          </a:xfrm>
+          <a:prstGeom prst="rect">
+            <a:avLst/>
+          </a:prstGeom>
+          <a:noFill/>
+          <a:ln w="12700">
+            <a:solidFill>
+              <a:srgbClr val="5A6B86"/>
+            </a:solidFill>
+            <a:prstDash val="dash"/>
+          </a:ln>
+        </p:spPr>
+        <p:style>
+          <a:lnRef idx="2">
+            <a:schemeClr val="accent1">
+              <a:shade val="50000"/>
+            </a:schemeClr>
+          </a:lnRef>
+          <a:fillRef idx="1">
+            <a:schemeClr val="accent1"/>
+          </a:fillRef>
+          <a:effectRef idx="0">
+            <a:schemeClr val="accent1"/>
+          </a:effectRef>
+          <a:fontRef idx="minor">
+            <a:schemeClr val="lt1"/>
+          </a:fontRef>
+        </p:style>
+        <p:txBody>
+          <a:bodyPr tIns="91440"/>
+          <a:lstStyle/>
+          <a:p>
+            <a:pPr algn="ctr" eaLnBrk="1" fontAlgn="auto" hangingPunct="1">
+              <a:spcBef>
+                <a:spcPts val="0"/>
+              </a:spcBef>
+              <a:spcAft>
+                <a:spcPts val="0"/>
+              </a:spcAft>
+              <a:defRPr/>
+            </a:pPr>
+            <a:r>
+              <a:rPr lang="en-US" sz="1200" dirty="0">
+                <a:solidFill>
+                  <a:srgbClr val="5A6B86"/>
+                </a:solidFill>
+                <a:latin typeface="Arial" panose="020B0604020202020204" pitchFamily="34" charset="0"/>
+                <a:cs typeface="Arial" panose="020B0604020202020204" pitchFamily="34" charset="0"/>
+              </a:rPr>
+              <a:t>Deploy stage</a:t>
+            </a:r>
+          </a:p>
+        </p:txBody>
+      </p:sp>
+    </p:spTree>
+    <p:extLst>
+      <p:ext uri="{BB962C8B-B14F-4D97-AF65-F5344CB8AC3E}">
+        <p14:creationId xmlns:p14="http://schemas.microsoft.com/office/powerpoint/2010/main" val="2682904790"/>
       </p:ext>
     </p:extLst>
   </p:cSld>

</xml_diff>

<commit_message>
TW add "CI/CD pipeline" label in diagram
</commit_message>
<xml_diff>
--- a/docs/deployment_guide/images/taskcat-ci-architecture-diagram.pptx
+++ b/docs/deployment_guide/images/taskcat-ci-architecture-diagram.pptx
@@ -246,7 +246,7 @@
           <a:p>
             <a:fld id="{04106A3E-CAB3-410A-9213-AB2A4784C8B7}" type="datetimeFigureOut">
               <a:rPr lang="en-US" smtClean="0"/>
-              <a:t>10/19/2022</a:t>
+              <a:t>10/20/2022</a:t>
             </a:fld>
             <a:endParaRPr lang="en-US"/>
           </a:p>
@@ -416,7 +416,7 @@
           <a:p>
             <a:fld id="{04106A3E-CAB3-410A-9213-AB2A4784C8B7}" type="datetimeFigureOut">
               <a:rPr lang="en-US" smtClean="0"/>
-              <a:t>10/19/2022</a:t>
+              <a:t>10/20/2022</a:t>
             </a:fld>
             <a:endParaRPr lang="en-US"/>
           </a:p>
@@ -596,7 +596,7 @@
           <a:p>
             <a:fld id="{04106A3E-CAB3-410A-9213-AB2A4784C8B7}" type="datetimeFigureOut">
               <a:rPr lang="en-US" smtClean="0"/>
-              <a:t>10/19/2022</a:t>
+              <a:t>10/20/2022</a:t>
             </a:fld>
             <a:endParaRPr lang="en-US"/>
           </a:p>
@@ -766,7 +766,7 @@
           <a:p>
             <a:fld id="{04106A3E-CAB3-410A-9213-AB2A4784C8B7}" type="datetimeFigureOut">
               <a:rPr lang="en-US" smtClean="0"/>
-              <a:t>10/19/2022</a:t>
+              <a:t>10/20/2022</a:t>
             </a:fld>
             <a:endParaRPr lang="en-US"/>
           </a:p>
@@ -1010,7 +1010,7 @@
           <a:p>
             <a:fld id="{04106A3E-CAB3-410A-9213-AB2A4784C8B7}" type="datetimeFigureOut">
               <a:rPr lang="en-US" smtClean="0"/>
-              <a:t>10/19/2022</a:t>
+              <a:t>10/20/2022</a:t>
             </a:fld>
             <a:endParaRPr lang="en-US"/>
           </a:p>
@@ -1242,7 +1242,7 @@
           <a:p>
             <a:fld id="{04106A3E-CAB3-410A-9213-AB2A4784C8B7}" type="datetimeFigureOut">
               <a:rPr lang="en-US" smtClean="0"/>
-              <a:t>10/19/2022</a:t>
+              <a:t>10/20/2022</a:t>
             </a:fld>
             <a:endParaRPr lang="en-US"/>
           </a:p>
@@ -1609,7 +1609,7 @@
           <a:p>
             <a:fld id="{04106A3E-CAB3-410A-9213-AB2A4784C8B7}" type="datetimeFigureOut">
               <a:rPr lang="en-US" smtClean="0"/>
-              <a:t>10/19/2022</a:t>
+              <a:t>10/20/2022</a:t>
             </a:fld>
             <a:endParaRPr lang="en-US"/>
           </a:p>
@@ -1727,7 +1727,7 @@
           <a:p>
             <a:fld id="{04106A3E-CAB3-410A-9213-AB2A4784C8B7}" type="datetimeFigureOut">
               <a:rPr lang="en-US" smtClean="0"/>
-              <a:t>10/19/2022</a:t>
+              <a:t>10/20/2022</a:t>
             </a:fld>
             <a:endParaRPr lang="en-US"/>
           </a:p>
@@ -1822,7 +1822,7 @@
           <a:p>
             <a:fld id="{04106A3E-CAB3-410A-9213-AB2A4784C8B7}" type="datetimeFigureOut">
               <a:rPr lang="en-US" smtClean="0"/>
-              <a:t>10/19/2022</a:t>
+              <a:t>10/20/2022</a:t>
             </a:fld>
             <a:endParaRPr lang="en-US"/>
           </a:p>
@@ -2099,7 +2099,7 @@
           <a:p>
             <a:fld id="{04106A3E-CAB3-410A-9213-AB2A4784C8B7}" type="datetimeFigureOut">
               <a:rPr lang="en-US" smtClean="0"/>
-              <a:t>10/19/2022</a:t>
+              <a:t>10/20/2022</a:t>
             </a:fld>
             <a:endParaRPr lang="en-US"/>
           </a:p>
@@ -2356,7 +2356,7 @@
           <a:p>
             <a:fld id="{04106A3E-CAB3-410A-9213-AB2A4784C8B7}" type="datetimeFigureOut">
               <a:rPr lang="en-US" smtClean="0"/>
-              <a:t>10/19/2022</a:t>
+              <a:t>10/20/2022</a:t>
             </a:fld>
             <a:endParaRPr lang="en-US"/>
           </a:p>
@@ -2569,7 +2569,7 @@
           <a:p>
             <a:fld id="{04106A3E-CAB3-410A-9213-AB2A4784C8B7}" type="datetimeFigureOut">
               <a:rPr lang="en-US" smtClean="0"/>
-              <a:t>10/19/2022</a:t>
+              <a:t>10/20/2022</a:t>
             </a:fld>
             <a:endParaRPr lang="en-US"/>
           </a:p>
@@ -17299,6 +17299,169 @@
           </a:p>
         </p:txBody>
       </p:sp>
+      <p:sp>
+        <p:nvSpPr>
+          <p:cNvPr id="56" name="TextBox 40">
+            <a:extLst>
+              <a:ext uri="{FF2B5EF4-FFF2-40B4-BE49-F238E27FC236}">
+                <a16:creationId xmlns:a16="http://schemas.microsoft.com/office/drawing/2014/main" id="{0FD9E134-5EB5-40DB-934F-E2051D880975}"/>
+              </a:ext>
+            </a:extLst>
+          </p:cNvPr>
+          <p:cNvSpPr txBox="1">
+            <a:spLocks noChangeArrowheads="1"/>
+          </p:cNvSpPr>
+          <p:nvPr/>
+        </p:nvSpPr>
+        <p:spPr bwMode="auto">
+          <a:xfrm>
+            <a:off x="7382621" y="1476443"/>
+            <a:ext cx="1203341" cy="261610"/>
+          </a:xfrm>
+          <a:prstGeom prst="rect">
+            <a:avLst/>
+          </a:prstGeom>
+          <a:noFill/>
+          <a:ln>
+            <a:noFill/>
+          </a:ln>
+          <a:extLst>
+            <a:ext uri="{909E8E84-426E-40DD-AFC4-6F175D3DCCD1}">
+              <a14:hiddenFill xmlns:a14="http://schemas.microsoft.com/office/drawing/2010/main">
+                <a:solidFill>
+                  <a:srgbClr val="FFFFFF"/>
+                </a:solidFill>
+              </a14:hiddenFill>
+            </a:ext>
+            <a:ext uri="{91240B29-F687-4F45-9708-019B960494DF}">
+              <a14:hiddenLine xmlns:a14="http://schemas.microsoft.com/office/drawing/2010/main" w="9525">
+                <a:solidFill>
+                  <a:srgbClr val="000000"/>
+                </a:solidFill>
+                <a:miter lim="800000"/>
+                <a:headEnd/>
+                <a:tailEnd/>
+              </a14:hiddenLine>
+            </a:ext>
+          </a:extLst>
+        </p:spPr>
+        <p:txBody>
+          <a:bodyPr wrap="square">
+            <a:spAutoFit/>
+          </a:bodyPr>
+          <a:lstStyle>
+            <a:lvl1pPr>
+              <a:defRPr>
+                <a:solidFill>
+                  <a:schemeClr val="tx1"/>
+                </a:solidFill>
+                <a:latin typeface="Calibri" panose="020F0502020204030204" pitchFamily="34" charset="0"/>
+              </a:defRPr>
+            </a:lvl1pPr>
+            <a:lvl2pPr marL="742950" indent="-285750">
+              <a:defRPr>
+                <a:solidFill>
+                  <a:schemeClr val="tx1"/>
+                </a:solidFill>
+                <a:latin typeface="Calibri" panose="020F0502020204030204" pitchFamily="34" charset="0"/>
+              </a:defRPr>
+            </a:lvl2pPr>
+            <a:lvl3pPr marL="1143000" indent="-228600">
+              <a:defRPr>
+                <a:solidFill>
+                  <a:schemeClr val="tx1"/>
+                </a:solidFill>
+                <a:latin typeface="Calibri" panose="020F0502020204030204" pitchFamily="34" charset="0"/>
+              </a:defRPr>
+            </a:lvl3pPr>
+            <a:lvl4pPr marL="1600200" indent="-228600">
+              <a:defRPr>
+                <a:solidFill>
+                  <a:schemeClr val="tx1"/>
+                </a:solidFill>
+                <a:latin typeface="Calibri" panose="020F0502020204030204" pitchFamily="34" charset="0"/>
+              </a:defRPr>
+            </a:lvl4pPr>
+            <a:lvl5pPr marL="2057400" indent="-228600">
+              <a:defRPr>
+                <a:solidFill>
+                  <a:schemeClr val="tx1"/>
+                </a:solidFill>
+                <a:latin typeface="Calibri" panose="020F0502020204030204" pitchFamily="34" charset="0"/>
+              </a:defRPr>
+            </a:lvl5pPr>
+            <a:lvl6pPr marL="2514600" indent="-228600" eaLnBrk="0" fontAlgn="base" hangingPunct="0">
+              <a:spcBef>
+                <a:spcPct val="0"/>
+              </a:spcBef>
+              <a:spcAft>
+                <a:spcPct val="0"/>
+              </a:spcAft>
+              <a:defRPr>
+                <a:solidFill>
+                  <a:schemeClr val="tx1"/>
+                </a:solidFill>
+                <a:latin typeface="Calibri" panose="020F0502020204030204" pitchFamily="34" charset="0"/>
+              </a:defRPr>
+            </a:lvl6pPr>
+            <a:lvl7pPr marL="2971800" indent="-228600" eaLnBrk="0" fontAlgn="base" hangingPunct="0">
+              <a:spcBef>
+                <a:spcPct val="0"/>
+              </a:spcBef>
+              <a:spcAft>
+                <a:spcPct val="0"/>
+              </a:spcAft>
+              <a:defRPr>
+                <a:solidFill>
+                  <a:schemeClr val="tx1"/>
+                </a:solidFill>
+                <a:latin typeface="Calibri" panose="020F0502020204030204" pitchFamily="34" charset="0"/>
+              </a:defRPr>
+            </a:lvl7pPr>
+            <a:lvl8pPr marL="3429000" indent="-228600" eaLnBrk="0" fontAlgn="base" hangingPunct="0">
+              <a:spcBef>
+                <a:spcPct val="0"/>
+              </a:spcBef>
+              <a:spcAft>
+                <a:spcPct val="0"/>
+              </a:spcAft>
+              <a:defRPr>
+                <a:solidFill>
+                  <a:schemeClr val="tx1"/>
+                </a:solidFill>
+                <a:latin typeface="Calibri" panose="020F0502020204030204" pitchFamily="34" charset="0"/>
+              </a:defRPr>
+            </a:lvl8pPr>
+            <a:lvl9pPr marL="3886200" indent="-228600" eaLnBrk="0" fontAlgn="base" hangingPunct="0">
+              <a:spcBef>
+                <a:spcPct val="0"/>
+              </a:spcBef>
+              <a:spcAft>
+                <a:spcPct val="0"/>
+              </a:spcAft>
+              <a:defRPr>
+                <a:solidFill>
+                  <a:schemeClr val="tx1"/>
+                </a:solidFill>
+                <a:latin typeface="Calibri" panose="020F0502020204030204" pitchFamily="34" charset="0"/>
+              </a:defRPr>
+            </a:lvl9pPr>
+          </a:lstStyle>
+          <a:p>
+            <a:pPr algn="ctr" eaLnBrk="1" hangingPunct="1"/>
+            <a:r>
+              <a:rPr lang="en-US" altLang="en-US" sz="1100" dirty="0">
+                <a:solidFill>
+                  <a:srgbClr val="000000"/>
+                </a:solidFill>
+                <a:latin typeface="Arial" panose="020B0604020202020204" pitchFamily="34" charset="0"/>
+                <a:cs typeface="Arial" panose="020B0604020202020204" pitchFamily="34" charset="0"/>
+              </a:rPr>
+              <a:t>CI/CD pipeline</a:t>
+            </a:r>
+          </a:p>
+        </p:txBody>
+      </p:sp>
     </p:spTree>
     <p:extLst>
       <p:ext uri="{BB962C8B-B14F-4D97-AF65-F5344CB8AC3E}">

</xml_diff>

<commit_message>
TW reverse direction of arrow from S3 to CodeBuild
</commit_message>
<xml_diff>
--- a/docs/deployment_guide/images/taskcat-ci-architecture-diagram.pptx
+++ b/docs/deployment_guide/images/taskcat-ci-architecture-diagram.pptx
@@ -7,8 +7,7 @@
   <p:sldIdLst>
     <p:sldId id="256" r:id="rId2"/>
     <p:sldId id="261" r:id="rId3"/>
-    <p:sldId id="262" r:id="rId4"/>
-    <p:sldId id="263" r:id="rId5"/>
+    <p:sldId id="263" r:id="rId4"/>
   </p:sldIdLst>
   <p:sldSz cx="15544800" cy="10058400"/>
   <p:notesSz cx="6858000" cy="9144000"/>
@@ -10141,7 +10140,7 @@
         </p:blipFill>
         <p:spPr bwMode="auto">
           <a:xfrm>
-            <a:off x="6779163" y="2135750"/>
+            <a:off x="7610856" y="2135750"/>
             <a:ext cx="762000" cy="762000"/>
           </a:xfrm>
           <a:prstGeom prst="rect">
@@ -10188,7 +10187,7 @@
         </p:nvSpPr>
         <p:spPr bwMode="auto">
           <a:xfrm>
-            <a:off x="6277513" y="2916876"/>
+            <a:off x="7109206" y="2916876"/>
             <a:ext cx="1765300" cy="276999"/>
           </a:xfrm>
           <a:prstGeom prst="rect">
@@ -10362,7 +10361,7 @@
         </p:blipFill>
         <p:spPr bwMode="auto">
           <a:xfrm>
-            <a:off x="6779163" y="3618780"/>
+            <a:off x="7610856" y="3546348"/>
             <a:ext cx="762000" cy="762000"/>
           </a:xfrm>
           <a:prstGeom prst="rect">
@@ -10409,7 +10408,7 @@
         </p:nvSpPr>
         <p:spPr bwMode="auto">
           <a:xfrm>
-            <a:off x="6013988" y="4394769"/>
+            <a:off x="6845681" y="4299278"/>
             <a:ext cx="2292350" cy="276999"/>
           </a:xfrm>
           <a:prstGeom prst="rect">
@@ -10570,7 +10569,7 @@
         </p:nvSpPr>
         <p:spPr bwMode="auto">
           <a:xfrm>
-            <a:off x="7463184" y="4382442"/>
+            <a:off x="8079202" y="4299278"/>
             <a:ext cx="2292350" cy="276999"/>
           </a:xfrm>
           <a:prstGeom prst="rect">
@@ -10738,8 +10737,8 @@
         </p:nvCxnSpPr>
         <p:spPr>
           <a:xfrm flipV="1">
-            <a:off x="7160163" y="3193875"/>
-            <a:ext cx="0" cy="424905"/>
+            <a:off x="7991856" y="3193875"/>
+            <a:ext cx="0" cy="352473"/>
           </a:xfrm>
           <a:prstGeom prst="straightConnector1">
             <a:avLst/>
@@ -10785,8 +10784,8 @@
         </p:nvCxnSpPr>
         <p:spPr>
           <a:xfrm>
-            <a:off x="7541163" y="3999780"/>
-            <a:ext cx="769460" cy="0"/>
+            <a:off x="8372856" y="3927348"/>
+            <a:ext cx="553785" cy="0"/>
           </a:xfrm>
           <a:prstGeom prst="straightConnector1">
             <a:avLst/>
@@ -10825,3612 +10824,6 @@
           </p:cNvPr>
           <p:cNvCxnSpPr>
             <a:cxnSpLocks/>
-            <a:stCxn id="6" idx="2"/>
-            <a:endCxn id="48" idx="0"/>
-          </p:cNvCxnSpPr>
-          <p:nvPr/>
-        </p:nvCxnSpPr>
-        <p:spPr>
-          <a:xfrm>
-            <a:off x="7160163" y="4671768"/>
-            <a:ext cx="0" cy="425072"/>
-          </a:xfrm>
-          <a:prstGeom prst="straightConnector1">
-            <a:avLst/>
-          </a:prstGeom>
-          <a:ln w="12700">
-            <a:solidFill>
-              <a:srgbClr val="545B64"/>
-            </a:solidFill>
-            <a:headEnd type="none" w="med" len="sm"/>
-            <a:tailEnd type="arrow" w="med" len="sm"/>
-          </a:ln>
-        </p:spPr>
-        <p:style>
-          <a:lnRef idx="1">
-            <a:schemeClr val="accent1"/>
-          </a:lnRef>
-          <a:fillRef idx="0">
-            <a:schemeClr val="accent1"/>
-          </a:fillRef>
-          <a:effectRef idx="0">
-            <a:schemeClr val="accent1"/>
-          </a:effectRef>
-          <a:fontRef idx="minor">
-            <a:schemeClr val="tx1"/>
-          </a:fontRef>
-        </p:style>
-      </p:cxnSp>
-      <p:sp>
-        <p:nvSpPr>
-          <p:cNvPr id="15" name="TextBox 28">
-            <a:extLst>
-              <a:ext uri="{FF2B5EF4-FFF2-40B4-BE49-F238E27FC236}">
-                <a16:creationId xmlns:a16="http://schemas.microsoft.com/office/drawing/2014/main" id="{19F08E4A-97C9-4805-9D71-79037B311B78}"/>
-              </a:ext>
-            </a:extLst>
-          </p:cNvPr>
-          <p:cNvSpPr txBox="1">
-            <a:spLocks noChangeArrowheads="1"/>
-          </p:cNvSpPr>
-          <p:nvPr/>
-        </p:nvSpPr>
-        <p:spPr bwMode="auto">
-          <a:xfrm>
-            <a:off x="8015634" y="2916876"/>
-            <a:ext cx="1187450" cy="261610"/>
-          </a:xfrm>
-          <a:prstGeom prst="rect">
-            <a:avLst/>
-          </a:prstGeom>
-          <a:noFill/>
-          <a:ln>
-            <a:noFill/>
-          </a:ln>
-          <a:extLst>
-            <a:ext uri="{909E8E84-426E-40DD-AFC4-6F175D3DCCD1}">
-              <a14:hiddenFill xmlns:a14="http://schemas.microsoft.com/office/drawing/2010/main">
-                <a:solidFill>
-                  <a:srgbClr val="FFFFFF"/>
-                </a:solidFill>
-              </a14:hiddenFill>
-            </a:ext>
-            <a:ext uri="{91240B29-F687-4F45-9708-019B960494DF}">
-              <a14:hiddenLine xmlns:a14="http://schemas.microsoft.com/office/drawing/2010/main" w="9525">
-                <a:solidFill>
-                  <a:srgbClr val="000000"/>
-                </a:solidFill>
-                <a:miter lim="800000"/>
-                <a:headEnd/>
-                <a:tailEnd/>
-              </a14:hiddenLine>
-            </a:ext>
-          </a:extLst>
-        </p:spPr>
-        <p:txBody>
-          <a:bodyPr>
-            <a:spAutoFit/>
-          </a:bodyPr>
-          <a:lstStyle>
-            <a:lvl1pPr>
-              <a:defRPr>
-                <a:solidFill>
-                  <a:schemeClr val="tx1"/>
-                </a:solidFill>
-                <a:latin typeface="Calibri" panose="020F0502020204030204" pitchFamily="34" charset="0"/>
-              </a:defRPr>
-            </a:lvl1pPr>
-            <a:lvl2pPr marL="742950" indent="-285750">
-              <a:defRPr>
-                <a:solidFill>
-                  <a:schemeClr val="tx1"/>
-                </a:solidFill>
-                <a:latin typeface="Calibri" panose="020F0502020204030204" pitchFamily="34" charset="0"/>
-              </a:defRPr>
-            </a:lvl2pPr>
-            <a:lvl3pPr marL="1143000" indent="-228600">
-              <a:defRPr>
-                <a:solidFill>
-                  <a:schemeClr val="tx1"/>
-                </a:solidFill>
-                <a:latin typeface="Calibri" panose="020F0502020204030204" pitchFamily="34" charset="0"/>
-              </a:defRPr>
-            </a:lvl3pPr>
-            <a:lvl4pPr marL="1600200" indent="-228600">
-              <a:defRPr>
-                <a:solidFill>
-                  <a:schemeClr val="tx1"/>
-                </a:solidFill>
-                <a:latin typeface="Calibri" panose="020F0502020204030204" pitchFamily="34" charset="0"/>
-              </a:defRPr>
-            </a:lvl4pPr>
-            <a:lvl5pPr marL="2057400" indent="-228600">
-              <a:defRPr>
-                <a:solidFill>
-                  <a:schemeClr val="tx1"/>
-                </a:solidFill>
-                <a:latin typeface="Calibri" panose="020F0502020204030204" pitchFamily="34" charset="0"/>
-              </a:defRPr>
-            </a:lvl5pPr>
-            <a:lvl6pPr marL="2514600" indent="-228600" eaLnBrk="0" fontAlgn="base" hangingPunct="0">
-              <a:spcBef>
-                <a:spcPct val="0"/>
-              </a:spcBef>
-              <a:spcAft>
-                <a:spcPct val="0"/>
-              </a:spcAft>
-              <a:defRPr>
-                <a:solidFill>
-                  <a:schemeClr val="tx1"/>
-                </a:solidFill>
-                <a:latin typeface="Calibri" panose="020F0502020204030204" pitchFamily="34" charset="0"/>
-              </a:defRPr>
-            </a:lvl6pPr>
-            <a:lvl7pPr marL="2971800" indent="-228600" eaLnBrk="0" fontAlgn="base" hangingPunct="0">
-              <a:spcBef>
-                <a:spcPct val="0"/>
-              </a:spcBef>
-              <a:spcAft>
-                <a:spcPct val="0"/>
-              </a:spcAft>
-              <a:defRPr>
-                <a:solidFill>
-                  <a:schemeClr val="tx1"/>
-                </a:solidFill>
-                <a:latin typeface="Calibri" panose="020F0502020204030204" pitchFamily="34" charset="0"/>
-              </a:defRPr>
-            </a:lvl7pPr>
-            <a:lvl8pPr marL="3429000" indent="-228600" eaLnBrk="0" fontAlgn="base" hangingPunct="0">
-              <a:spcBef>
-                <a:spcPct val="0"/>
-              </a:spcBef>
-              <a:spcAft>
-                <a:spcPct val="0"/>
-              </a:spcAft>
-              <a:defRPr>
-                <a:solidFill>
-                  <a:schemeClr val="tx1"/>
-                </a:solidFill>
-                <a:latin typeface="Calibri" panose="020F0502020204030204" pitchFamily="34" charset="0"/>
-              </a:defRPr>
-            </a:lvl8pPr>
-            <a:lvl9pPr marL="3886200" indent="-228600" eaLnBrk="0" fontAlgn="base" hangingPunct="0">
-              <a:spcBef>
-                <a:spcPct val="0"/>
-              </a:spcBef>
-              <a:spcAft>
-                <a:spcPct val="0"/>
-              </a:spcAft>
-              <a:defRPr>
-                <a:solidFill>
-                  <a:schemeClr val="tx1"/>
-                </a:solidFill>
-                <a:latin typeface="Calibri" panose="020F0502020204030204" pitchFamily="34" charset="0"/>
-              </a:defRPr>
-            </a:lvl9pPr>
-          </a:lstStyle>
-          <a:p>
-            <a:pPr algn="ctr" eaLnBrk="1" hangingPunct="1"/>
-            <a:r>
-              <a:rPr lang="en-US" altLang="en-US" sz="1100" dirty="0">
-                <a:latin typeface="Arial" panose="020B0604020202020204" pitchFamily="34" charset="0"/>
-                <a:ea typeface="Amazon Ember" panose="020B0603020204020204" pitchFamily="34" charset="0"/>
-                <a:cs typeface="Arial" panose="020B0604020202020204" pitchFamily="34" charset="0"/>
-              </a:rPr>
-              <a:t>Templates</a:t>
-            </a:r>
-          </a:p>
-        </p:txBody>
-      </p:sp>
-      <p:pic>
-        <p:nvPicPr>
-          <p:cNvPr id="16" name="Graphic 36">
-            <a:extLst>
-              <a:ext uri="{FF2B5EF4-FFF2-40B4-BE49-F238E27FC236}">
-                <a16:creationId xmlns:a16="http://schemas.microsoft.com/office/drawing/2014/main" id="{D4E791B5-6CF3-432A-84AB-E3230B84CCA0}"/>
-              </a:ext>
-            </a:extLst>
-          </p:cNvPr>
-          <p:cNvPicPr>
-            <a:picLocks noChangeAspect="1" noChangeArrowheads="1"/>
-          </p:cNvPicPr>
-          <p:nvPr/>
-        </p:nvPicPr>
-        <p:blipFill>
-          <a:blip r:embed="rId4">
-            <a:extLst>
-              <a:ext uri="{28A0092B-C50C-407E-A947-70E740481C1C}">
-                <a14:useLocalDpi xmlns:a14="http://schemas.microsoft.com/office/drawing/2010/main" val="0"/>
-              </a:ext>
-            </a:extLst>
-          </a:blip>
-          <a:srcRect/>
-          <a:stretch>
-            <a:fillRect/>
-          </a:stretch>
-        </p:blipFill>
-        <p:spPr bwMode="auto">
-          <a:xfrm>
-            <a:off x="8380759" y="2288150"/>
-            <a:ext cx="457200" cy="457200"/>
-          </a:xfrm>
-          <a:prstGeom prst="rect">
-            <a:avLst/>
-          </a:prstGeom>
-          <a:noFill/>
-          <a:ln>
-            <a:noFill/>
-          </a:ln>
-          <a:extLst>
-            <a:ext uri="{909E8E84-426E-40DD-AFC4-6F175D3DCCD1}">
-              <a14:hiddenFill xmlns:a14="http://schemas.microsoft.com/office/drawing/2010/main">
-                <a:solidFill>
-                  <a:srgbClr val="FFFFFF"/>
-                </a:solidFill>
-              </a14:hiddenFill>
-            </a:ext>
-            <a:ext uri="{91240B29-F687-4F45-9708-019B960494DF}">
-              <a14:hiddenLine xmlns:a14="http://schemas.microsoft.com/office/drawing/2010/main" w="9525">
-                <a:solidFill>
-                  <a:srgbClr val="000000"/>
-                </a:solidFill>
-                <a:miter lim="800000"/>
-                <a:headEnd/>
-                <a:tailEnd/>
-              </a14:hiddenLine>
-            </a:ext>
-          </a:extLst>
-        </p:spPr>
-      </p:pic>
-      <p:cxnSp>
-        <p:nvCxnSpPr>
-          <p:cNvPr id="17" name="Straight Arrow Connector 16">
-            <a:extLst>
-              <a:ext uri="{FF2B5EF4-FFF2-40B4-BE49-F238E27FC236}">
-                <a16:creationId xmlns:a16="http://schemas.microsoft.com/office/drawing/2014/main" id="{2EEE01CD-7034-466B-B917-32DA22EE2833}"/>
-              </a:ext>
-            </a:extLst>
-          </p:cNvPr>
-          <p:cNvCxnSpPr>
-            <a:cxnSpLocks/>
-            <a:stCxn id="19" idx="0"/>
-            <a:endCxn id="15" idx="2"/>
-          </p:cNvCxnSpPr>
-          <p:nvPr/>
-        </p:nvCxnSpPr>
-        <p:spPr>
-          <a:xfrm flipH="1" flipV="1">
-            <a:off x="8609359" y="3178486"/>
-            <a:ext cx="1" cy="441818"/>
-          </a:xfrm>
-          <a:prstGeom prst="straightConnector1">
-            <a:avLst/>
-          </a:prstGeom>
-          <a:ln w="12700">
-            <a:solidFill>
-              <a:srgbClr val="545B64"/>
-            </a:solidFill>
-            <a:headEnd type="none" w="med" len="sm"/>
-            <a:tailEnd type="arrow" w="med" len="sm"/>
-          </a:ln>
-        </p:spPr>
-        <p:style>
-          <a:lnRef idx="1">
-            <a:schemeClr val="accent1"/>
-          </a:lnRef>
-          <a:fillRef idx="0">
-            <a:schemeClr val="accent1"/>
-          </a:fillRef>
-          <a:effectRef idx="0">
-            <a:schemeClr val="accent1"/>
-          </a:effectRef>
-          <a:fontRef idx="minor">
-            <a:schemeClr val="tx1"/>
-          </a:fontRef>
-        </p:style>
-      </p:cxnSp>
-      <p:pic>
-        <p:nvPicPr>
-          <p:cNvPr id="19" name="Picture 18">
-            <a:extLst>
-              <a:ext uri="{FF2B5EF4-FFF2-40B4-BE49-F238E27FC236}">
-                <a16:creationId xmlns:a16="http://schemas.microsoft.com/office/drawing/2014/main" id="{BAF9B802-4177-46CA-9D6A-FDF8DC957FF3}"/>
-              </a:ext>
-            </a:extLst>
-          </p:cNvPr>
-          <p:cNvPicPr>
-            <a:picLocks noChangeAspect="1"/>
-          </p:cNvPicPr>
-          <p:nvPr/>
-        </p:nvPicPr>
-        <p:blipFill>
-          <a:blip r:embed="rId5">
-            <a:extLst>
-              <a:ext uri="{28A0092B-C50C-407E-A947-70E740481C1C}">
-                <a14:useLocalDpi xmlns:a14="http://schemas.microsoft.com/office/drawing/2010/main" val="0"/>
-              </a:ext>
-            </a:extLst>
-          </a:blip>
-          <a:stretch>
-            <a:fillRect/>
-          </a:stretch>
-        </p:blipFill>
-        <p:spPr>
-          <a:xfrm>
-            <a:off x="8310623" y="3620304"/>
-            <a:ext cx="597473" cy="758952"/>
-          </a:xfrm>
-          <a:prstGeom prst="rect">
-            <a:avLst/>
-          </a:prstGeom>
-        </p:spPr>
-      </p:pic>
-      <p:sp>
-        <p:nvSpPr>
-          <p:cNvPr id="23" name="TextBox 17">
-            <a:extLst>
-              <a:ext uri="{FF2B5EF4-FFF2-40B4-BE49-F238E27FC236}">
-                <a16:creationId xmlns:a16="http://schemas.microsoft.com/office/drawing/2014/main" id="{C7C13FD0-182B-40EB-B0D7-4FF26E4749C5}"/>
-              </a:ext>
-            </a:extLst>
-          </p:cNvPr>
-          <p:cNvSpPr txBox="1">
-            <a:spLocks noChangeArrowheads="1"/>
-          </p:cNvSpPr>
-          <p:nvPr/>
-        </p:nvSpPr>
-        <p:spPr bwMode="auto">
-          <a:xfrm>
-            <a:off x="9780934" y="4144435"/>
-            <a:ext cx="1362074" cy="261610"/>
-          </a:xfrm>
-          <a:prstGeom prst="rect">
-            <a:avLst/>
-          </a:prstGeom>
-          <a:noFill/>
-          <a:ln>
-            <a:noFill/>
-          </a:ln>
-          <a:extLst>
-            <a:ext uri="{909E8E84-426E-40DD-AFC4-6F175D3DCCD1}">
-              <a14:hiddenFill xmlns:a14="http://schemas.microsoft.com/office/drawing/2010/main">
-                <a:solidFill>
-                  <a:srgbClr val="FFFFFF"/>
-                </a:solidFill>
-              </a14:hiddenFill>
-            </a:ext>
-            <a:ext uri="{91240B29-F687-4F45-9708-019B960494DF}">
-              <a14:hiddenLine xmlns:a14="http://schemas.microsoft.com/office/drawing/2010/main" w="9525">
-                <a:solidFill>
-                  <a:srgbClr val="000000"/>
-                </a:solidFill>
-                <a:miter lim="800000"/>
-                <a:headEnd/>
-                <a:tailEnd/>
-              </a14:hiddenLine>
-            </a:ext>
-          </a:extLst>
-        </p:spPr>
-        <p:txBody>
-          <a:bodyPr wrap="square">
-            <a:spAutoFit/>
-          </a:bodyPr>
-          <a:lstStyle>
-            <a:lvl1pPr>
-              <a:defRPr>
-                <a:solidFill>
-                  <a:schemeClr val="tx1"/>
-                </a:solidFill>
-                <a:latin typeface="Calibri" panose="020F0502020204030204" pitchFamily="34" charset="0"/>
-              </a:defRPr>
-            </a:lvl1pPr>
-            <a:lvl2pPr marL="742950" indent="-285750">
-              <a:defRPr>
-                <a:solidFill>
-                  <a:schemeClr val="tx1"/>
-                </a:solidFill>
-                <a:latin typeface="Calibri" panose="020F0502020204030204" pitchFamily="34" charset="0"/>
-              </a:defRPr>
-            </a:lvl2pPr>
-            <a:lvl3pPr marL="1143000" indent="-228600">
-              <a:defRPr>
-                <a:solidFill>
-                  <a:schemeClr val="tx1"/>
-                </a:solidFill>
-                <a:latin typeface="Calibri" panose="020F0502020204030204" pitchFamily="34" charset="0"/>
-              </a:defRPr>
-            </a:lvl3pPr>
-            <a:lvl4pPr marL="1600200" indent="-228600">
-              <a:defRPr>
-                <a:solidFill>
-                  <a:schemeClr val="tx1"/>
-                </a:solidFill>
-                <a:latin typeface="Calibri" panose="020F0502020204030204" pitchFamily="34" charset="0"/>
-              </a:defRPr>
-            </a:lvl4pPr>
-            <a:lvl5pPr marL="2057400" indent="-228600">
-              <a:defRPr>
-                <a:solidFill>
-                  <a:schemeClr val="tx1"/>
-                </a:solidFill>
-                <a:latin typeface="Calibri" panose="020F0502020204030204" pitchFamily="34" charset="0"/>
-              </a:defRPr>
-            </a:lvl5pPr>
-            <a:lvl6pPr marL="2514600" indent="-228600" eaLnBrk="0" fontAlgn="base" hangingPunct="0">
-              <a:spcBef>
-                <a:spcPct val="0"/>
-              </a:spcBef>
-              <a:spcAft>
-                <a:spcPct val="0"/>
-              </a:spcAft>
-              <a:defRPr>
-                <a:solidFill>
-                  <a:schemeClr val="tx1"/>
-                </a:solidFill>
-                <a:latin typeface="Calibri" panose="020F0502020204030204" pitchFamily="34" charset="0"/>
-              </a:defRPr>
-            </a:lvl6pPr>
-            <a:lvl7pPr marL="2971800" indent="-228600" eaLnBrk="0" fontAlgn="base" hangingPunct="0">
-              <a:spcBef>
-                <a:spcPct val="0"/>
-              </a:spcBef>
-              <a:spcAft>
-                <a:spcPct val="0"/>
-              </a:spcAft>
-              <a:defRPr>
-                <a:solidFill>
-                  <a:schemeClr val="tx1"/>
-                </a:solidFill>
-                <a:latin typeface="Calibri" panose="020F0502020204030204" pitchFamily="34" charset="0"/>
-              </a:defRPr>
-            </a:lvl7pPr>
-            <a:lvl8pPr marL="3429000" indent="-228600" eaLnBrk="0" fontAlgn="base" hangingPunct="0">
-              <a:spcBef>
-                <a:spcPct val="0"/>
-              </a:spcBef>
-              <a:spcAft>
-                <a:spcPct val="0"/>
-              </a:spcAft>
-              <a:defRPr>
-                <a:solidFill>
-                  <a:schemeClr val="tx1"/>
-                </a:solidFill>
-                <a:latin typeface="Calibri" panose="020F0502020204030204" pitchFamily="34" charset="0"/>
-              </a:defRPr>
-            </a:lvl8pPr>
-            <a:lvl9pPr marL="3886200" indent="-228600" eaLnBrk="0" fontAlgn="base" hangingPunct="0">
-              <a:spcBef>
-                <a:spcPct val="0"/>
-              </a:spcBef>
-              <a:spcAft>
-                <a:spcPct val="0"/>
-              </a:spcAft>
-              <a:defRPr>
-                <a:solidFill>
-                  <a:schemeClr val="tx1"/>
-                </a:solidFill>
-                <a:latin typeface="Calibri" panose="020F0502020204030204" pitchFamily="34" charset="0"/>
-              </a:defRPr>
-            </a:lvl9pPr>
-          </a:lstStyle>
-          <a:p>
-            <a:pPr algn="ctr" eaLnBrk="1" hangingPunct="1"/>
-            <a:r>
-              <a:rPr lang="en-US" altLang="en-US" sz="1100" dirty="0">
-                <a:latin typeface="Arial" panose="020B0604020202020204" pitchFamily="34" charset="0"/>
-                <a:ea typeface="Amazon Ember" panose="020B0603020204020204" pitchFamily="34" charset="0"/>
-                <a:cs typeface="Arial" panose="020B0604020202020204" pitchFamily="34" charset="0"/>
-              </a:rPr>
-              <a:t>Lambda function</a:t>
-            </a:r>
-          </a:p>
-        </p:txBody>
-      </p:sp>
-      <p:pic>
-        <p:nvPicPr>
-          <p:cNvPr id="24" name="Graphic 13">
-            <a:extLst>
-              <a:ext uri="{FF2B5EF4-FFF2-40B4-BE49-F238E27FC236}">
-                <a16:creationId xmlns:a16="http://schemas.microsoft.com/office/drawing/2014/main" id="{053941AD-7367-4B5E-A728-2F316FDD0AB8}"/>
-              </a:ext>
-            </a:extLst>
-          </p:cNvPr>
-          <p:cNvPicPr>
-            <a:picLocks noChangeAspect="1" noChangeArrowheads="1"/>
-          </p:cNvPicPr>
-          <p:nvPr/>
-        </p:nvPicPr>
-        <p:blipFill>
-          <a:blip r:embed="rId6">
-            <a:extLst>
-              <a:ext uri="{28A0092B-C50C-407E-A947-70E740481C1C}">
-                <a14:useLocalDpi xmlns:a14="http://schemas.microsoft.com/office/drawing/2010/main" val="0"/>
-              </a:ext>
-            </a:extLst>
-          </a:blip>
-          <a:srcRect/>
-          <a:stretch>
-            <a:fillRect/>
-          </a:stretch>
-        </p:blipFill>
-        <p:spPr bwMode="auto">
-          <a:xfrm>
-            <a:off x="10241860" y="3676769"/>
-            <a:ext cx="457200" cy="457200"/>
-          </a:xfrm>
-          <a:prstGeom prst="rect">
-            <a:avLst/>
-          </a:prstGeom>
-          <a:noFill/>
-          <a:ln>
-            <a:noFill/>
-          </a:ln>
-          <a:extLst>
-            <a:ext uri="{909E8E84-426E-40DD-AFC4-6F175D3DCCD1}">
-              <a14:hiddenFill xmlns:a14="http://schemas.microsoft.com/office/drawing/2010/main">
-                <a:solidFill>
-                  <a:srgbClr val="FFFFFF"/>
-                </a:solidFill>
-              </a14:hiddenFill>
-            </a:ext>
-            <a:ext uri="{91240B29-F687-4F45-9708-019B960494DF}">
-              <a14:hiddenLine xmlns:a14="http://schemas.microsoft.com/office/drawing/2010/main" w="9525">
-                <a:solidFill>
-                  <a:srgbClr val="000000"/>
-                </a:solidFill>
-                <a:miter lim="800000"/>
-                <a:headEnd/>
-                <a:tailEnd/>
-              </a14:hiddenLine>
-            </a:ext>
-          </a:extLst>
-        </p:spPr>
-      </p:pic>
-      <p:cxnSp>
-        <p:nvCxnSpPr>
-          <p:cNvPr id="25" name="Straight Arrow Connector 24">
-            <a:extLst>
-              <a:ext uri="{FF2B5EF4-FFF2-40B4-BE49-F238E27FC236}">
-                <a16:creationId xmlns:a16="http://schemas.microsoft.com/office/drawing/2014/main" id="{FDF93F13-7606-4E1E-BC50-29F94C8D4795}"/>
-              </a:ext>
-            </a:extLst>
-          </p:cNvPr>
-          <p:cNvCxnSpPr>
-            <a:cxnSpLocks/>
-          </p:cNvCxnSpPr>
-          <p:nvPr/>
-        </p:nvCxnSpPr>
-        <p:spPr>
-          <a:xfrm>
-            <a:off x="9291306" y="3925089"/>
-            <a:ext cx="499936" cy="5809"/>
-          </a:xfrm>
-          <a:prstGeom prst="straightConnector1">
-            <a:avLst/>
-          </a:prstGeom>
-          <a:ln w="12700">
-            <a:solidFill>
-              <a:srgbClr val="545B64"/>
-            </a:solidFill>
-            <a:headEnd type="none" w="med" len="sm"/>
-            <a:tailEnd type="arrow" w="med" len="sm"/>
-          </a:ln>
-        </p:spPr>
-        <p:style>
-          <a:lnRef idx="1">
-            <a:schemeClr val="accent1"/>
-          </a:lnRef>
-          <a:fillRef idx="0">
-            <a:schemeClr val="accent1"/>
-          </a:fillRef>
-          <a:effectRef idx="0">
-            <a:schemeClr val="accent1"/>
-          </a:effectRef>
-          <a:fontRef idx="minor">
-            <a:schemeClr val="tx1"/>
-          </a:fontRef>
-        </p:style>
-      </p:cxnSp>
-      <p:cxnSp>
-        <p:nvCxnSpPr>
-          <p:cNvPr id="29" name="Straight Arrow Connector 28">
-            <a:extLst>
-              <a:ext uri="{FF2B5EF4-FFF2-40B4-BE49-F238E27FC236}">
-                <a16:creationId xmlns:a16="http://schemas.microsoft.com/office/drawing/2014/main" id="{49D284E7-0C59-49A0-9C8D-6A8081416B11}"/>
-              </a:ext>
-            </a:extLst>
-          </p:cNvPr>
-          <p:cNvCxnSpPr>
-            <a:cxnSpLocks/>
-          </p:cNvCxnSpPr>
-          <p:nvPr/>
-        </p:nvCxnSpPr>
-        <p:spPr>
-          <a:xfrm flipV="1">
-            <a:off x="5752021" y="3925089"/>
-            <a:ext cx="501472" cy="173"/>
-          </a:xfrm>
-          <a:prstGeom prst="straightConnector1">
-            <a:avLst/>
-          </a:prstGeom>
-          <a:ln w="12700">
-            <a:solidFill>
-              <a:srgbClr val="545B64"/>
-            </a:solidFill>
-            <a:headEnd type="none" w="med" len="sm"/>
-            <a:tailEnd type="arrow" w="med" len="sm"/>
-          </a:ln>
-        </p:spPr>
-        <p:style>
-          <a:lnRef idx="1">
-            <a:schemeClr val="accent1"/>
-          </a:lnRef>
-          <a:fillRef idx="0">
-            <a:schemeClr val="accent1"/>
-          </a:fillRef>
-          <a:effectRef idx="0">
-            <a:schemeClr val="accent1"/>
-          </a:effectRef>
-          <a:fontRef idx="minor">
-            <a:schemeClr val="tx1"/>
-          </a:fontRef>
-        </p:style>
-      </p:cxnSp>
-      <p:pic>
-        <p:nvPicPr>
-          <p:cNvPr id="32" name="Graphic 24">
-            <a:extLst>
-              <a:ext uri="{FF2B5EF4-FFF2-40B4-BE49-F238E27FC236}">
-                <a16:creationId xmlns:a16="http://schemas.microsoft.com/office/drawing/2014/main" id="{5BD7DF9A-34BB-4698-9B0B-AE489696F6DA}"/>
-              </a:ext>
-            </a:extLst>
-          </p:cNvPr>
-          <p:cNvPicPr>
-            <a:picLocks noChangeAspect="1" noChangeArrowheads="1"/>
-          </p:cNvPicPr>
-          <p:nvPr/>
-        </p:nvPicPr>
-        <p:blipFill>
-          <a:blip r:embed="rId7">
-            <a:extLst>
-              <a:ext uri="{96DAC541-7B7A-43D3-8B79-37D633B846F1}">
-                <asvg:svgBlip xmlns:asvg="http://schemas.microsoft.com/office/drawing/2016/SVG/main" r:embed="rId8"/>
-              </a:ext>
-            </a:extLst>
-          </a:blip>
-          <a:srcRect/>
-          <a:stretch/>
-        </p:blipFill>
-        <p:spPr bwMode="auto">
-          <a:xfrm>
-            <a:off x="4831271" y="3670419"/>
-            <a:ext cx="469900" cy="469900"/>
-          </a:xfrm>
-          <a:prstGeom prst="rect">
-            <a:avLst/>
-          </a:prstGeom>
-          <a:noFill/>
-          <a:ln>
-            <a:noFill/>
-          </a:ln>
-          <a:extLst>
-            <a:ext uri="{909E8E84-426E-40DD-AFC4-6F175D3DCCD1}">
-              <a14:hiddenFill xmlns:a14="http://schemas.microsoft.com/office/drawing/2010/main">
-                <a:solidFill>
-                  <a:srgbClr val="FFFFFF"/>
-                </a:solidFill>
-              </a14:hiddenFill>
-            </a:ext>
-            <a:ext uri="{91240B29-F687-4F45-9708-019B960494DF}">
-              <a14:hiddenLine xmlns:a14="http://schemas.microsoft.com/office/drawing/2010/main" w="9525">
-                <a:solidFill>
-                  <a:srgbClr val="000000"/>
-                </a:solidFill>
-                <a:miter lim="800000"/>
-                <a:headEnd/>
-                <a:tailEnd/>
-              </a14:hiddenLine>
-            </a:ext>
-          </a:extLst>
-        </p:spPr>
-      </p:pic>
-      <p:sp>
-        <p:nvSpPr>
-          <p:cNvPr id="33" name="TextBox 25">
-            <a:extLst>
-              <a:ext uri="{FF2B5EF4-FFF2-40B4-BE49-F238E27FC236}">
-                <a16:creationId xmlns:a16="http://schemas.microsoft.com/office/drawing/2014/main" id="{7C306EF9-2BE0-4C3F-85C6-D8F7AB2B72AD}"/>
-              </a:ext>
-            </a:extLst>
-          </p:cNvPr>
-          <p:cNvSpPr txBox="1">
-            <a:spLocks noChangeArrowheads="1"/>
-          </p:cNvSpPr>
-          <p:nvPr/>
-        </p:nvSpPr>
-        <p:spPr bwMode="auto">
-          <a:xfrm>
-            <a:off x="4529646" y="4144435"/>
-            <a:ext cx="1073150" cy="261610"/>
-          </a:xfrm>
-          <a:prstGeom prst="rect">
-            <a:avLst/>
-          </a:prstGeom>
-          <a:noFill/>
-          <a:ln>
-            <a:noFill/>
-          </a:ln>
-          <a:extLst>
-            <a:ext uri="{909E8E84-426E-40DD-AFC4-6F175D3DCCD1}">
-              <a14:hiddenFill xmlns:a14="http://schemas.microsoft.com/office/drawing/2010/main">
-                <a:solidFill>
-                  <a:srgbClr val="FFFFFF"/>
-                </a:solidFill>
-              </a14:hiddenFill>
-            </a:ext>
-            <a:ext uri="{91240B29-F687-4F45-9708-019B960494DF}">
-              <a14:hiddenLine xmlns:a14="http://schemas.microsoft.com/office/drawing/2010/main" w="9525">
-                <a:solidFill>
-                  <a:srgbClr val="000000"/>
-                </a:solidFill>
-                <a:miter lim="800000"/>
-                <a:headEnd/>
-                <a:tailEnd/>
-              </a14:hiddenLine>
-            </a:ext>
-          </a:extLst>
-        </p:spPr>
-        <p:txBody>
-          <a:bodyPr>
-            <a:spAutoFit/>
-          </a:bodyPr>
-          <a:lstStyle>
-            <a:lvl1pPr>
-              <a:defRPr>
-                <a:solidFill>
-                  <a:schemeClr val="tx1"/>
-                </a:solidFill>
-                <a:latin typeface="Calibri" panose="020F0502020204030204" pitchFamily="34" charset="0"/>
-              </a:defRPr>
-            </a:lvl1pPr>
-            <a:lvl2pPr marL="742950" indent="-285750">
-              <a:defRPr>
-                <a:solidFill>
-                  <a:schemeClr val="tx1"/>
-                </a:solidFill>
-                <a:latin typeface="Calibri" panose="020F0502020204030204" pitchFamily="34" charset="0"/>
-              </a:defRPr>
-            </a:lvl2pPr>
-            <a:lvl3pPr marL="1143000" indent="-228600">
-              <a:defRPr>
-                <a:solidFill>
-                  <a:schemeClr val="tx1"/>
-                </a:solidFill>
-                <a:latin typeface="Calibri" panose="020F0502020204030204" pitchFamily="34" charset="0"/>
-              </a:defRPr>
-            </a:lvl3pPr>
-            <a:lvl4pPr marL="1600200" indent="-228600">
-              <a:defRPr>
-                <a:solidFill>
-                  <a:schemeClr val="tx1"/>
-                </a:solidFill>
-                <a:latin typeface="Calibri" panose="020F0502020204030204" pitchFamily="34" charset="0"/>
-              </a:defRPr>
-            </a:lvl4pPr>
-            <a:lvl5pPr marL="2057400" indent="-228600">
-              <a:defRPr>
-                <a:solidFill>
-                  <a:schemeClr val="tx1"/>
-                </a:solidFill>
-                <a:latin typeface="Calibri" panose="020F0502020204030204" pitchFamily="34" charset="0"/>
-              </a:defRPr>
-            </a:lvl5pPr>
-            <a:lvl6pPr marL="2514600" indent="-228600" eaLnBrk="0" fontAlgn="base" hangingPunct="0">
-              <a:spcBef>
-                <a:spcPct val="0"/>
-              </a:spcBef>
-              <a:spcAft>
-                <a:spcPct val="0"/>
-              </a:spcAft>
-              <a:defRPr>
-                <a:solidFill>
-                  <a:schemeClr val="tx1"/>
-                </a:solidFill>
-                <a:latin typeface="Calibri" panose="020F0502020204030204" pitchFamily="34" charset="0"/>
-              </a:defRPr>
-            </a:lvl6pPr>
-            <a:lvl7pPr marL="2971800" indent="-228600" eaLnBrk="0" fontAlgn="base" hangingPunct="0">
-              <a:spcBef>
-                <a:spcPct val="0"/>
-              </a:spcBef>
-              <a:spcAft>
-                <a:spcPct val="0"/>
-              </a:spcAft>
-              <a:defRPr>
-                <a:solidFill>
-                  <a:schemeClr val="tx1"/>
-                </a:solidFill>
-                <a:latin typeface="Calibri" panose="020F0502020204030204" pitchFamily="34" charset="0"/>
-              </a:defRPr>
-            </a:lvl7pPr>
-            <a:lvl8pPr marL="3429000" indent="-228600" eaLnBrk="0" fontAlgn="base" hangingPunct="0">
-              <a:spcBef>
-                <a:spcPct val="0"/>
-              </a:spcBef>
-              <a:spcAft>
-                <a:spcPct val="0"/>
-              </a:spcAft>
-              <a:defRPr>
-                <a:solidFill>
-                  <a:schemeClr val="tx1"/>
-                </a:solidFill>
-                <a:latin typeface="Calibri" panose="020F0502020204030204" pitchFamily="34" charset="0"/>
-              </a:defRPr>
-            </a:lvl8pPr>
-            <a:lvl9pPr marL="3886200" indent="-228600" eaLnBrk="0" fontAlgn="base" hangingPunct="0">
-              <a:spcBef>
-                <a:spcPct val="0"/>
-              </a:spcBef>
-              <a:spcAft>
-                <a:spcPct val="0"/>
-              </a:spcAft>
-              <a:defRPr>
-                <a:solidFill>
-                  <a:schemeClr val="tx1"/>
-                </a:solidFill>
-                <a:latin typeface="Calibri" panose="020F0502020204030204" pitchFamily="34" charset="0"/>
-              </a:defRPr>
-            </a:lvl9pPr>
-          </a:lstStyle>
-          <a:p>
-            <a:pPr algn="ctr" eaLnBrk="1" hangingPunct="1"/>
-            <a:r>
-              <a:rPr lang="en-US" altLang="en-US" sz="1100" dirty="0">
-                <a:solidFill>
-                  <a:srgbClr val="000000"/>
-                </a:solidFill>
-                <a:latin typeface="Arial" panose="020B0604020202020204" pitchFamily="34" charset="0"/>
-                <a:cs typeface="Arial" panose="020B0604020202020204" pitchFamily="34" charset="0"/>
-              </a:rPr>
-              <a:t>Source code</a:t>
-            </a:r>
-          </a:p>
-        </p:txBody>
-      </p:sp>
-      <p:sp>
-        <p:nvSpPr>
-          <p:cNvPr id="34" name="Rectangle 33">
-            <a:extLst>
-              <a:ext uri="{FF2B5EF4-FFF2-40B4-BE49-F238E27FC236}">
-                <a16:creationId xmlns:a16="http://schemas.microsoft.com/office/drawing/2014/main" id="{F2C226CF-325A-453B-9486-3BA919225574}"/>
-              </a:ext>
-            </a:extLst>
-          </p:cNvPr>
-          <p:cNvSpPr/>
-          <p:nvPr/>
-        </p:nvSpPr>
-        <p:spPr>
-          <a:xfrm>
-            <a:off x="3961283" y="1309391"/>
-            <a:ext cx="7473530" cy="5072157"/>
-          </a:xfrm>
-          <a:prstGeom prst="rect">
-            <a:avLst/>
-          </a:prstGeom>
-          <a:noFill/>
-          <a:ln w="12700">
-            <a:solidFill>
-              <a:srgbClr val="3A47CB"/>
-            </a:solidFill>
-          </a:ln>
-        </p:spPr>
-        <p:style>
-          <a:lnRef idx="2">
-            <a:schemeClr val="accent1">
-              <a:shade val="50000"/>
-            </a:schemeClr>
-          </a:lnRef>
-          <a:fillRef idx="1">
-            <a:schemeClr val="accent1"/>
-          </a:fillRef>
-          <a:effectRef idx="0">
-            <a:schemeClr val="accent1"/>
-          </a:effectRef>
-          <a:fontRef idx="minor">
-            <a:schemeClr val="lt1"/>
-          </a:fontRef>
-        </p:style>
-        <p:txBody>
-          <a:bodyPr lIns="502920" tIns="91440"/>
-          <a:lstStyle/>
-          <a:p>
-            <a:pPr eaLnBrk="1" fontAlgn="auto" hangingPunct="1">
-              <a:spcBef>
-                <a:spcPts val="0"/>
-              </a:spcBef>
-              <a:spcAft>
-                <a:spcPts val="0"/>
-              </a:spcAft>
-              <a:defRPr/>
-            </a:pPr>
-            <a:r>
-              <a:rPr lang="en-US" sz="1200" dirty="0">
-                <a:solidFill>
-                  <a:srgbClr val="3A47CB"/>
-                </a:solidFill>
-                <a:latin typeface="Arial" panose="020B0604020202020204" pitchFamily="34" charset="0"/>
-                <a:cs typeface="Arial" panose="020B0604020202020204" pitchFamily="34" charset="0"/>
-              </a:rPr>
-              <a:t>AWS CodePipeline</a:t>
-            </a:r>
-          </a:p>
-        </p:txBody>
-      </p:sp>
-      <p:pic>
-        <p:nvPicPr>
-          <p:cNvPr id="35" name="Graphic 34">
-            <a:extLst>
-              <a:ext uri="{FF2B5EF4-FFF2-40B4-BE49-F238E27FC236}">
-                <a16:creationId xmlns:a16="http://schemas.microsoft.com/office/drawing/2014/main" id="{86D2FD10-EED4-46DA-BBD0-860A38496AF9}"/>
-              </a:ext>
-            </a:extLst>
-          </p:cNvPr>
-          <p:cNvPicPr>
-            <a:picLocks noChangeAspect="1"/>
-          </p:cNvPicPr>
-          <p:nvPr/>
-        </p:nvPicPr>
-        <p:blipFill>
-          <a:blip r:embed="rId9">
-            <a:extLst>
-              <a:ext uri="{28A0092B-C50C-407E-A947-70E740481C1C}">
-                <a14:useLocalDpi xmlns:a14="http://schemas.microsoft.com/office/drawing/2010/main" val="0"/>
-              </a:ext>
-              <a:ext uri="{96DAC541-7B7A-43D3-8B79-37D633B846F1}">
-                <asvg:svgBlip xmlns:asvg="http://schemas.microsoft.com/office/drawing/2016/SVG/main" r:embed="rId10"/>
-              </a:ext>
-            </a:extLst>
-          </a:blip>
-          <a:srcRect/>
-          <a:stretch/>
-        </p:blipFill>
-        <p:spPr>
-          <a:xfrm>
-            <a:off x="3961281" y="1305667"/>
-            <a:ext cx="394721" cy="402907"/>
-          </a:xfrm>
-          <a:prstGeom prst="rect">
-            <a:avLst/>
-          </a:prstGeom>
-        </p:spPr>
-      </p:pic>
-      <p:sp>
-        <p:nvSpPr>
-          <p:cNvPr id="36" name="Rectangle 35">
-            <a:extLst>
-              <a:ext uri="{FF2B5EF4-FFF2-40B4-BE49-F238E27FC236}">
-                <a16:creationId xmlns:a16="http://schemas.microsoft.com/office/drawing/2014/main" id="{74254B5D-06EE-4D28-BF05-5463D6F1933F}"/>
-              </a:ext>
-            </a:extLst>
-          </p:cNvPr>
-          <p:cNvSpPr/>
-          <p:nvPr/>
-        </p:nvSpPr>
-        <p:spPr>
-          <a:xfrm>
-            <a:off x="3568467" y="885701"/>
-            <a:ext cx="8289857" cy="5765356"/>
-          </a:xfrm>
-          <a:prstGeom prst="rect">
-            <a:avLst/>
-          </a:prstGeom>
-          <a:noFill/>
-          <a:ln w="12700">
-            <a:solidFill>
-              <a:schemeClr val="tx1"/>
-            </a:solidFill>
-          </a:ln>
-        </p:spPr>
-        <p:style>
-          <a:lnRef idx="2">
-            <a:schemeClr val="accent1">
-              <a:shade val="50000"/>
-            </a:schemeClr>
-          </a:lnRef>
-          <a:fillRef idx="1">
-            <a:schemeClr val="accent1"/>
-          </a:fillRef>
-          <a:effectRef idx="0">
-            <a:schemeClr val="accent1"/>
-          </a:effectRef>
-          <a:fontRef idx="minor">
-            <a:schemeClr val="lt1"/>
-          </a:fontRef>
-        </p:style>
-        <p:txBody>
-          <a:bodyPr lIns="502920" tIns="91440"/>
-          <a:lstStyle/>
-          <a:p>
-            <a:pPr eaLnBrk="1" fontAlgn="auto" hangingPunct="1">
-              <a:spcBef>
-                <a:spcPts val="0"/>
-              </a:spcBef>
-              <a:spcAft>
-                <a:spcPts val="0"/>
-              </a:spcAft>
-              <a:defRPr/>
-            </a:pPr>
-            <a:r>
-              <a:rPr lang="en-US" sz="1200" dirty="0">
-                <a:solidFill>
-                  <a:sysClr val="windowText" lastClr="000000"/>
-                </a:solidFill>
-                <a:latin typeface="Arial" panose="020B0604020202020204" pitchFamily="34" charset="0"/>
-                <a:cs typeface="Arial" panose="020B0604020202020204" pitchFamily="34" charset="0"/>
-              </a:rPr>
-              <a:t>AWS Cloud</a:t>
-            </a:r>
-          </a:p>
-        </p:txBody>
-      </p:sp>
-      <p:pic>
-        <p:nvPicPr>
-          <p:cNvPr id="37" name="Graphic 36">
-            <a:extLst>
-              <a:ext uri="{FF2B5EF4-FFF2-40B4-BE49-F238E27FC236}">
-                <a16:creationId xmlns:a16="http://schemas.microsoft.com/office/drawing/2014/main" id="{2D6102D5-A4A9-441A-BCF7-4334A91673C3}"/>
-              </a:ext>
-            </a:extLst>
-          </p:cNvPr>
-          <p:cNvPicPr>
-            <a:picLocks noChangeAspect="1"/>
-          </p:cNvPicPr>
-          <p:nvPr/>
-        </p:nvPicPr>
-        <p:blipFill>
-          <a:blip r:embed="rId11">
-            <a:extLst>
-              <a:ext uri="{96DAC541-7B7A-43D3-8B79-37D633B846F1}">
-                <asvg:svgBlip xmlns:asvg="http://schemas.microsoft.com/office/drawing/2016/SVG/main" r:embed="rId12"/>
-              </a:ext>
-            </a:extLst>
-          </a:blip>
-          <a:srcRect/>
-          <a:stretch/>
-        </p:blipFill>
-        <p:spPr>
-          <a:xfrm>
-            <a:off x="3568466" y="885702"/>
-            <a:ext cx="381000" cy="381000"/>
-          </a:xfrm>
-          <a:prstGeom prst="rect">
-            <a:avLst/>
-          </a:prstGeom>
-        </p:spPr>
-      </p:pic>
-      <p:cxnSp>
-        <p:nvCxnSpPr>
-          <p:cNvPr id="38" name="Straight Arrow Connector 37">
-            <a:extLst>
-              <a:ext uri="{FF2B5EF4-FFF2-40B4-BE49-F238E27FC236}">
-                <a16:creationId xmlns:a16="http://schemas.microsoft.com/office/drawing/2014/main" id="{4C7B26E6-6E20-4136-AD4B-39EBD0C9D317}"/>
-              </a:ext>
-            </a:extLst>
-          </p:cNvPr>
-          <p:cNvCxnSpPr>
-            <a:cxnSpLocks/>
-            <a:stCxn id="46" idx="3"/>
-          </p:cNvCxnSpPr>
-          <p:nvPr/>
-        </p:nvCxnSpPr>
-        <p:spPr>
-          <a:xfrm flipV="1">
-            <a:off x="2686775" y="3925262"/>
-            <a:ext cx="1693646" cy="3265"/>
-          </a:xfrm>
-          <a:prstGeom prst="straightConnector1">
-            <a:avLst/>
-          </a:prstGeom>
-          <a:ln w="12700">
-            <a:solidFill>
-              <a:srgbClr val="545B64"/>
-            </a:solidFill>
-            <a:headEnd type="none" w="med" len="sm"/>
-            <a:tailEnd type="arrow" w="med" len="sm"/>
-          </a:ln>
-        </p:spPr>
-        <p:style>
-          <a:lnRef idx="1">
-            <a:schemeClr val="accent1"/>
-          </a:lnRef>
-          <a:fillRef idx="0">
-            <a:schemeClr val="accent1"/>
-          </a:fillRef>
-          <a:effectRef idx="0">
-            <a:schemeClr val="accent1"/>
-          </a:effectRef>
-          <a:fontRef idx="minor">
-            <a:schemeClr val="tx1"/>
-          </a:fontRef>
-        </p:style>
-      </p:cxnSp>
-      <p:sp>
-        <p:nvSpPr>
-          <p:cNvPr id="39" name="TextBox 20">
-            <a:extLst>
-              <a:ext uri="{FF2B5EF4-FFF2-40B4-BE49-F238E27FC236}">
-                <a16:creationId xmlns:a16="http://schemas.microsoft.com/office/drawing/2014/main" id="{013A152C-294B-480C-95FD-2B2A682FBA2F}"/>
-              </a:ext>
-            </a:extLst>
-          </p:cNvPr>
-          <p:cNvSpPr txBox="1">
-            <a:spLocks noChangeArrowheads="1"/>
-          </p:cNvSpPr>
-          <p:nvPr/>
-        </p:nvSpPr>
-        <p:spPr bwMode="auto">
-          <a:xfrm>
-            <a:off x="1989282" y="4206093"/>
-            <a:ext cx="939073" cy="461665"/>
-          </a:xfrm>
-          <a:prstGeom prst="rect">
-            <a:avLst/>
-          </a:prstGeom>
-          <a:noFill/>
-          <a:ln>
-            <a:noFill/>
-          </a:ln>
-          <a:extLst>
-            <a:ext uri="{909E8E84-426E-40DD-AFC4-6F175D3DCCD1}">
-              <a14:hiddenFill xmlns:a14="http://schemas.microsoft.com/office/drawing/2010/main">
-                <a:solidFill>
-                  <a:srgbClr val="FFFFFF"/>
-                </a:solidFill>
-              </a14:hiddenFill>
-            </a:ext>
-            <a:ext uri="{91240B29-F687-4F45-9708-019B960494DF}">
-              <a14:hiddenLine xmlns:a14="http://schemas.microsoft.com/office/drawing/2010/main" w="9525">
-                <a:solidFill>
-                  <a:srgbClr val="000000"/>
-                </a:solidFill>
-                <a:miter lim="800000"/>
-                <a:headEnd/>
-                <a:tailEnd/>
-              </a14:hiddenLine>
-            </a:ext>
-          </a:extLst>
-        </p:spPr>
-        <p:txBody>
-          <a:bodyPr wrap="square">
-            <a:spAutoFit/>
-          </a:bodyPr>
-          <a:lstStyle>
-            <a:lvl1pPr>
-              <a:defRPr>
-                <a:solidFill>
-                  <a:schemeClr val="tx1"/>
-                </a:solidFill>
-                <a:latin typeface="Calibri" panose="020F0502020204030204" pitchFamily="34" charset="0"/>
-              </a:defRPr>
-            </a:lvl1pPr>
-            <a:lvl2pPr marL="742950" indent="-285750">
-              <a:defRPr>
-                <a:solidFill>
-                  <a:schemeClr val="tx1"/>
-                </a:solidFill>
-                <a:latin typeface="Calibri" panose="020F0502020204030204" pitchFamily="34" charset="0"/>
-              </a:defRPr>
-            </a:lvl2pPr>
-            <a:lvl3pPr marL="1143000" indent="-228600">
-              <a:defRPr>
-                <a:solidFill>
-                  <a:schemeClr val="tx1"/>
-                </a:solidFill>
-                <a:latin typeface="Calibri" panose="020F0502020204030204" pitchFamily="34" charset="0"/>
-              </a:defRPr>
-            </a:lvl3pPr>
-            <a:lvl4pPr marL="1600200" indent="-228600">
-              <a:defRPr>
-                <a:solidFill>
-                  <a:schemeClr val="tx1"/>
-                </a:solidFill>
-                <a:latin typeface="Calibri" panose="020F0502020204030204" pitchFamily="34" charset="0"/>
-              </a:defRPr>
-            </a:lvl4pPr>
-            <a:lvl5pPr marL="2057400" indent="-228600">
-              <a:defRPr>
-                <a:solidFill>
-                  <a:schemeClr val="tx1"/>
-                </a:solidFill>
-                <a:latin typeface="Calibri" panose="020F0502020204030204" pitchFamily="34" charset="0"/>
-              </a:defRPr>
-            </a:lvl5pPr>
-            <a:lvl6pPr marL="2514600" indent="-228600" eaLnBrk="0" fontAlgn="base" hangingPunct="0">
-              <a:spcBef>
-                <a:spcPct val="0"/>
-              </a:spcBef>
-              <a:spcAft>
-                <a:spcPct val="0"/>
-              </a:spcAft>
-              <a:defRPr>
-                <a:solidFill>
-                  <a:schemeClr val="tx1"/>
-                </a:solidFill>
-                <a:latin typeface="Calibri" panose="020F0502020204030204" pitchFamily="34" charset="0"/>
-              </a:defRPr>
-            </a:lvl6pPr>
-            <a:lvl7pPr marL="2971800" indent="-228600" eaLnBrk="0" fontAlgn="base" hangingPunct="0">
-              <a:spcBef>
-                <a:spcPct val="0"/>
-              </a:spcBef>
-              <a:spcAft>
-                <a:spcPct val="0"/>
-              </a:spcAft>
-              <a:defRPr>
-                <a:solidFill>
-                  <a:schemeClr val="tx1"/>
-                </a:solidFill>
-                <a:latin typeface="Calibri" panose="020F0502020204030204" pitchFamily="34" charset="0"/>
-              </a:defRPr>
-            </a:lvl7pPr>
-            <a:lvl8pPr marL="3429000" indent="-228600" eaLnBrk="0" fontAlgn="base" hangingPunct="0">
-              <a:spcBef>
-                <a:spcPct val="0"/>
-              </a:spcBef>
-              <a:spcAft>
-                <a:spcPct val="0"/>
-              </a:spcAft>
-              <a:defRPr>
-                <a:solidFill>
-                  <a:schemeClr val="tx1"/>
-                </a:solidFill>
-                <a:latin typeface="Calibri" panose="020F0502020204030204" pitchFamily="34" charset="0"/>
-              </a:defRPr>
-            </a:lvl8pPr>
-            <a:lvl9pPr marL="3886200" indent="-228600" eaLnBrk="0" fontAlgn="base" hangingPunct="0">
-              <a:spcBef>
-                <a:spcPct val="0"/>
-              </a:spcBef>
-              <a:spcAft>
-                <a:spcPct val="0"/>
-              </a:spcAft>
-              <a:defRPr>
-                <a:solidFill>
-                  <a:schemeClr val="tx1"/>
-                </a:solidFill>
-                <a:latin typeface="Calibri" panose="020F0502020204030204" pitchFamily="34" charset="0"/>
-              </a:defRPr>
-            </a:lvl9pPr>
-          </a:lstStyle>
-          <a:p>
-            <a:pPr algn="ctr" eaLnBrk="1" hangingPunct="1"/>
-            <a:r>
-              <a:rPr lang="en-US" altLang="en-US" sz="1200" dirty="0">
-                <a:latin typeface="Arial" panose="020B0604020202020204" pitchFamily="34" charset="0"/>
-                <a:ea typeface="Amazon Ember" panose="020B0603020204020204" pitchFamily="34" charset="0"/>
-                <a:cs typeface="Arial" panose="020B0604020202020204" pitchFamily="34" charset="0"/>
-              </a:rPr>
-              <a:t>GitHub</a:t>
-            </a:r>
-          </a:p>
-          <a:p>
-            <a:pPr algn="ctr" eaLnBrk="1" hangingPunct="1"/>
-            <a:r>
-              <a:rPr lang="en-US" altLang="en-US" sz="1200" dirty="0">
-                <a:latin typeface="Arial" panose="020B0604020202020204" pitchFamily="34" charset="0"/>
-                <a:ea typeface="Amazon Ember" panose="020B0603020204020204" pitchFamily="34" charset="0"/>
-                <a:cs typeface="Arial" panose="020B0604020202020204" pitchFamily="34" charset="0"/>
-              </a:rPr>
-              <a:t>repository</a:t>
-            </a:r>
-          </a:p>
-        </p:txBody>
-      </p:sp>
-      <p:pic>
-        <p:nvPicPr>
-          <p:cNvPr id="40" name="Graphic 23">
-            <a:extLst>
-              <a:ext uri="{FF2B5EF4-FFF2-40B4-BE49-F238E27FC236}">
-                <a16:creationId xmlns:a16="http://schemas.microsoft.com/office/drawing/2014/main" id="{05320C7C-70AD-4AF3-9D3F-EEA5DF1F0111}"/>
-              </a:ext>
-            </a:extLst>
-          </p:cNvPr>
-          <p:cNvPicPr>
-            <a:picLocks noChangeAspect="1" noChangeArrowheads="1"/>
-          </p:cNvPicPr>
-          <p:nvPr/>
-        </p:nvPicPr>
-        <p:blipFill>
-          <a:blip r:embed="rId13">
-            <a:extLst>
-              <a:ext uri="{96DAC541-7B7A-43D3-8B79-37D633B846F1}">
-                <asvg:svgBlip xmlns:asvg="http://schemas.microsoft.com/office/drawing/2016/SVG/main" r:embed="rId14"/>
-              </a:ext>
-            </a:extLst>
-          </a:blip>
-          <a:srcRect/>
-          <a:stretch/>
-        </p:blipFill>
-        <p:spPr bwMode="auto">
-          <a:xfrm flipH="1">
-            <a:off x="874327" y="3693577"/>
-            <a:ext cx="469900" cy="469900"/>
-          </a:xfrm>
-          <a:prstGeom prst="rect">
-            <a:avLst/>
-          </a:prstGeom>
-          <a:noFill/>
-          <a:ln>
-            <a:noFill/>
-          </a:ln>
-          <a:extLst>
-            <a:ext uri="{909E8E84-426E-40DD-AFC4-6F175D3DCCD1}">
-              <a14:hiddenFill xmlns:a14="http://schemas.microsoft.com/office/drawing/2010/main">
-                <a:solidFill>
-                  <a:srgbClr val="FFFFFF"/>
-                </a:solidFill>
-              </a14:hiddenFill>
-            </a:ext>
-            <a:ext uri="{91240B29-F687-4F45-9708-019B960494DF}">
-              <a14:hiddenLine xmlns:a14="http://schemas.microsoft.com/office/drawing/2010/main" w="9525">
-                <a:solidFill>
-                  <a:srgbClr val="000000"/>
-                </a:solidFill>
-                <a:miter lim="800000"/>
-                <a:headEnd/>
-                <a:tailEnd/>
-              </a14:hiddenLine>
-            </a:ext>
-          </a:extLst>
-        </p:spPr>
-      </p:pic>
-      <p:sp>
-        <p:nvSpPr>
-          <p:cNvPr id="41" name="TextBox 40">
-            <a:extLst>
-              <a:ext uri="{FF2B5EF4-FFF2-40B4-BE49-F238E27FC236}">
-                <a16:creationId xmlns:a16="http://schemas.microsoft.com/office/drawing/2014/main" id="{9C2B69EE-E239-42DB-84F2-5CF39597B3E7}"/>
-              </a:ext>
-            </a:extLst>
-          </p:cNvPr>
-          <p:cNvSpPr txBox="1">
-            <a:spLocks noChangeArrowheads="1"/>
-          </p:cNvSpPr>
-          <p:nvPr/>
-        </p:nvSpPr>
-        <p:spPr bwMode="auto">
-          <a:xfrm>
-            <a:off x="578405" y="4206093"/>
-            <a:ext cx="1073150" cy="261610"/>
-          </a:xfrm>
-          <a:prstGeom prst="rect">
-            <a:avLst/>
-          </a:prstGeom>
-          <a:noFill/>
-          <a:ln>
-            <a:noFill/>
-          </a:ln>
-          <a:extLst>
-            <a:ext uri="{909E8E84-426E-40DD-AFC4-6F175D3DCCD1}">
-              <a14:hiddenFill xmlns:a14="http://schemas.microsoft.com/office/drawing/2010/main">
-                <a:solidFill>
-                  <a:srgbClr val="FFFFFF"/>
-                </a:solidFill>
-              </a14:hiddenFill>
-            </a:ext>
-            <a:ext uri="{91240B29-F687-4F45-9708-019B960494DF}">
-              <a14:hiddenLine xmlns:a14="http://schemas.microsoft.com/office/drawing/2010/main" w="9525">
-                <a:solidFill>
-                  <a:srgbClr val="000000"/>
-                </a:solidFill>
-                <a:miter lim="800000"/>
-                <a:headEnd/>
-                <a:tailEnd/>
-              </a14:hiddenLine>
-            </a:ext>
-          </a:extLst>
-        </p:spPr>
-        <p:txBody>
-          <a:bodyPr>
-            <a:spAutoFit/>
-          </a:bodyPr>
-          <a:lstStyle>
-            <a:lvl1pPr>
-              <a:defRPr>
-                <a:solidFill>
-                  <a:schemeClr val="tx1"/>
-                </a:solidFill>
-                <a:latin typeface="Calibri" panose="020F0502020204030204" pitchFamily="34" charset="0"/>
-              </a:defRPr>
-            </a:lvl1pPr>
-            <a:lvl2pPr marL="742950" indent="-285750">
-              <a:defRPr>
-                <a:solidFill>
-                  <a:schemeClr val="tx1"/>
-                </a:solidFill>
-                <a:latin typeface="Calibri" panose="020F0502020204030204" pitchFamily="34" charset="0"/>
-              </a:defRPr>
-            </a:lvl2pPr>
-            <a:lvl3pPr marL="1143000" indent="-228600">
-              <a:defRPr>
-                <a:solidFill>
-                  <a:schemeClr val="tx1"/>
-                </a:solidFill>
-                <a:latin typeface="Calibri" panose="020F0502020204030204" pitchFamily="34" charset="0"/>
-              </a:defRPr>
-            </a:lvl3pPr>
-            <a:lvl4pPr marL="1600200" indent="-228600">
-              <a:defRPr>
-                <a:solidFill>
-                  <a:schemeClr val="tx1"/>
-                </a:solidFill>
-                <a:latin typeface="Calibri" panose="020F0502020204030204" pitchFamily="34" charset="0"/>
-              </a:defRPr>
-            </a:lvl4pPr>
-            <a:lvl5pPr marL="2057400" indent="-228600">
-              <a:defRPr>
-                <a:solidFill>
-                  <a:schemeClr val="tx1"/>
-                </a:solidFill>
-                <a:latin typeface="Calibri" panose="020F0502020204030204" pitchFamily="34" charset="0"/>
-              </a:defRPr>
-            </a:lvl5pPr>
-            <a:lvl6pPr marL="2514600" indent="-228600" eaLnBrk="0" fontAlgn="base" hangingPunct="0">
-              <a:spcBef>
-                <a:spcPct val="0"/>
-              </a:spcBef>
-              <a:spcAft>
-                <a:spcPct val="0"/>
-              </a:spcAft>
-              <a:defRPr>
-                <a:solidFill>
-                  <a:schemeClr val="tx1"/>
-                </a:solidFill>
-                <a:latin typeface="Calibri" panose="020F0502020204030204" pitchFamily="34" charset="0"/>
-              </a:defRPr>
-            </a:lvl6pPr>
-            <a:lvl7pPr marL="2971800" indent="-228600" eaLnBrk="0" fontAlgn="base" hangingPunct="0">
-              <a:spcBef>
-                <a:spcPct val="0"/>
-              </a:spcBef>
-              <a:spcAft>
-                <a:spcPct val="0"/>
-              </a:spcAft>
-              <a:defRPr>
-                <a:solidFill>
-                  <a:schemeClr val="tx1"/>
-                </a:solidFill>
-                <a:latin typeface="Calibri" panose="020F0502020204030204" pitchFamily="34" charset="0"/>
-              </a:defRPr>
-            </a:lvl7pPr>
-            <a:lvl8pPr marL="3429000" indent="-228600" eaLnBrk="0" fontAlgn="base" hangingPunct="0">
-              <a:spcBef>
-                <a:spcPct val="0"/>
-              </a:spcBef>
-              <a:spcAft>
-                <a:spcPct val="0"/>
-              </a:spcAft>
-              <a:defRPr>
-                <a:solidFill>
-                  <a:schemeClr val="tx1"/>
-                </a:solidFill>
-                <a:latin typeface="Calibri" panose="020F0502020204030204" pitchFamily="34" charset="0"/>
-              </a:defRPr>
-            </a:lvl8pPr>
-            <a:lvl9pPr marL="3886200" indent="-228600" eaLnBrk="0" fontAlgn="base" hangingPunct="0">
-              <a:spcBef>
-                <a:spcPct val="0"/>
-              </a:spcBef>
-              <a:spcAft>
-                <a:spcPct val="0"/>
-              </a:spcAft>
-              <a:defRPr>
-                <a:solidFill>
-                  <a:schemeClr val="tx1"/>
-                </a:solidFill>
-                <a:latin typeface="Calibri" panose="020F0502020204030204" pitchFamily="34" charset="0"/>
-              </a:defRPr>
-            </a:lvl9pPr>
-          </a:lstStyle>
-          <a:p>
-            <a:pPr algn="ctr" eaLnBrk="1" hangingPunct="1"/>
-            <a:r>
-              <a:rPr lang="en-US" altLang="en-US" sz="1100" dirty="0">
-                <a:solidFill>
-                  <a:srgbClr val="000000"/>
-                </a:solidFill>
-                <a:latin typeface="Arial" panose="020B0604020202020204" pitchFamily="34" charset="0"/>
-                <a:cs typeface="Arial" panose="020B0604020202020204" pitchFamily="34" charset="0"/>
-              </a:rPr>
-              <a:t>Git users</a:t>
-            </a:r>
-          </a:p>
-        </p:txBody>
-      </p:sp>
-      <p:cxnSp>
-        <p:nvCxnSpPr>
-          <p:cNvPr id="42" name="Straight Arrow Connector 41">
-            <a:extLst>
-              <a:ext uri="{FF2B5EF4-FFF2-40B4-BE49-F238E27FC236}">
-                <a16:creationId xmlns:a16="http://schemas.microsoft.com/office/drawing/2014/main" id="{57637A97-C9A1-4A61-8B35-F773AB513875}"/>
-              </a:ext>
-            </a:extLst>
-          </p:cNvPr>
-          <p:cNvCxnSpPr>
-            <a:cxnSpLocks/>
-            <a:stCxn id="40" idx="1"/>
-            <a:endCxn id="46" idx="1"/>
-          </p:cNvCxnSpPr>
-          <p:nvPr/>
-        </p:nvCxnSpPr>
-        <p:spPr>
-          <a:xfrm>
-            <a:off x="1344227" y="3928527"/>
-            <a:ext cx="872648" cy="0"/>
-          </a:xfrm>
-          <a:prstGeom prst="straightConnector1">
-            <a:avLst/>
-          </a:prstGeom>
-          <a:ln w="12700">
-            <a:solidFill>
-              <a:srgbClr val="545B64"/>
-            </a:solidFill>
-            <a:headEnd type="none" w="med" len="sm"/>
-            <a:tailEnd type="arrow" w="med" len="sm"/>
-          </a:ln>
-        </p:spPr>
-        <p:style>
-          <a:lnRef idx="1">
-            <a:schemeClr val="accent1"/>
-          </a:lnRef>
-          <a:fillRef idx="0">
-            <a:schemeClr val="accent1"/>
-          </a:fillRef>
-          <a:effectRef idx="0">
-            <a:schemeClr val="accent1"/>
-          </a:effectRef>
-          <a:fontRef idx="minor">
-            <a:schemeClr val="tx1"/>
-          </a:fontRef>
-        </p:style>
-      </p:cxnSp>
-      <p:sp>
-        <p:nvSpPr>
-          <p:cNvPr id="43" name="TextBox 40">
-            <a:extLst>
-              <a:ext uri="{FF2B5EF4-FFF2-40B4-BE49-F238E27FC236}">
-                <a16:creationId xmlns:a16="http://schemas.microsoft.com/office/drawing/2014/main" id="{3C11B670-9716-4D55-A4AB-88DE0B42C8A1}"/>
-              </a:ext>
-            </a:extLst>
-          </p:cNvPr>
-          <p:cNvSpPr txBox="1">
-            <a:spLocks noChangeArrowheads="1"/>
-          </p:cNvSpPr>
-          <p:nvPr/>
-        </p:nvSpPr>
-        <p:spPr bwMode="auto">
-          <a:xfrm>
-            <a:off x="1209197" y="3659711"/>
-            <a:ext cx="1073150" cy="261610"/>
-          </a:xfrm>
-          <a:prstGeom prst="rect">
-            <a:avLst/>
-          </a:prstGeom>
-          <a:noFill/>
-          <a:ln>
-            <a:noFill/>
-          </a:ln>
-          <a:extLst>
-            <a:ext uri="{909E8E84-426E-40DD-AFC4-6F175D3DCCD1}">
-              <a14:hiddenFill xmlns:a14="http://schemas.microsoft.com/office/drawing/2010/main">
-                <a:solidFill>
-                  <a:srgbClr val="FFFFFF"/>
-                </a:solidFill>
-              </a14:hiddenFill>
-            </a:ext>
-            <a:ext uri="{91240B29-F687-4F45-9708-019B960494DF}">
-              <a14:hiddenLine xmlns:a14="http://schemas.microsoft.com/office/drawing/2010/main" w="9525">
-                <a:solidFill>
-                  <a:srgbClr val="000000"/>
-                </a:solidFill>
-                <a:miter lim="800000"/>
-                <a:headEnd/>
-                <a:tailEnd/>
-              </a14:hiddenLine>
-            </a:ext>
-          </a:extLst>
-        </p:spPr>
-        <p:txBody>
-          <a:bodyPr>
-            <a:spAutoFit/>
-          </a:bodyPr>
-          <a:lstStyle>
-            <a:lvl1pPr>
-              <a:defRPr>
-                <a:solidFill>
-                  <a:schemeClr val="tx1"/>
-                </a:solidFill>
-                <a:latin typeface="Calibri" panose="020F0502020204030204" pitchFamily="34" charset="0"/>
-              </a:defRPr>
-            </a:lvl1pPr>
-            <a:lvl2pPr marL="742950" indent="-285750">
-              <a:defRPr>
-                <a:solidFill>
-                  <a:schemeClr val="tx1"/>
-                </a:solidFill>
-                <a:latin typeface="Calibri" panose="020F0502020204030204" pitchFamily="34" charset="0"/>
-              </a:defRPr>
-            </a:lvl2pPr>
-            <a:lvl3pPr marL="1143000" indent="-228600">
-              <a:defRPr>
-                <a:solidFill>
-                  <a:schemeClr val="tx1"/>
-                </a:solidFill>
-                <a:latin typeface="Calibri" panose="020F0502020204030204" pitchFamily="34" charset="0"/>
-              </a:defRPr>
-            </a:lvl3pPr>
-            <a:lvl4pPr marL="1600200" indent="-228600">
-              <a:defRPr>
-                <a:solidFill>
-                  <a:schemeClr val="tx1"/>
-                </a:solidFill>
-                <a:latin typeface="Calibri" panose="020F0502020204030204" pitchFamily="34" charset="0"/>
-              </a:defRPr>
-            </a:lvl4pPr>
-            <a:lvl5pPr marL="2057400" indent="-228600">
-              <a:defRPr>
-                <a:solidFill>
-                  <a:schemeClr val="tx1"/>
-                </a:solidFill>
-                <a:latin typeface="Calibri" panose="020F0502020204030204" pitchFamily="34" charset="0"/>
-              </a:defRPr>
-            </a:lvl5pPr>
-            <a:lvl6pPr marL="2514600" indent="-228600" eaLnBrk="0" fontAlgn="base" hangingPunct="0">
-              <a:spcBef>
-                <a:spcPct val="0"/>
-              </a:spcBef>
-              <a:spcAft>
-                <a:spcPct val="0"/>
-              </a:spcAft>
-              <a:defRPr>
-                <a:solidFill>
-                  <a:schemeClr val="tx1"/>
-                </a:solidFill>
-                <a:latin typeface="Calibri" panose="020F0502020204030204" pitchFamily="34" charset="0"/>
-              </a:defRPr>
-            </a:lvl6pPr>
-            <a:lvl7pPr marL="2971800" indent="-228600" eaLnBrk="0" fontAlgn="base" hangingPunct="0">
-              <a:spcBef>
-                <a:spcPct val="0"/>
-              </a:spcBef>
-              <a:spcAft>
-                <a:spcPct val="0"/>
-              </a:spcAft>
-              <a:defRPr>
-                <a:solidFill>
-                  <a:schemeClr val="tx1"/>
-                </a:solidFill>
-                <a:latin typeface="Calibri" panose="020F0502020204030204" pitchFamily="34" charset="0"/>
-              </a:defRPr>
-            </a:lvl7pPr>
-            <a:lvl8pPr marL="3429000" indent="-228600" eaLnBrk="0" fontAlgn="base" hangingPunct="0">
-              <a:spcBef>
-                <a:spcPct val="0"/>
-              </a:spcBef>
-              <a:spcAft>
-                <a:spcPct val="0"/>
-              </a:spcAft>
-              <a:defRPr>
-                <a:solidFill>
-                  <a:schemeClr val="tx1"/>
-                </a:solidFill>
-                <a:latin typeface="Calibri" panose="020F0502020204030204" pitchFamily="34" charset="0"/>
-              </a:defRPr>
-            </a:lvl8pPr>
-            <a:lvl9pPr marL="3886200" indent="-228600" eaLnBrk="0" fontAlgn="base" hangingPunct="0">
-              <a:spcBef>
-                <a:spcPct val="0"/>
-              </a:spcBef>
-              <a:spcAft>
-                <a:spcPct val="0"/>
-              </a:spcAft>
-              <a:defRPr>
-                <a:solidFill>
-                  <a:schemeClr val="tx1"/>
-                </a:solidFill>
-                <a:latin typeface="Calibri" panose="020F0502020204030204" pitchFamily="34" charset="0"/>
-              </a:defRPr>
-            </a:lvl9pPr>
-          </a:lstStyle>
-          <a:p>
-            <a:pPr algn="ctr" eaLnBrk="1" hangingPunct="1"/>
-            <a:r>
-              <a:rPr lang="en-US" altLang="en-US" sz="1100" i="1" dirty="0">
-                <a:solidFill>
-                  <a:srgbClr val="000000"/>
-                </a:solidFill>
-                <a:latin typeface="Arial" panose="020B0604020202020204" pitchFamily="34" charset="0"/>
-                <a:cs typeface="Arial" panose="020B0604020202020204" pitchFamily="34" charset="0"/>
-              </a:rPr>
-              <a:t>Git push</a:t>
-            </a:r>
-          </a:p>
-        </p:txBody>
-      </p:sp>
-      <p:sp>
-        <p:nvSpPr>
-          <p:cNvPr id="44" name="TextBox 40">
-            <a:extLst>
-              <a:ext uri="{FF2B5EF4-FFF2-40B4-BE49-F238E27FC236}">
-                <a16:creationId xmlns:a16="http://schemas.microsoft.com/office/drawing/2014/main" id="{8034EF50-177D-47CA-8045-C48596BC2495}"/>
-              </a:ext>
-            </a:extLst>
-          </p:cNvPr>
-          <p:cNvSpPr txBox="1">
-            <a:spLocks noChangeArrowheads="1"/>
-          </p:cNvSpPr>
-          <p:nvPr/>
-        </p:nvSpPr>
-        <p:spPr bwMode="auto">
-          <a:xfrm>
-            <a:off x="2554405" y="3662143"/>
-            <a:ext cx="1073150" cy="261610"/>
-          </a:xfrm>
-          <a:prstGeom prst="rect">
-            <a:avLst/>
-          </a:prstGeom>
-          <a:noFill/>
-          <a:ln>
-            <a:noFill/>
-          </a:ln>
-          <a:extLst>
-            <a:ext uri="{909E8E84-426E-40DD-AFC4-6F175D3DCCD1}">
-              <a14:hiddenFill xmlns:a14="http://schemas.microsoft.com/office/drawing/2010/main">
-                <a:solidFill>
-                  <a:srgbClr val="FFFFFF"/>
-                </a:solidFill>
-              </a14:hiddenFill>
-            </a:ext>
-            <a:ext uri="{91240B29-F687-4F45-9708-019B960494DF}">
-              <a14:hiddenLine xmlns:a14="http://schemas.microsoft.com/office/drawing/2010/main" w="9525">
-                <a:solidFill>
-                  <a:srgbClr val="000000"/>
-                </a:solidFill>
-                <a:miter lim="800000"/>
-                <a:headEnd/>
-                <a:tailEnd/>
-              </a14:hiddenLine>
-            </a:ext>
-          </a:extLst>
-        </p:spPr>
-        <p:txBody>
-          <a:bodyPr>
-            <a:spAutoFit/>
-          </a:bodyPr>
-          <a:lstStyle>
-            <a:lvl1pPr>
-              <a:defRPr>
-                <a:solidFill>
-                  <a:schemeClr val="tx1"/>
-                </a:solidFill>
-                <a:latin typeface="Calibri" panose="020F0502020204030204" pitchFamily="34" charset="0"/>
-              </a:defRPr>
-            </a:lvl1pPr>
-            <a:lvl2pPr marL="742950" indent="-285750">
-              <a:defRPr>
-                <a:solidFill>
-                  <a:schemeClr val="tx1"/>
-                </a:solidFill>
-                <a:latin typeface="Calibri" panose="020F0502020204030204" pitchFamily="34" charset="0"/>
-              </a:defRPr>
-            </a:lvl2pPr>
-            <a:lvl3pPr marL="1143000" indent="-228600">
-              <a:defRPr>
-                <a:solidFill>
-                  <a:schemeClr val="tx1"/>
-                </a:solidFill>
-                <a:latin typeface="Calibri" panose="020F0502020204030204" pitchFamily="34" charset="0"/>
-              </a:defRPr>
-            </a:lvl3pPr>
-            <a:lvl4pPr marL="1600200" indent="-228600">
-              <a:defRPr>
-                <a:solidFill>
-                  <a:schemeClr val="tx1"/>
-                </a:solidFill>
-                <a:latin typeface="Calibri" panose="020F0502020204030204" pitchFamily="34" charset="0"/>
-              </a:defRPr>
-            </a:lvl4pPr>
-            <a:lvl5pPr marL="2057400" indent="-228600">
-              <a:defRPr>
-                <a:solidFill>
-                  <a:schemeClr val="tx1"/>
-                </a:solidFill>
-                <a:latin typeface="Calibri" panose="020F0502020204030204" pitchFamily="34" charset="0"/>
-              </a:defRPr>
-            </a:lvl5pPr>
-            <a:lvl6pPr marL="2514600" indent="-228600" eaLnBrk="0" fontAlgn="base" hangingPunct="0">
-              <a:spcBef>
-                <a:spcPct val="0"/>
-              </a:spcBef>
-              <a:spcAft>
-                <a:spcPct val="0"/>
-              </a:spcAft>
-              <a:defRPr>
-                <a:solidFill>
-                  <a:schemeClr val="tx1"/>
-                </a:solidFill>
-                <a:latin typeface="Calibri" panose="020F0502020204030204" pitchFamily="34" charset="0"/>
-              </a:defRPr>
-            </a:lvl6pPr>
-            <a:lvl7pPr marL="2971800" indent="-228600" eaLnBrk="0" fontAlgn="base" hangingPunct="0">
-              <a:spcBef>
-                <a:spcPct val="0"/>
-              </a:spcBef>
-              <a:spcAft>
-                <a:spcPct val="0"/>
-              </a:spcAft>
-              <a:defRPr>
-                <a:solidFill>
-                  <a:schemeClr val="tx1"/>
-                </a:solidFill>
-                <a:latin typeface="Calibri" panose="020F0502020204030204" pitchFamily="34" charset="0"/>
-              </a:defRPr>
-            </a:lvl7pPr>
-            <a:lvl8pPr marL="3429000" indent="-228600" eaLnBrk="0" fontAlgn="base" hangingPunct="0">
-              <a:spcBef>
-                <a:spcPct val="0"/>
-              </a:spcBef>
-              <a:spcAft>
-                <a:spcPct val="0"/>
-              </a:spcAft>
-              <a:defRPr>
-                <a:solidFill>
-                  <a:schemeClr val="tx1"/>
-                </a:solidFill>
-                <a:latin typeface="Calibri" panose="020F0502020204030204" pitchFamily="34" charset="0"/>
-              </a:defRPr>
-            </a:lvl8pPr>
-            <a:lvl9pPr marL="3886200" indent="-228600" eaLnBrk="0" fontAlgn="base" hangingPunct="0">
-              <a:spcBef>
-                <a:spcPct val="0"/>
-              </a:spcBef>
-              <a:spcAft>
-                <a:spcPct val="0"/>
-              </a:spcAft>
-              <a:defRPr>
-                <a:solidFill>
-                  <a:schemeClr val="tx1"/>
-                </a:solidFill>
-                <a:latin typeface="Calibri" panose="020F0502020204030204" pitchFamily="34" charset="0"/>
-              </a:defRPr>
-            </a:lvl9pPr>
-          </a:lstStyle>
-          <a:p>
-            <a:pPr algn="ctr" eaLnBrk="1" hangingPunct="1"/>
-            <a:r>
-              <a:rPr lang="en-US" altLang="en-US" sz="1100" i="1" dirty="0">
-                <a:solidFill>
-                  <a:srgbClr val="000000"/>
-                </a:solidFill>
-                <a:latin typeface="Arial" panose="020B0604020202020204" pitchFamily="34" charset="0"/>
-                <a:cs typeface="Arial" panose="020B0604020202020204" pitchFamily="34" charset="0"/>
-              </a:rPr>
-              <a:t>Git webhook</a:t>
-            </a:r>
-          </a:p>
-        </p:txBody>
-      </p:sp>
-      <p:cxnSp>
-        <p:nvCxnSpPr>
-          <p:cNvPr id="45" name="Connector: Elbow 44">
-            <a:extLst>
-              <a:ext uri="{FF2B5EF4-FFF2-40B4-BE49-F238E27FC236}">
-                <a16:creationId xmlns:a16="http://schemas.microsoft.com/office/drawing/2014/main" id="{CFF48790-94C8-477D-8A56-B300936E5E23}"/>
-              </a:ext>
-            </a:extLst>
-          </p:cNvPr>
-          <p:cNvCxnSpPr>
-            <a:cxnSpLocks/>
-            <a:stCxn id="23" idx="2"/>
-            <a:endCxn id="39" idx="2"/>
-          </p:cNvCxnSpPr>
-          <p:nvPr/>
-        </p:nvCxnSpPr>
-        <p:spPr>
-          <a:xfrm rot="5400000">
-            <a:off x="6329539" y="535325"/>
-            <a:ext cx="261713" cy="8003152"/>
-          </a:xfrm>
-          <a:prstGeom prst="bentConnector3">
-            <a:avLst>
-              <a:gd name="adj1" fmla="val 985430"/>
-            </a:avLst>
-          </a:prstGeom>
-          <a:ln w="12700">
-            <a:solidFill>
-              <a:srgbClr val="545B64"/>
-            </a:solidFill>
-            <a:tailEnd type="arrow" w="med" len="sm"/>
-          </a:ln>
-        </p:spPr>
-        <p:style>
-          <a:lnRef idx="1">
-            <a:schemeClr val="accent1"/>
-          </a:lnRef>
-          <a:fillRef idx="0">
-            <a:schemeClr val="accent1"/>
-          </a:fillRef>
-          <a:effectRef idx="0">
-            <a:schemeClr val="accent1"/>
-          </a:effectRef>
-          <a:fontRef idx="minor">
-            <a:schemeClr val="tx1"/>
-          </a:fontRef>
-        </p:style>
-      </p:cxnSp>
-      <p:pic>
-        <p:nvPicPr>
-          <p:cNvPr id="46" name="Graphic 14">
-            <a:extLst>
-              <a:ext uri="{FF2B5EF4-FFF2-40B4-BE49-F238E27FC236}">
-                <a16:creationId xmlns:a16="http://schemas.microsoft.com/office/drawing/2014/main" id="{3BD5CDA9-C199-418F-9D87-469A520CD327}"/>
-              </a:ext>
-            </a:extLst>
-          </p:cNvPr>
-          <p:cNvPicPr>
-            <a:picLocks noChangeAspect="1" noChangeArrowheads="1"/>
-          </p:cNvPicPr>
-          <p:nvPr/>
-        </p:nvPicPr>
-        <p:blipFill>
-          <a:blip r:embed="rId15">
-            <a:extLst>
-              <a:ext uri="{96DAC541-7B7A-43D3-8B79-37D633B846F1}">
-                <asvg:svgBlip xmlns:asvg="http://schemas.microsoft.com/office/drawing/2016/SVG/main" r:embed="rId16"/>
-              </a:ext>
-            </a:extLst>
-          </a:blip>
-          <a:srcRect/>
-          <a:stretch/>
-        </p:blipFill>
-        <p:spPr bwMode="auto">
-          <a:xfrm>
-            <a:off x="2216875" y="3693577"/>
-            <a:ext cx="469900" cy="469900"/>
-          </a:xfrm>
-          <a:prstGeom prst="rect">
-            <a:avLst/>
-          </a:prstGeom>
-          <a:noFill/>
-          <a:ln>
-            <a:noFill/>
-          </a:ln>
-          <a:extLst>
-            <a:ext uri="{909E8E84-426E-40DD-AFC4-6F175D3DCCD1}">
-              <a14:hiddenFill xmlns:a14="http://schemas.microsoft.com/office/drawing/2010/main">
-                <a:solidFill>
-                  <a:srgbClr val="FFFFFF"/>
-                </a:solidFill>
-              </a14:hiddenFill>
-            </a:ext>
-            <a:ext uri="{91240B29-F687-4F45-9708-019B960494DF}">
-              <a14:hiddenLine xmlns:a14="http://schemas.microsoft.com/office/drawing/2010/main" w="9525">
-                <a:solidFill>
-                  <a:srgbClr val="000000"/>
-                </a:solidFill>
-                <a:miter lim="800000"/>
-                <a:headEnd/>
-                <a:tailEnd/>
-              </a14:hiddenLine>
-            </a:ext>
-          </a:extLst>
-        </p:spPr>
-      </p:pic>
-      <p:sp>
-        <p:nvSpPr>
-          <p:cNvPr id="51" name="TextBox 40">
-            <a:extLst>
-              <a:ext uri="{FF2B5EF4-FFF2-40B4-BE49-F238E27FC236}">
-                <a16:creationId xmlns:a16="http://schemas.microsoft.com/office/drawing/2014/main" id="{847F1131-5875-46BE-BEDF-6084DDA599E3}"/>
-              </a:ext>
-            </a:extLst>
-          </p:cNvPr>
-          <p:cNvSpPr txBox="1">
-            <a:spLocks noChangeArrowheads="1"/>
-          </p:cNvSpPr>
-          <p:nvPr/>
-        </p:nvSpPr>
-        <p:spPr bwMode="auto">
-          <a:xfrm>
-            <a:off x="5923820" y="6732704"/>
-            <a:ext cx="1073150" cy="261610"/>
-          </a:xfrm>
-          <a:prstGeom prst="rect">
-            <a:avLst/>
-          </a:prstGeom>
-          <a:noFill/>
-          <a:ln>
-            <a:noFill/>
-          </a:ln>
-          <a:extLst>
-            <a:ext uri="{909E8E84-426E-40DD-AFC4-6F175D3DCCD1}">
-              <a14:hiddenFill xmlns:a14="http://schemas.microsoft.com/office/drawing/2010/main">
-                <a:solidFill>
-                  <a:srgbClr val="FFFFFF"/>
-                </a:solidFill>
-              </a14:hiddenFill>
-            </a:ext>
-            <a:ext uri="{91240B29-F687-4F45-9708-019B960494DF}">
-              <a14:hiddenLine xmlns:a14="http://schemas.microsoft.com/office/drawing/2010/main" w="9525">
-                <a:solidFill>
-                  <a:srgbClr val="000000"/>
-                </a:solidFill>
-                <a:miter lim="800000"/>
-                <a:headEnd/>
-                <a:tailEnd/>
-              </a14:hiddenLine>
-            </a:ext>
-          </a:extLst>
-        </p:spPr>
-        <p:txBody>
-          <a:bodyPr>
-            <a:spAutoFit/>
-          </a:bodyPr>
-          <a:lstStyle>
-            <a:lvl1pPr>
-              <a:defRPr>
-                <a:solidFill>
-                  <a:schemeClr val="tx1"/>
-                </a:solidFill>
-                <a:latin typeface="Calibri" panose="020F0502020204030204" pitchFamily="34" charset="0"/>
-              </a:defRPr>
-            </a:lvl1pPr>
-            <a:lvl2pPr marL="742950" indent="-285750">
-              <a:defRPr>
-                <a:solidFill>
-                  <a:schemeClr val="tx1"/>
-                </a:solidFill>
-                <a:latin typeface="Calibri" panose="020F0502020204030204" pitchFamily="34" charset="0"/>
-              </a:defRPr>
-            </a:lvl2pPr>
-            <a:lvl3pPr marL="1143000" indent="-228600">
-              <a:defRPr>
-                <a:solidFill>
-                  <a:schemeClr val="tx1"/>
-                </a:solidFill>
-                <a:latin typeface="Calibri" panose="020F0502020204030204" pitchFamily="34" charset="0"/>
-              </a:defRPr>
-            </a:lvl3pPr>
-            <a:lvl4pPr marL="1600200" indent="-228600">
-              <a:defRPr>
-                <a:solidFill>
-                  <a:schemeClr val="tx1"/>
-                </a:solidFill>
-                <a:latin typeface="Calibri" panose="020F0502020204030204" pitchFamily="34" charset="0"/>
-              </a:defRPr>
-            </a:lvl4pPr>
-            <a:lvl5pPr marL="2057400" indent="-228600">
-              <a:defRPr>
-                <a:solidFill>
-                  <a:schemeClr val="tx1"/>
-                </a:solidFill>
-                <a:latin typeface="Calibri" panose="020F0502020204030204" pitchFamily="34" charset="0"/>
-              </a:defRPr>
-            </a:lvl5pPr>
-            <a:lvl6pPr marL="2514600" indent="-228600" eaLnBrk="0" fontAlgn="base" hangingPunct="0">
-              <a:spcBef>
-                <a:spcPct val="0"/>
-              </a:spcBef>
-              <a:spcAft>
-                <a:spcPct val="0"/>
-              </a:spcAft>
-              <a:defRPr>
-                <a:solidFill>
-                  <a:schemeClr val="tx1"/>
-                </a:solidFill>
-                <a:latin typeface="Calibri" panose="020F0502020204030204" pitchFamily="34" charset="0"/>
-              </a:defRPr>
-            </a:lvl6pPr>
-            <a:lvl7pPr marL="2971800" indent="-228600" eaLnBrk="0" fontAlgn="base" hangingPunct="0">
-              <a:spcBef>
-                <a:spcPct val="0"/>
-              </a:spcBef>
-              <a:spcAft>
-                <a:spcPct val="0"/>
-              </a:spcAft>
-              <a:defRPr>
-                <a:solidFill>
-                  <a:schemeClr val="tx1"/>
-                </a:solidFill>
-                <a:latin typeface="Calibri" panose="020F0502020204030204" pitchFamily="34" charset="0"/>
-              </a:defRPr>
-            </a:lvl7pPr>
-            <a:lvl8pPr marL="3429000" indent="-228600" eaLnBrk="0" fontAlgn="base" hangingPunct="0">
-              <a:spcBef>
-                <a:spcPct val="0"/>
-              </a:spcBef>
-              <a:spcAft>
-                <a:spcPct val="0"/>
-              </a:spcAft>
-              <a:defRPr>
-                <a:solidFill>
-                  <a:schemeClr val="tx1"/>
-                </a:solidFill>
-                <a:latin typeface="Calibri" panose="020F0502020204030204" pitchFamily="34" charset="0"/>
-              </a:defRPr>
-            </a:lvl8pPr>
-            <a:lvl9pPr marL="3886200" indent="-228600" eaLnBrk="0" fontAlgn="base" hangingPunct="0">
-              <a:spcBef>
-                <a:spcPct val="0"/>
-              </a:spcBef>
-              <a:spcAft>
-                <a:spcPct val="0"/>
-              </a:spcAft>
-              <a:defRPr>
-                <a:solidFill>
-                  <a:schemeClr val="tx1"/>
-                </a:solidFill>
-                <a:latin typeface="Calibri" panose="020F0502020204030204" pitchFamily="34" charset="0"/>
-              </a:defRPr>
-            </a:lvl9pPr>
-          </a:lstStyle>
-          <a:p>
-            <a:pPr algn="ctr" eaLnBrk="1" hangingPunct="1"/>
-            <a:r>
-              <a:rPr lang="en-US" altLang="en-US" sz="1100" i="1" dirty="0">
-                <a:solidFill>
-                  <a:srgbClr val="000000"/>
-                </a:solidFill>
-                <a:latin typeface="Arial" panose="020B0604020202020204" pitchFamily="34" charset="0"/>
-                <a:cs typeface="Arial" panose="020B0604020202020204" pitchFamily="34" charset="0"/>
-              </a:rPr>
-              <a:t>Git merge</a:t>
-            </a:r>
-          </a:p>
-        </p:txBody>
-      </p:sp>
-      <p:sp>
-        <p:nvSpPr>
-          <p:cNvPr id="47" name="TextBox 20">
-            <a:extLst>
-              <a:ext uri="{FF2B5EF4-FFF2-40B4-BE49-F238E27FC236}">
-                <a16:creationId xmlns:a16="http://schemas.microsoft.com/office/drawing/2014/main" id="{F1D56B38-82F8-490E-9F38-6DA9DAEB602A}"/>
-              </a:ext>
-            </a:extLst>
-          </p:cNvPr>
-          <p:cNvSpPr txBox="1">
-            <a:spLocks noChangeArrowheads="1"/>
-          </p:cNvSpPr>
-          <p:nvPr/>
-        </p:nvSpPr>
-        <p:spPr bwMode="auto">
-          <a:xfrm>
-            <a:off x="6513418" y="5522954"/>
-            <a:ext cx="1293490" cy="261610"/>
-          </a:xfrm>
-          <a:prstGeom prst="rect">
-            <a:avLst/>
-          </a:prstGeom>
-          <a:noFill/>
-          <a:ln>
-            <a:noFill/>
-          </a:ln>
-          <a:extLst>
-            <a:ext uri="{909E8E84-426E-40DD-AFC4-6F175D3DCCD1}">
-              <a14:hiddenFill xmlns:a14="http://schemas.microsoft.com/office/drawing/2010/main">
-                <a:solidFill>
-                  <a:srgbClr val="FFFFFF"/>
-                </a:solidFill>
-              </a14:hiddenFill>
-            </a:ext>
-            <a:ext uri="{91240B29-F687-4F45-9708-019B960494DF}">
-              <a14:hiddenLine xmlns:a14="http://schemas.microsoft.com/office/drawing/2010/main" w="9525">
-                <a:solidFill>
-                  <a:srgbClr val="000000"/>
-                </a:solidFill>
-                <a:miter lim="800000"/>
-                <a:headEnd/>
-                <a:tailEnd/>
-              </a14:hiddenLine>
-            </a:ext>
-          </a:extLst>
-        </p:spPr>
-        <p:txBody>
-          <a:bodyPr wrap="square">
-            <a:spAutoFit/>
-          </a:bodyPr>
-          <a:lstStyle>
-            <a:lvl1pPr>
-              <a:defRPr>
-                <a:solidFill>
-                  <a:schemeClr val="tx1"/>
-                </a:solidFill>
-                <a:latin typeface="Calibri" panose="020F0502020204030204" pitchFamily="34" charset="0"/>
-              </a:defRPr>
-            </a:lvl1pPr>
-            <a:lvl2pPr marL="742950" indent="-285750">
-              <a:defRPr>
-                <a:solidFill>
-                  <a:schemeClr val="tx1"/>
-                </a:solidFill>
-                <a:latin typeface="Calibri" panose="020F0502020204030204" pitchFamily="34" charset="0"/>
-              </a:defRPr>
-            </a:lvl2pPr>
-            <a:lvl3pPr marL="1143000" indent="-228600">
-              <a:defRPr>
-                <a:solidFill>
-                  <a:schemeClr val="tx1"/>
-                </a:solidFill>
-                <a:latin typeface="Calibri" panose="020F0502020204030204" pitchFamily="34" charset="0"/>
-              </a:defRPr>
-            </a:lvl3pPr>
-            <a:lvl4pPr marL="1600200" indent="-228600">
-              <a:defRPr>
-                <a:solidFill>
-                  <a:schemeClr val="tx1"/>
-                </a:solidFill>
-                <a:latin typeface="Calibri" panose="020F0502020204030204" pitchFamily="34" charset="0"/>
-              </a:defRPr>
-            </a:lvl4pPr>
-            <a:lvl5pPr marL="2057400" indent="-228600">
-              <a:defRPr>
-                <a:solidFill>
-                  <a:schemeClr val="tx1"/>
-                </a:solidFill>
-                <a:latin typeface="Calibri" panose="020F0502020204030204" pitchFamily="34" charset="0"/>
-              </a:defRPr>
-            </a:lvl5pPr>
-            <a:lvl6pPr marL="2514600" indent="-228600" eaLnBrk="0" fontAlgn="base" hangingPunct="0">
-              <a:spcBef>
-                <a:spcPct val="0"/>
-              </a:spcBef>
-              <a:spcAft>
-                <a:spcPct val="0"/>
-              </a:spcAft>
-              <a:defRPr>
-                <a:solidFill>
-                  <a:schemeClr val="tx1"/>
-                </a:solidFill>
-                <a:latin typeface="Calibri" panose="020F0502020204030204" pitchFamily="34" charset="0"/>
-              </a:defRPr>
-            </a:lvl6pPr>
-            <a:lvl7pPr marL="2971800" indent="-228600" eaLnBrk="0" fontAlgn="base" hangingPunct="0">
-              <a:spcBef>
-                <a:spcPct val="0"/>
-              </a:spcBef>
-              <a:spcAft>
-                <a:spcPct val="0"/>
-              </a:spcAft>
-              <a:defRPr>
-                <a:solidFill>
-                  <a:schemeClr val="tx1"/>
-                </a:solidFill>
-                <a:latin typeface="Calibri" panose="020F0502020204030204" pitchFamily="34" charset="0"/>
-              </a:defRPr>
-            </a:lvl7pPr>
-            <a:lvl8pPr marL="3429000" indent="-228600" eaLnBrk="0" fontAlgn="base" hangingPunct="0">
-              <a:spcBef>
-                <a:spcPct val="0"/>
-              </a:spcBef>
-              <a:spcAft>
-                <a:spcPct val="0"/>
-              </a:spcAft>
-              <a:defRPr>
-                <a:solidFill>
-                  <a:schemeClr val="tx1"/>
-                </a:solidFill>
-                <a:latin typeface="Calibri" panose="020F0502020204030204" pitchFamily="34" charset="0"/>
-              </a:defRPr>
-            </a:lvl8pPr>
-            <a:lvl9pPr marL="3886200" indent="-228600" eaLnBrk="0" fontAlgn="base" hangingPunct="0">
-              <a:spcBef>
-                <a:spcPct val="0"/>
-              </a:spcBef>
-              <a:spcAft>
-                <a:spcPct val="0"/>
-              </a:spcAft>
-              <a:defRPr>
-                <a:solidFill>
-                  <a:schemeClr val="tx1"/>
-                </a:solidFill>
-                <a:latin typeface="Calibri" panose="020F0502020204030204" pitchFamily="34" charset="0"/>
-              </a:defRPr>
-            </a:lvl9pPr>
-          </a:lstStyle>
-          <a:p>
-            <a:pPr algn="ctr" eaLnBrk="1" hangingPunct="1"/>
-            <a:r>
-              <a:rPr lang="en-US" altLang="en-US" sz="1100" dirty="0">
-                <a:latin typeface="Arial" panose="020B0604020202020204" pitchFamily="34" charset="0"/>
-                <a:ea typeface="Amazon Ember" panose="020B0603020204020204" pitchFamily="34" charset="0"/>
-                <a:cs typeface="Arial" panose="020B0604020202020204" pitchFamily="34" charset="0"/>
-              </a:rPr>
-              <a:t>Artifacts</a:t>
-            </a:r>
-          </a:p>
-        </p:txBody>
-      </p:sp>
-      <p:pic>
-        <p:nvPicPr>
-          <p:cNvPr id="48" name="Graphic 31">
-            <a:extLst>
-              <a:ext uri="{FF2B5EF4-FFF2-40B4-BE49-F238E27FC236}">
-                <a16:creationId xmlns:a16="http://schemas.microsoft.com/office/drawing/2014/main" id="{35B3171A-E3FC-4C65-A276-94C7435F81A7}"/>
-              </a:ext>
-            </a:extLst>
-          </p:cNvPr>
-          <p:cNvPicPr>
-            <a:picLocks noChangeAspect="1" noChangeArrowheads="1"/>
-          </p:cNvPicPr>
-          <p:nvPr/>
-        </p:nvPicPr>
-        <p:blipFill>
-          <a:blip r:embed="rId17">
-            <a:extLst>
-              <a:ext uri="{28A0092B-C50C-407E-A947-70E740481C1C}">
-                <a14:useLocalDpi xmlns:a14="http://schemas.microsoft.com/office/drawing/2010/main" val="0"/>
-              </a:ext>
-            </a:extLst>
-          </a:blip>
-          <a:srcRect/>
-          <a:stretch>
-            <a:fillRect/>
-          </a:stretch>
-        </p:blipFill>
-        <p:spPr bwMode="auto">
-          <a:xfrm>
-            <a:off x="6931058" y="5096840"/>
-            <a:ext cx="458210" cy="457200"/>
-          </a:xfrm>
-          <a:prstGeom prst="rect">
-            <a:avLst/>
-          </a:prstGeom>
-          <a:noFill/>
-          <a:ln>
-            <a:noFill/>
-          </a:ln>
-          <a:extLst>
-            <a:ext uri="{909E8E84-426E-40DD-AFC4-6F175D3DCCD1}">
-              <a14:hiddenFill xmlns:a14="http://schemas.microsoft.com/office/drawing/2010/main">
-                <a:solidFill>
-                  <a:srgbClr val="FFFFFF"/>
-                </a:solidFill>
-              </a14:hiddenFill>
-            </a:ext>
-            <a:ext uri="{91240B29-F687-4F45-9708-019B960494DF}">
-              <a14:hiddenLine xmlns:a14="http://schemas.microsoft.com/office/drawing/2010/main" w="9525">
-                <a:solidFill>
-                  <a:srgbClr val="000000"/>
-                </a:solidFill>
-                <a:miter lim="800000"/>
-                <a:headEnd/>
-                <a:tailEnd/>
-              </a14:hiddenLine>
-            </a:ext>
-          </a:extLst>
-        </p:spPr>
-      </p:pic>
-      <p:cxnSp>
-        <p:nvCxnSpPr>
-          <p:cNvPr id="53" name="Straight Arrow Connector 52">
-            <a:extLst>
-              <a:ext uri="{FF2B5EF4-FFF2-40B4-BE49-F238E27FC236}">
-                <a16:creationId xmlns:a16="http://schemas.microsoft.com/office/drawing/2014/main" id="{70711F76-A7F4-4D2D-B72E-06CFF4683EE1}"/>
-              </a:ext>
-            </a:extLst>
-          </p:cNvPr>
-          <p:cNvCxnSpPr>
-            <a:cxnSpLocks/>
-            <a:stCxn id="8" idx="2"/>
-            <a:endCxn id="55" idx="0"/>
-          </p:cNvCxnSpPr>
-          <p:nvPr/>
-        </p:nvCxnSpPr>
-        <p:spPr>
-          <a:xfrm>
-            <a:off x="8609359" y="4659441"/>
-            <a:ext cx="0" cy="437399"/>
-          </a:xfrm>
-          <a:prstGeom prst="straightConnector1">
-            <a:avLst/>
-          </a:prstGeom>
-          <a:ln w="12700">
-            <a:solidFill>
-              <a:srgbClr val="545B64"/>
-            </a:solidFill>
-            <a:headEnd type="none" w="med" len="sm"/>
-            <a:tailEnd type="arrow" w="med" len="sm"/>
-          </a:ln>
-        </p:spPr>
-        <p:style>
-          <a:lnRef idx="1">
-            <a:schemeClr val="accent1"/>
-          </a:lnRef>
-          <a:fillRef idx="0">
-            <a:schemeClr val="accent1"/>
-          </a:fillRef>
-          <a:effectRef idx="0">
-            <a:schemeClr val="accent1"/>
-          </a:effectRef>
-          <a:fontRef idx="minor">
-            <a:schemeClr val="tx1"/>
-          </a:fontRef>
-        </p:style>
-      </p:cxnSp>
-      <p:sp>
-        <p:nvSpPr>
-          <p:cNvPr id="54" name="TextBox 20">
-            <a:extLst>
-              <a:ext uri="{FF2B5EF4-FFF2-40B4-BE49-F238E27FC236}">
-                <a16:creationId xmlns:a16="http://schemas.microsoft.com/office/drawing/2014/main" id="{ECA387C6-EC8D-415F-A1EA-23703090C6A0}"/>
-              </a:ext>
-            </a:extLst>
-          </p:cNvPr>
-          <p:cNvSpPr txBox="1">
-            <a:spLocks noChangeArrowheads="1"/>
-          </p:cNvSpPr>
-          <p:nvPr/>
-        </p:nvSpPr>
-        <p:spPr bwMode="auto">
-          <a:xfrm>
-            <a:off x="7962614" y="5522954"/>
-            <a:ext cx="1293490" cy="261610"/>
-          </a:xfrm>
-          <a:prstGeom prst="rect">
-            <a:avLst/>
-          </a:prstGeom>
-          <a:noFill/>
-          <a:ln>
-            <a:noFill/>
-          </a:ln>
-          <a:extLst>
-            <a:ext uri="{909E8E84-426E-40DD-AFC4-6F175D3DCCD1}">
-              <a14:hiddenFill xmlns:a14="http://schemas.microsoft.com/office/drawing/2010/main">
-                <a:solidFill>
-                  <a:srgbClr val="FFFFFF"/>
-                </a:solidFill>
-              </a14:hiddenFill>
-            </a:ext>
-            <a:ext uri="{91240B29-F687-4F45-9708-019B960494DF}">
-              <a14:hiddenLine xmlns:a14="http://schemas.microsoft.com/office/drawing/2010/main" w="9525">
-                <a:solidFill>
-                  <a:srgbClr val="000000"/>
-                </a:solidFill>
-                <a:miter lim="800000"/>
-                <a:headEnd/>
-                <a:tailEnd/>
-              </a14:hiddenLine>
-            </a:ext>
-          </a:extLst>
-        </p:spPr>
-        <p:txBody>
-          <a:bodyPr wrap="square">
-            <a:spAutoFit/>
-          </a:bodyPr>
-          <a:lstStyle>
-            <a:lvl1pPr>
-              <a:defRPr>
-                <a:solidFill>
-                  <a:schemeClr val="tx1"/>
-                </a:solidFill>
-                <a:latin typeface="Calibri" panose="020F0502020204030204" pitchFamily="34" charset="0"/>
-              </a:defRPr>
-            </a:lvl1pPr>
-            <a:lvl2pPr marL="742950" indent="-285750">
-              <a:defRPr>
-                <a:solidFill>
-                  <a:schemeClr val="tx1"/>
-                </a:solidFill>
-                <a:latin typeface="Calibri" panose="020F0502020204030204" pitchFamily="34" charset="0"/>
-              </a:defRPr>
-            </a:lvl2pPr>
-            <a:lvl3pPr marL="1143000" indent="-228600">
-              <a:defRPr>
-                <a:solidFill>
-                  <a:schemeClr val="tx1"/>
-                </a:solidFill>
-                <a:latin typeface="Calibri" panose="020F0502020204030204" pitchFamily="34" charset="0"/>
-              </a:defRPr>
-            </a:lvl3pPr>
-            <a:lvl4pPr marL="1600200" indent="-228600">
-              <a:defRPr>
-                <a:solidFill>
-                  <a:schemeClr val="tx1"/>
-                </a:solidFill>
-                <a:latin typeface="Calibri" panose="020F0502020204030204" pitchFamily="34" charset="0"/>
-              </a:defRPr>
-            </a:lvl4pPr>
-            <a:lvl5pPr marL="2057400" indent="-228600">
-              <a:defRPr>
-                <a:solidFill>
-                  <a:schemeClr val="tx1"/>
-                </a:solidFill>
-                <a:latin typeface="Calibri" panose="020F0502020204030204" pitchFamily="34" charset="0"/>
-              </a:defRPr>
-            </a:lvl5pPr>
-            <a:lvl6pPr marL="2514600" indent="-228600" eaLnBrk="0" fontAlgn="base" hangingPunct="0">
-              <a:spcBef>
-                <a:spcPct val="0"/>
-              </a:spcBef>
-              <a:spcAft>
-                <a:spcPct val="0"/>
-              </a:spcAft>
-              <a:defRPr>
-                <a:solidFill>
-                  <a:schemeClr val="tx1"/>
-                </a:solidFill>
-                <a:latin typeface="Calibri" panose="020F0502020204030204" pitchFamily="34" charset="0"/>
-              </a:defRPr>
-            </a:lvl6pPr>
-            <a:lvl7pPr marL="2971800" indent="-228600" eaLnBrk="0" fontAlgn="base" hangingPunct="0">
-              <a:spcBef>
-                <a:spcPct val="0"/>
-              </a:spcBef>
-              <a:spcAft>
-                <a:spcPct val="0"/>
-              </a:spcAft>
-              <a:defRPr>
-                <a:solidFill>
-                  <a:schemeClr val="tx1"/>
-                </a:solidFill>
-                <a:latin typeface="Calibri" panose="020F0502020204030204" pitchFamily="34" charset="0"/>
-              </a:defRPr>
-            </a:lvl7pPr>
-            <a:lvl8pPr marL="3429000" indent="-228600" eaLnBrk="0" fontAlgn="base" hangingPunct="0">
-              <a:spcBef>
-                <a:spcPct val="0"/>
-              </a:spcBef>
-              <a:spcAft>
-                <a:spcPct val="0"/>
-              </a:spcAft>
-              <a:defRPr>
-                <a:solidFill>
-                  <a:schemeClr val="tx1"/>
-                </a:solidFill>
-                <a:latin typeface="Calibri" panose="020F0502020204030204" pitchFamily="34" charset="0"/>
-              </a:defRPr>
-            </a:lvl8pPr>
-            <a:lvl9pPr marL="3886200" indent="-228600" eaLnBrk="0" fontAlgn="base" hangingPunct="0">
-              <a:spcBef>
-                <a:spcPct val="0"/>
-              </a:spcBef>
-              <a:spcAft>
-                <a:spcPct val="0"/>
-              </a:spcAft>
-              <a:defRPr>
-                <a:solidFill>
-                  <a:schemeClr val="tx1"/>
-                </a:solidFill>
-                <a:latin typeface="Calibri" panose="020F0502020204030204" pitchFamily="34" charset="0"/>
-              </a:defRPr>
-            </a:lvl9pPr>
-          </a:lstStyle>
-          <a:p>
-            <a:pPr algn="ctr" eaLnBrk="1" hangingPunct="1"/>
-            <a:r>
-              <a:rPr lang="en-US" altLang="en-US" sz="1100" dirty="0">
-                <a:latin typeface="Arial" panose="020B0604020202020204" pitchFamily="34" charset="0"/>
-                <a:ea typeface="Amazon Ember" panose="020B0603020204020204" pitchFamily="34" charset="0"/>
-                <a:cs typeface="Arial" panose="020B0604020202020204" pitchFamily="34" charset="0"/>
-              </a:rPr>
-              <a:t>Reports</a:t>
-            </a:r>
-          </a:p>
-        </p:txBody>
-      </p:sp>
-      <p:pic>
-        <p:nvPicPr>
-          <p:cNvPr id="55" name="Graphic 31">
-            <a:extLst>
-              <a:ext uri="{FF2B5EF4-FFF2-40B4-BE49-F238E27FC236}">
-                <a16:creationId xmlns:a16="http://schemas.microsoft.com/office/drawing/2014/main" id="{554CCA09-1EAF-4B18-B6EA-363BD3033D43}"/>
-              </a:ext>
-            </a:extLst>
-          </p:cNvPr>
-          <p:cNvPicPr>
-            <a:picLocks noChangeAspect="1" noChangeArrowheads="1"/>
-          </p:cNvPicPr>
-          <p:nvPr/>
-        </p:nvPicPr>
-        <p:blipFill>
-          <a:blip r:embed="rId17">
-            <a:extLst>
-              <a:ext uri="{28A0092B-C50C-407E-A947-70E740481C1C}">
-                <a14:useLocalDpi xmlns:a14="http://schemas.microsoft.com/office/drawing/2010/main" val="0"/>
-              </a:ext>
-            </a:extLst>
-          </a:blip>
-          <a:srcRect/>
-          <a:stretch>
-            <a:fillRect/>
-          </a:stretch>
-        </p:blipFill>
-        <p:spPr bwMode="auto">
-          <a:xfrm>
-            <a:off x="8380254" y="5096840"/>
-            <a:ext cx="458210" cy="457200"/>
-          </a:xfrm>
-          <a:prstGeom prst="rect">
-            <a:avLst/>
-          </a:prstGeom>
-          <a:noFill/>
-          <a:ln>
-            <a:noFill/>
-          </a:ln>
-          <a:extLst>
-            <a:ext uri="{909E8E84-426E-40DD-AFC4-6F175D3DCCD1}">
-              <a14:hiddenFill xmlns:a14="http://schemas.microsoft.com/office/drawing/2010/main">
-                <a:solidFill>
-                  <a:srgbClr val="FFFFFF"/>
-                </a:solidFill>
-              </a14:hiddenFill>
-            </a:ext>
-            <a:ext uri="{91240B29-F687-4F45-9708-019B960494DF}">
-              <a14:hiddenLine xmlns:a14="http://schemas.microsoft.com/office/drawing/2010/main" w="9525">
-                <a:solidFill>
-                  <a:srgbClr val="000000"/>
-                </a:solidFill>
-                <a:miter lim="800000"/>
-                <a:headEnd/>
-                <a:tailEnd/>
-              </a14:hiddenLine>
-            </a:ext>
-          </a:extLst>
-        </p:spPr>
-      </p:pic>
-      <p:sp>
-        <p:nvSpPr>
-          <p:cNvPr id="49" name="Rectangle 48">
-            <a:extLst>
-              <a:ext uri="{FF2B5EF4-FFF2-40B4-BE49-F238E27FC236}">
-                <a16:creationId xmlns:a16="http://schemas.microsoft.com/office/drawing/2014/main" id="{F770D78D-C40A-494F-990A-EE34B22F3894}"/>
-              </a:ext>
-            </a:extLst>
-          </p:cNvPr>
-          <p:cNvSpPr/>
-          <p:nvPr/>
-        </p:nvSpPr>
-        <p:spPr>
-          <a:xfrm>
-            <a:off x="4379976" y="1746504"/>
-            <a:ext cx="1371600" cy="4361688"/>
-          </a:xfrm>
-          <a:prstGeom prst="rect">
-            <a:avLst/>
-          </a:prstGeom>
-          <a:noFill/>
-          <a:ln w="12700">
-            <a:solidFill>
-              <a:srgbClr val="5A6B86"/>
-            </a:solidFill>
-            <a:prstDash val="dash"/>
-          </a:ln>
-        </p:spPr>
-        <p:style>
-          <a:lnRef idx="2">
-            <a:schemeClr val="accent1">
-              <a:shade val="50000"/>
-            </a:schemeClr>
-          </a:lnRef>
-          <a:fillRef idx="1">
-            <a:schemeClr val="accent1"/>
-          </a:fillRef>
-          <a:effectRef idx="0">
-            <a:schemeClr val="accent1"/>
-          </a:effectRef>
-          <a:fontRef idx="minor">
-            <a:schemeClr val="lt1"/>
-          </a:fontRef>
-        </p:style>
-        <p:txBody>
-          <a:bodyPr tIns="91440"/>
-          <a:lstStyle/>
-          <a:p>
-            <a:pPr algn="ctr" eaLnBrk="1" fontAlgn="auto" hangingPunct="1">
-              <a:spcBef>
-                <a:spcPts val="0"/>
-              </a:spcBef>
-              <a:spcAft>
-                <a:spcPts val="0"/>
-              </a:spcAft>
-              <a:defRPr/>
-            </a:pPr>
-            <a:r>
-              <a:rPr lang="en-US" sz="1200" dirty="0">
-                <a:solidFill>
-                  <a:srgbClr val="5A6B86"/>
-                </a:solidFill>
-                <a:latin typeface="Arial" panose="020B0604020202020204" pitchFamily="34" charset="0"/>
-                <a:cs typeface="Arial" panose="020B0604020202020204" pitchFamily="34" charset="0"/>
-              </a:rPr>
-              <a:t>Source stage</a:t>
-            </a:r>
-          </a:p>
-        </p:txBody>
-      </p:sp>
-      <p:sp>
-        <p:nvSpPr>
-          <p:cNvPr id="50" name="Rectangle 49">
-            <a:extLst>
-              <a:ext uri="{FF2B5EF4-FFF2-40B4-BE49-F238E27FC236}">
-                <a16:creationId xmlns:a16="http://schemas.microsoft.com/office/drawing/2014/main" id="{189C16A1-083C-4DC5-BE10-6C1D5D2AB111}"/>
-              </a:ext>
-            </a:extLst>
-          </p:cNvPr>
-          <p:cNvSpPr/>
-          <p:nvPr/>
-        </p:nvSpPr>
-        <p:spPr>
-          <a:xfrm>
-            <a:off x="6254496" y="1746504"/>
-            <a:ext cx="3035808" cy="4361688"/>
-          </a:xfrm>
-          <a:prstGeom prst="rect">
-            <a:avLst/>
-          </a:prstGeom>
-          <a:noFill/>
-          <a:ln w="12700">
-            <a:solidFill>
-              <a:srgbClr val="5A6B86"/>
-            </a:solidFill>
-            <a:prstDash val="dash"/>
-          </a:ln>
-        </p:spPr>
-        <p:style>
-          <a:lnRef idx="2">
-            <a:schemeClr val="accent1">
-              <a:shade val="50000"/>
-            </a:schemeClr>
-          </a:lnRef>
-          <a:fillRef idx="1">
-            <a:schemeClr val="accent1"/>
-          </a:fillRef>
-          <a:effectRef idx="0">
-            <a:schemeClr val="accent1"/>
-          </a:effectRef>
-          <a:fontRef idx="minor">
-            <a:schemeClr val="lt1"/>
-          </a:fontRef>
-        </p:style>
-        <p:txBody>
-          <a:bodyPr tIns="91440"/>
-          <a:lstStyle/>
-          <a:p>
-            <a:pPr algn="ctr" eaLnBrk="1" fontAlgn="auto" hangingPunct="1">
-              <a:spcBef>
-                <a:spcPts val="0"/>
-              </a:spcBef>
-              <a:spcAft>
-                <a:spcPts val="0"/>
-              </a:spcAft>
-              <a:defRPr/>
-            </a:pPr>
-            <a:r>
-              <a:rPr lang="en-US" sz="1200" dirty="0">
-                <a:solidFill>
-                  <a:srgbClr val="5A6B86"/>
-                </a:solidFill>
-                <a:latin typeface="Arial" panose="020B0604020202020204" pitchFamily="34" charset="0"/>
-                <a:cs typeface="Arial" panose="020B0604020202020204" pitchFamily="34" charset="0"/>
-              </a:rPr>
-              <a:t>Build/test stage</a:t>
-            </a:r>
-          </a:p>
-        </p:txBody>
-      </p:sp>
-      <p:sp>
-        <p:nvSpPr>
-          <p:cNvPr id="52" name="Rectangle 51">
-            <a:extLst>
-              <a:ext uri="{FF2B5EF4-FFF2-40B4-BE49-F238E27FC236}">
-                <a16:creationId xmlns:a16="http://schemas.microsoft.com/office/drawing/2014/main" id="{525BDAC8-77AD-4D8B-94E6-5692060878A2}"/>
-              </a:ext>
-            </a:extLst>
-          </p:cNvPr>
-          <p:cNvSpPr/>
-          <p:nvPr/>
-        </p:nvSpPr>
-        <p:spPr>
-          <a:xfrm>
-            <a:off x="9793224" y="1746504"/>
-            <a:ext cx="1371600" cy="4361688"/>
-          </a:xfrm>
-          <a:prstGeom prst="rect">
-            <a:avLst/>
-          </a:prstGeom>
-          <a:noFill/>
-          <a:ln w="12700">
-            <a:solidFill>
-              <a:srgbClr val="5A6B86"/>
-            </a:solidFill>
-            <a:prstDash val="dash"/>
-          </a:ln>
-        </p:spPr>
-        <p:style>
-          <a:lnRef idx="2">
-            <a:schemeClr val="accent1">
-              <a:shade val="50000"/>
-            </a:schemeClr>
-          </a:lnRef>
-          <a:fillRef idx="1">
-            <a:schemeClr val="accent1"/>
-          </a:fillRef>
-          <a:effectRef idx="0">
-            <a:schemeClr val="accent1"/>
-          </a:effectRef>
-          <a:fontRef idx="minor">
-            <a:schemeClr val="lt1"/>
-          </a:fontRef>
-        </p:style>
-        <p:txBody>
-          <a:bodyPr tIns="91440"/>
-          <a:lstStyle/>
-          <a:p>
-            <a:pPr algn="ctr" eaLnBrk="1" fontAlgn="auto" hangingPunct="1">
-              <a:spcBef>
-                <a:spcPts val="0"/>
-              </a:spcBef>
-              <a:spcAft>
-                <a:spcPts val="0"/>
-              </a:spcAft>
-              <a:defRPr/>
-            </a:pPr>
-            <a:r>
-              <a:rPr lang="en-US" sz="1200" dirty="0">
-                <a:solidFill>
-                  <a:srgbClr val="5A6B86"/>
-                </a:solidFill>
-                <a:latin typeface="Arial" panose="020B0604020202020204" pitchFamily="34" charset="0"/>
-                <a:cs typeface="Arial" panose="020B0604020202020204" pitchFamily="34" charset="0"/>
-              </a:rPr>
-              <a:t>Deploy stage</a:t>
-            </a:r>
-          </a:p>
-        </p:txBody>
-      </p:sp>
-    </p:spTree>
-    <p:extLst>
-      <p:ext uri="{BB962C8B-B14F-4D97-AF65-F5344CB8AC3E}">
-        <p14:creationId xmlns:p14="http://schemas.microsoft.com/office/powerpoint/2010/main" val="2871271598"/>
-      </p:ext>
-    </p:extLst>
-  </p:cSld>
-  <p:clrMapOvr>
-    <a:masterClrMapping/>
-  </p:clrMapOvr>
-</p:sld>
-</file>
-
-<file path=ppt/slides/slide4.xml><?xml version="1.0" encoding="utf-8"?>
-<p:sld xmlns:a="http://schemas.openxmlformats.org/drawingml/2006/main" xmlns:r="http://schemas.openxmlformats.org/officeDocument/2006/relationships" xmlns:p="http://schemas.openxmlformats.org/presentationml/2006/main">
-  <p:cSld>
-    <p:spTree>
-      <p:nvGrpSpPr>
-        <p:cNvPr id="1" name=""/>
-        <p:cNvGrpSpPr/>
-        <p:nvPr/>
-      </p:nvGrpSpPr>
-      <p:grpSpPr>
-        <a:xfrm>
-          <a:off x="0" y="0"/>
-          <a:ext cx="0" cy="0"/>
-          <a:chOff x="0" y="0"/>
-          <a:chExt cx="0" cy="0"/>
-        </a:xfrm>
-      </p:grpSpPr>
-      <p:pic>
-        <p:nvPicPr>
-          <p:cNvPr id="3" name="Graphic 17">
-            <a:extLst>
-              <a:ext uri="{FF2B5EF4-FFF2-40B4-BE49-F238E27FC236}">
-                <a16:creationId xmlns:a16="http://schemas.microsoft.com/office/drawing/2014/main" id="{CC1A3AFA-FE54-4BEE-AEBF-48FF74F9D4EE}"/>
-              </a:ext>
-            </a:extLst>
-          </p:cNvPr>
-          <p:cNvPicPr>
-            <a:picLocks noChangeAspect="1" noChangeArrowheads="1"/>
-          </p:cNvPicPr>
-          <p:nvPr/>
-        </p:nvPicPr>
-        <p:blipFill>
-          <a:blip r:embed="rId2">
-            <a:extLst>
-              <a:ext uri="{28A0092B-C50C-407E-A947-70E740481C1C}">
-                <a14:useLocalDpi xmlns:a14="http://schemas.microsoft.com/office/drawing/2010/main" val="0"/>
-              </a:ext>
-            </a:extLst>
-          </a:blip>
-          <a:srcRect/>
-          <a:stretch>
-            <a:fillRect/>
-          </a:stretch>
-        </p:blipFill>
-        <p:spPr bwMode="auto">
-          <a:xfrm>
-            <a:off x="7610856" y="2135750"/>
-            <a:ext cx="762000" cy="762000"/>
-          </a:xfrm>
-          <a:prstGeom prst="rect">
-            <a:avLst/>
-          </a:prstGeom>
-          <a:noFill/>
-          <a:ln>
-            <a:noFill/>
-          </a:ln>
-          <a:extLst>
-            <a:ext uri="{909E8E84-426E-40DD-AFC4-6F175D3DCCD1}">
-              <a14:hiddenFill xmlns:a14="http://schemas.microsoft.com/office/drawing/2010/main">
-                <a:solidFill>
-                  <a:srgbClr val="FFFFFF"/>
-                </a:solidFill>
-              </a14:hiddenFill>
-            </a:ext>
-            <a:ext uri="{91240B29-F687-4F45-9708-019B960494DF}">
-              <a14:hiddenLine xmlns:a14="http://schemas.microsoft.com/office/drawing/2010/main" w="9525">
-                <a:solidFill>
-                  <a:srgbClr val="000000"/>
-                </a:solidFill>
-                <a:miter lim="800000"/>
-                <a:headEnd/>
-                <a:tailEnd/>
-              </a14:hiddenLine>
-            </a:ext>
-          </a:extLst>
-        </p:spPr>
-      </p:pic>
-      <p:sp>
-        <p:nvSpPr>
-          <p:cNvPr id="4" name="TextBox 11">
-            <a:extLst>
-              <a:ext uri="{FF2B5EF4-FFF2-40B4-BE49-F238E27FC236}">
-                <a16:creationId xmlns:a16="http://schemas.microsoft.com/office/drawing/2014/main" id="{B884491E-3855-4C58-85B4-AF40AC8BCAA8}"/>
-              </a:ext>
-            </a:extLst>
-          </p:cNvPr>
-          <p:cNvSpPr txBox="1">
-            <a:spLocks noChangeArrowheads="1"/>
-          </p:cNvSpPr>
-          <p:nvPr/>
-        </p:nvSpPr>
-        <p:spPr bwMode="auto">
-          <a:xfrm>
-            <a:off x="7109206" y="2916876"/>
-            <a:ext cx="1765300" cy="276999"/>
-          </a:xfrm>
-          <a:prstGeom prst="rect">
-            <a:avLst/>
-          </a:prstGeom>
-          <a:noFill/>
-          <a:ln>
-            <a:noFill/>
-          </a:ln>
-          <a:extLst>
-            <a:ext uri="{909E8E84-426E-40DD-AFC4-6F175D3DCCD1}">
-              <a14:hiddenFill xmlns:a14="http://schemas.microsoft.com/office/drawing/2010/main">
-                <a:solidFill>
-                  <a:srgbClr val="FFFFFF"/>
-                </a:solidFill>
-              </a14:hiddenFill>
-            </a:ext>
-            <a:ext uri="{91240B29-F687-4F45-9708-019B960494DF}">
-              <a14:hiddenLine xmlns:a14="http://schemas.microsoft.com/office/drawing/2010/main" w="9525">
-                <a:solidFill>
-                  <a:srgbClr val="000000"/>
-                </a:solidFill>
-                <a:miter lim="800000"/>
-                <a:headEnd/>
-                <a:tailEnd/>
-              </a14:hiddenLine>
-            </a:ext>
-          </a:extLst>
-        </p:spPr>
-        <p:txBody>
-          <a:bodyPr wrap="square">
-            <a:spAutoFit/>
-          </a:bodyPr>
-          <a:lstStyle>
-            <a:lvl1pPr>
-              <a:defRPr>
-                <a:solidFill>
-                  <a:schemeClr val="tx1"/>
-                </a:solidFill>
-                <a:latin typeface="Calibri" panose="020F0502020204030204" pitchFamily="34" charset="0"/>
-              </a:defRPr>
-            </a:lvl1pPr>
-            <a:lvl2pPr marL="742950" indent="-285750">
-              <a:defRPr>
-                <a:solidFill>
-                  <a:schemeClr val="tx1"/>
-                </a:solidFill>
-                <a:latin typeface="Calibri" panose="020F0502020204030204" pitchFamily="34" charset="0"/>
-              </a:defRPr>
-            </a:lvl2pPr>
-            <a:lvl3pPr marL="1143000" indent="-228600">
-              <a:defRPr>
-                <a:solidFill>
-                  <a:schemeClr val="tx1"/>
-                </a:solidFill>
-                <a:latin typeface="Calibri" panose="020F0502020204030204" pitchFamily="34" charset="0"/>
-              </a:defRPr>
-            </a:lvl3pPr>
-            <a:lvl4pPr marL="1600200" indent="-228600">
-              <a:defRPr>
-                <a:solidFill>
-                  <a:schemeClr val="tx1"/>
-                </a:solidFill>
-                <a:latin typeface="Calibri" panose="020F0502020204030204" pitchFamily="34" charset="0"/>
-              </a:defRPr>
-            </a:lvl4pPr>
-            <a:lvl5pPr marL="2057400" indent="-228600">
-              <a:defRPr>
-                <a:solidFill>
-                  <a:schemeClr val="tx1"/>
-                </a:solidFill>
-                <a:latin typeface="Calibri" panose="020F0502020204030204" pitchFamily="34" charset="0"/>
-              </a:defRPr>
-            </a:lvl5pPr>
-            <a:lvl6pPr marL="2514600" indent="-228600" eaLnBrk="0" fontAlgn="base" hangingPunct="0">
-              <a:spcBef>
-                <a:spcPct val="0"/>
-              </a:spcBef>
-              <a:spcAft>
-                <a:spcPct val="0"/>
-              </a:spcAft>
-              <a:defRPr>
-                <a:solidFill>
-                  <a:schemeClr val="tx1"/>
-                </a:solidFill>
-                <a:latin typeface="Calibri" panose="020F0502020204030204" pitchFamily="34" charset="0"/>
-              </a:defRPr>
-            </a:lvl6pPr>
-            <a:lvl7pPr marL="2971800" indent="-228600" eaLnBrk="0" fontAlgn="base" hangingPunct="0">
-              <a:spcBef>
-                <a:spcPct val="0"/>
-              </a:spcBef>
-              <a:spcAft>
-                <a:spcPct val="0"/>
-              </a:spcAft>
-              <a:defRPr>
-                <a:solidFill>
-                  <a:schemeClr val="tx1"/>
-                </a:solidFill>
-                <a:latin typeface="Calibri" panose="020F0502020204030204" pitchFamily="34" charset="0"/>
-              </a:defRPr>
-            </a:lvl7pPr>
-            <a:lvl8pPr marL="3429000" indent="-228600" eaLnBrk="0" fontAlgn="base" hangingPunct="0">
-              <a:spcBef>
-                <a:spcPct val="0"/>
-              </a:spcBef>
-              <a:spcAft>
-                <a:spcPct val="0"/>
-              </a:spcAft>
-              <a:defRPr>
-                <a:solidFill>
-                  <a:schemeClr val="tx1"/>
-                </a:solidFill>
-                <a:latin typeface="Calibri" panose="020F0502020204030204" pitchFamily="34" charset="0"/>
-              </a:defRPr>
-            </a:lvl8pPr>
-            <a:lvl9pPr marL="3886200" indent="-228600" eaLnBrk="0" fontAlgn="base" hangingPunct="0">
-              <a:spcBef>
-                <a:spcPct val="0"/>
-              </a:spcBef>
-              <a:spcAft>
-                <a:spcPct val="0"/>
-              </a:spcAft>
-              <a:defRPr>
-                <a:solidFill>
-                  <a:schemeClr val="tx1"/>
-                </a:solidFill>
-                <a:latin typeface="Calibri" panose="020F0502020204030204" pitchFamily="34" charset="0"/>
-              </a:defRPr>
-            </a:lvl9pPr>
-          </a:lstStyle>
-          <a:p>
-            <a:pPr algn="ctr" eaLnBrk="1" hangingPunct="1"/>
-            <a:r>
-              <a:rPr lang="en-US" altLang="en-US" sz="1200" dirty="0">
-                <a:latin typeface="Arial" panose="020B0604020202020204" pitchFamily="34" charset="0"/>
-                <a:ea typeface="Amazon Ember" panose="020B0603020204020204" pitchFamily="34" charset="0"/>
-                <a:cs typeface="Arial" panose="020B0604020202020204" pitchFamily="34" charset="0"/>
-              </a:rPr>
-              <a:t>AWS Secrets Manager</a:t>
-            </a:r>
-          </a:p>
-        </p:txBody>
-      </p:sp>
-      <p:pic>
-        <p:nvPicPr>
-          <p:cNvPr id="5" name="Graphic 19">
-            <a:extLst>
-              <a:ext uri="{FF2B5EF4-FFF2-40B4-BE49-F238E27FC236}">
-                <a16:creationId xmlns:a16="http://schemas.microsoft.com/office/drawing/2014/main" id="{8C144DBF-0A60-407F-BDE2-208E8DB3CD84}"/>
-              </a:ext>
-            </a:extLst>
-          </p:cNvPr>
-          <p:cNvPicPr>
-            <a:picLocks noChangeAspect="1" noChangeArrowheads="1"/>
-          </p:cNvPicPr>
-          <p:nvPr/>
-        </p:nvPicPr>
-        <p:blipFill>
-          <a:blip r:embed="rId3">
-            <a:extLst>
-              <a:ext uri="{28A0092B-C50C-407E-A947-70E740481C1C}">
-                <a14:useLocalDpi xmlns:a14="http://schemas.microsoft.com/office/drawing/2010/main" val="0"/>
-              </a:ext>
-            </a:extLst>
-          </a:blip>
-          <a:srcRect/>
-          <a:stretch>
-            <a:fillRect/>
-          </a:stretch>
-        </p:blipFill>
-        <p:spPr bwMode="auto">
-          <a:xfrm>
-            <a:off x="7610856" y="3546348"/>
-            <a:ext cx="762000" cy="762000"/>
-          </a:xfrm>
-          <a:prstGeom prst="rect">
-            <a:avLst/>
-          </a:prstGeom>
-          <a:noFill/>
-          <a:ln>
-            <a:noFill/>
-          </a:ln>
-          <a:extLst>
-            <a:ext uri="{909E8E84-426E-40DD-AFC4-6F175D3DCCD1}">
-              <a14:hiddenFill xmlns:a14="http://schemas.microsoft.com/office/drawing/2010/main">
-                <a:solidFill>
-                  <a:srgbClr val="FFFFFF"/>
-                </a:solidFill>
-              </a14:hiddenFill>
-            </a:ext>
-            <a:ext uri="{91240B29-F687-4F45-9708-019B960494DF}">
-              <a14:hiddenLine xmlns:a14="http://schemas.microsoft.com/office/drawing/2010/main" w="9525">
-                <a:solidFill>
-                  <a:srgbClr val="000000"/>
-                </a:solidFill>
-                <a:miter lim="800000"/>
-                <a:headEnd/>
-                <a:tailEnd/>
-              </a14:hiddenLine>
-            </a:ext>
-          </a:extLst>
-        </p:spPr>
-      </p:pic>
-      <p:sp>
-        <p:nvSpPr>
-          <p:cNvPr id="6" name="TextBox 11">
-            <a:extLst>
-              <a:ext uri="{FF2B5EF4-FFF2-40B4-BE49-F238E27FC236}">
-                <a16:creationId xmlns:a16="http://schemas.microsoft.com/office/drawing/2014/main" id="{6D9F63C4-AA0B-4B1F-ACDD-225BB545EA5F}"/>
-              </a:ext>
-            </a:extLst>
-          </p:cNvPr>
-          <p:cNvSpPr txBox="1">
-            <a:spLocks noChangeArrowheads="1"/>
-          </p:cNvSpPr>
-          <p:nvPr/>
-        </p:nvSpPr>
-        <p:spPr bwMode="auto">
-          <a:xfrm>
-            <a:off x="6845681" y="4299278"/>
-            <a:ext cx="2292350" cy="276999"/>
-          </a:xfrm>
-          <a:prstGeom prst="rect">
-            <a:avLst/>
-          </a:prstGeom>
-          <a:noFill/>
-          <a:ln>
-            <a:noFill/>
-          </a:ln>
-          <a:extLst>
-            <a:ext uri="{909E8E84-426E-40DD-AFC4-6F175D3DCCD1}">
-              <a14:hiddenFill xmlns:a14="http://schemas.microsoft.com/office/drawing/2010/main">
-                <a:solidFill>
-                  <a:srgbClr val="FFFFFF"/>
-                </a:solidFill>
-              </a14:hiddenFill>
-            </a:ext>
-            <a:ext uri="{91240B29-F687-4F45-9708-019B960494DF}">
-              <a14:hiddenLine xmlns:a14="http://schemas.microsoft.com/office/drawing/2010/main" w="9525">
-                <a:solidFill>
-                  <a:srgbClr val="000000"/>
-                </a:solidFill>
-                <a:miter lim="800000"/>
-                <a:headEnd/>
-                <a:tailEnd/>
-              </a14:hiddenLine>
-            </a:ext>
-          </a:extLst>
-        </p:spPr>
-        <p:txBody>
-          <a:bodyPr>
-            <a:spAutoFit/>
-          </a:bodyPr>
-          <a:lstStyle>
-            <a:lvl1pPr>
-              <a:defRPr>
-                <a:solidFill>
-                  <a:schemeClr val="tx1"/>
-                </a:solidFill>
-                <a:latin typeface="Calibri" panose="020F0502020204030204" pitchFamily="34" charset="0"/>
-              </a:defRPr>
-            </a:lvl1pPr>
-            <a:lvl2pPr marL="742950" indent="-285750">
-              <a:defRPr>
-                <a:solidFill>
-                  <a:schemeClr val="tx1"/>
-                </a:solidFill>
-                <a:latin typeface="Calibri" panose="020F0502020204030204" pitchFamily="34" charset="0"/>
-              </a:defRPr>
-            </a:lvl2pPr>
-            <a:lvl3pPr marL="1143000" indent="-228600">
-              <a:defRPr>
-                <a:solidFill>
-                  <a:schemeClr val="tx1"/>
-                </a:solidFill>
-                <a:latin typeface="Calibri" panose="020F0502020204030204" pitchFamily="34" charset="0"/>
-              </a:defRPr>
-            </a:lvl3pPr>
-            <a:lvl4pPr marL="1600200" indent="-228600">
-              <a:defRPr>
-                <a:solidFill>
-                  <a:schemeClr val="tx1"/>
-                </a:solidFill>
-                <a:latin typeface="Calibri" panose="020F0502020204030204" pitchFamily="34" charset="0"/>
-              </a:defRPr>
-            </a:lvl4pPr>
-            <a:lvl5pPr marL="2057400" indent="-228600">
-              <a:defRPr>
-                <a:solidFill>
-                  <a:schemeClr val="tx1"/>
-                </a:solidFill>
-                <a:latin typeface="Calibri" panose="020F0502020204030204" pitchFamily="34" charset="0"/>
-              </a:defRPr>
-            </a:lvl5pPr>
-            <a:lvl6pPr marL="2514600" indent="-228600" eaLnBrk="0" fontAlgn="base" hangingPunct="0">
-              <a:spcBef>
-                <a:spcPct val="0"/>
-              </a:spcBef>
-              <a:spcAft>
-                <a:spcPct val="0"/>
-              </a:spcAft>
-              <a:defRPr>
-                <a:solidFill>
-                  <a:schemeClr val="tx1"/>
-                </a:solidFill>
-                <a:latin typeface="Calibri" panose="020F0502020204030204" pitchFamily="34" charset="0"/>
-              </a:defRPr>
-            </a:lvl6pPr>
-            <a:lvl7pPr marL="2971800" indent="-228600" eaLnBrk="0" fontAlgn="base" hangingPunct="0">
-              <a:spcBef>
-                <a:spcPct val="0"/>
-              </a:spcBef>
-              <a:spcAft>
-                <a:spcPct val="0"/>
-              </a:spcAft>
-              <a:defRPr>
-                <a:solidFill>
-                  <a:schemeClr val="tx1"/>
-                </a:solidFill>
-                <a:latin typeface="Calibri" panose="020F0502020204030204" pitchFamily="34" charset="0"/>
-              </a:defRPr>
-            </a:lvl7pPr>
-            <a:lvl8pPr marL="3429000" indent="-228600" eaLnBrk="0" fontAlgn="base" hangingPunct="0">
-              <a:spcBef>
-                <a:spcPct val="0"/>
-              </a:spcBef>
-              <a:spcAft>
-                <a:spcPct val="0"/>
-              </a:spcAft>
-              <a:defRPr>
-                <a:solidFill>
-                  <a:schemeClr val="tx1"/>
-                </a:solidFill>
-                <a:latin typeface="Calibri" panose="020F0502020204030204" pitchFamily="34" charset="0"/>
-              </a:defRPr>
-            </a:lvl8pPr>
-            <a:lvl9pPr marL="3886200" indent="-228600" eaLnBrk="0" fontAlgn="base" hangingPunct="0">
-              <a:spcBef>
-                <a:spcPct val="0"/>
-              </a:spcBef>
-              <a:spcAft>
-                <a:spcPct val="0"/>
-              </a:spcAft>
-              <a:defRPr>
-                <a:solidFill>
-                  <a:schemeClr val="tx1"/>
-                </a:solidFill>
-                <a:latin typeface="Calibri" panose="020F0502020204030204" pitchFamily="34" charset="0"/>
-              </a:defRPr>
-            </a:lvl9pPr>
-          </a:lstStyle>
-          <a:p>
-            <a:pPr algn="ctr" eaLnBrk="1" hangingPunct="1"/>
-            <a:r>
-              <a:rPr lang="en-US" altLang="en-US" sz="1200" dirty="0">
-                <a:latin typeface="Arial" panose="020B0604020202020204" pitchFamily="34" charset="0"/>
-                <a:ea typeface="Amazon Ember" panose="020B0603020204020204" pitchFamily="34" charset="0"/>
-                <a:cs typeface="Arial" panose="020B0604020202020204" pitchFamily="34" charset="0"/>
-              </a:rPr>
-              <a:t>AWS CodeBuild</a:t>
-            </a:r>
-          </a:p>
-        </p:txBody>
-      </p:sp>
-      <p:sp>
-        <p:nvSpPr>
-          <p:cNvPr id="8" name="TextBox 11">
-            <a:extLst>
-              <a:ext uri="{FF2B5EF4-FFF2-40B4-BE49-F238E27FC236}">
-                <a16:creationId xmlns:a16="http://schemas.microsoft.com/office/drawing/2014/main" id="{0B62BA7C-6EAE-4593-9A6E-9803A6701C35}"/>
-              </a:ext>
-            </a:extLst>
-          </p:cNvPr>
-          <p:cNvSpPr txBox="1">
-            <a:spLocks noChangeArrowheads="1"/>
-          </p:cNvSpPr>
-          <p:nvPr/>
-        </p:nvSpPr>
-        <p:spPr bwMode="auto">
-          <a:xfrm>
-            <a:off x="8079202" y="4299278"/>
-            <a:ext cx="2292350" cy="276999"/>
-          </a:xfrm>
-          <a:prstGeom prst="rect">
-            <a:avLst/>
-          </a:prstGeom>
-          <a:noFill/>
-          <a:ln>
-            <a:noFill/>
-          </a:ln>
-          <a:extLst>
-            <a:ext uri="{909E8E84-426E-40DD-AFC4-6F175D3DCCD1}">
-              <a14:hiddenFill xmlns:a14="http://schemas.microsoft.com/office/drawing/2010/main">
-                <a:solidFill>
-                  <a:srgbClr val="FFFFFF"/>
-                </a:solidFill>
-              </a14:hiddenFill>
-            </a:ext>
-            <a:ext uri="{91240B29-F687-4F45-9708-019B960494DF}">
-              <a14:hiddenLine xmlns:a14="http://schemas.microsoft.com/office/drawing/2010/main" w="9525">
-                <a:solidFill>
-                  <a:srgbClr val="000000"/>
-                </a:solidFill>
-                <a:miter lim="800000"/>
-                <a:headEnd/>
-                <a:tailEnd/>
-              </a14:hiddenLine>
-            </a:ext>
-          </a:extLst>
-        </p:spPr>
-        <p:txBody>
-          <a:bodyPr>
-            <a:spAutoFit/>
-          </a:bodyPr>
-          <a:lstStyle>
-            <a:lvl1pPr>
-              <a:defRPr>
-                <a:solidFill>
-                  <a:schemeClr val="tx1"/>
-                </a:solidFill>
-                <a:latin typeface="Calibri" panose="020F0502020204030204" pitchFamily="34" charset="0"/>
-              </a:defRPr>
-            </a:lvl1pPr>
-            <a:lvl2pPr marL="742950" indent="-285750">
-              <a:defRPr>
-                <a:solidFill>
-                  <a:schemeClr val="tx1"/>
-                </a:solidFill>
-                <a:latin typeface="Calibri" panose="020F0502020204030204" pitchFamily="34" charset="0"/>
-              </a:defRPr>
-            </a:lvl2pPr>
-            <a:lvl3pPr marL="1143000" indent="-228600">
-              <a:defRPr>
-                <a:solidFill>
-                  <a:schemeClr val="tx1"/>
-                </a:solidFill>
-                <a:latin typeface="Calibri" panose="020F0502020204030204" pitchFamily="34" charset="0"/>
-              </a:defRPr>
-            </a:lvl3pPr>
-            <a:lvl4pPr marL="1600200" indent="-228600">
-              <a:defRPr>
-                <a:solidFill>
-                  <a:schemeClr val="tx1"/>
-                </a:solidFill>
-                <a:latin typeface="Calibri" panose="020F0502020204030204" pitchFamily="34" charset="0"/>
-              </a:defRPr>
-            </a:lvl4pPr>
-            <a:lvl5pPr marL="2057400" indent="-228600">
-              <a:defRPr>
-                <a:solidFill>
-                  <a:schemeClr val="tx1"/>
-                </a:solidFill>
-                <a:latin typeface="Calibri" panose="020F0502020204030204" pitchFamily="34" charset="0"/>
-              </a:defRPr>
-            </a:lvl5pPr>
-            <a:lvl6pPr marL="2514600" indent="-228600" eaLnBrk="0" fontAlgn="base" hangingPunct="0">
-              <a:spcBef>
-                <a:spcPct val="0"/>
-              </a:spcBef>
-              <a:spcAft>
-                <a:spcPct val="0"/>
-              </a:spcAft>
-              <a:defRPr>
-                <a:solidFill>
-                  <a:schemeClr val="tx1"/>
-                </a:solidFill>
-                <a:latin typeface="Calibri" panose="020F0502020204030204" pitchFamily="34" charset="0"/>
-              </a:defRPr>
-            </a:lvl6pPr>
-            <a:lvl7pPr marL="2971800" indent="-228600" eaLnBrk="0" fontAlgn="base" hangingPunct="0">
-              <a:spcBef>
-                <a:spcPct val="0"/>
-              </a:spcBef>
-              <a:spcAft>
-                <a:spcPct val="0"/>
-              </a:spcAft>
-              <a:defRPr>
-                <a:solidFill>
-                  <a:schemeClr val="tx1"/>
-                </a:solidFill>
-                <a:latin typeface="Calibri" panose="020F0502020204030204" pitchFamily="34" charset="0"/>
-              </a:defRPr>
-            </a:lvl7pPr>
-            <a:lvl8pPr marL="3429000" indent="-228600" eaLnBrk="0" fontAlgn="base" hangingPunct="0">
-              <a:spcBef>
-                <a:spcPct val="0"/>
-              </a:spcBef>
-              <a:spcAft>
-                <a:spcPct val="0"/>
-              </a:spcAft>
-              <a:defRPr>
-                <a:solidFill>
-                  <a:schemeClr val="tx1"/>
-                </a:solidFill>
-                <a:latin typeface="Calibri" panose="020F0502020204030204" pitchFamily="34" charset="0"/>
-              </a:defRPr>
-            </a:lvl8pPr>
-            <a:lvl9pPr marL="3886200" indent="-228600" eaLnBrk="0" fontAlgn="base" hangingPunct="0">
-              <a:spcBef>
-                <a:spcPct val="0"/>
-              </a:spcBef>
-              <a:spcAft>
-                <a:spcPct val="0"/>
-              </a:spcAft>
-              <a:defRPr>
-                <a:solidFill>
-                  <a:schemeClr val="tx1"/>
-                </a:solidFill>
-                <a:latin typeface="Calibri" panose="020F0502020204030204" pitchFamily="34" charset="0"/>
-              </a:defRPr>
-            </a:lvl9pPr>
-          </a:lstStyle>
-          <a:p>
-            <a:pPr algn="ctr" eaLnBrk="1" hangingPunct="1"/>
-            <a:r>
-              <a:rPr lang="en-US" altLang="en-US" sz="1200" dirty="0" err="1">
-                <a:latin typeface="Arial" panose="020B0604020202020204" pitchFamily="34" charset="0"/>
-                <a:ea typeface="Amazon Ember" panose="020B0603020204020204" pitchFamily="34" charset="0"/>
-                <a:cs typeface="Arial" panose="020B0604020202020204" pitchFamily="34" charset="0"/>
-              </a:rPr>
-              <a:t>TaskCat</a:t>
-            </a:r>
-            <a:endParaRPr lang="en-US" altLang="en-US" sz="1200" dirty="0">
-              <a:latin typeface="Arial" panose="020B0604020202020204" pitchFamily="34" charset="0"/>
-              <a:ea typeface="Amazon Ember" panose="020B0603020204020204" pitchFamily="34" charset="0"/>
-              <a:cs typeface="Arial" panose="020B0604020202020204" pitchFamily="34" charset="0"/>
-            </a:endParaRPr>
-          </a:p>
-        </p:txBody>
-      </p:sp>
-      <p:cxnSp>
-        <p:nvCxnSpPr>
-          <p:cNvPr id="9" name="Straight Arrow Connector 8">
-            <a:extLst>
-              <a:ext uri="{FF2B5EF4-FFF2-40B4-BE49-F238E27FC236}">
-                <a16:creationId xmlns:a16="http://schemas.microsoft.com/office/drawing/2014/main" id="{688A742C-08D4-4E73-A891-95FE36A0A050}"/>
-              </a:ext>
-            </a:extLst>
-          </p:cNvPr>
-          <p:cNvCxnSpPr>
-            <a:cxnSpLocks/>
-            <a:stCxn id="5" idx="0"/>
-            <a:endCxn id="4" idx="2"/>
-          </p:cNvCxnSpPr>
-          <p:nvPr/>
-        </p:nvCxnSpPr>
-        <p:spPr>
-          <a:xfrm flipV="1">
-            <a:off x="7991856" y="3193875"/>
-            <a:ext cx="0" cy="352473"/>
-          </a:xfrm>
-          <a:prstGeom prst="straightConnector1">
-            <a:avLst/>
-          </a:prstGeom>
-          <a:ln w="12700">
-            <a:solidFill>
-              <a:srgbClr val="545B64"/>
-            </a:solidFill>
-            <a:headEnd type="none" w="med" len="sm"/>
-            <a:tailEnd type="arrow" w="med" len="sm"/>
-          </a:ln>
-        </p:spPr>
-        <p:style>
-          <a:lnRef idx="1">
-            <a:schemeClr val="accent1"/>
-          </a:lnRef>
-          <a:fillRef idx="0">
-            <a:schemeClr val="accent1"/>
-          </a:fillRef>
-          <a:effectRef idx="0">
-            <a:schemeClr val="accent1"/>
-          </a:effectRef>
-          <a:fontRef idx="minor">
-            <a:schemeClr val="tx1"/>
-          </a:fontRef>
-        </p:style>
-      </p:cxnSp>
-      <p:cxnSp>
-        <p:nvCxnSpPr>
-          <p:cNvPr id="10" name="Straight Arrow Connector 9">
-            <a:extLst>
-              <a:ext uri="{FF2B5EF4-FFF2-40B4-BE49-F238E27FC236}">
-                <a16:creationId xmlns:a16="http://schemas.microsoft.com/office/drawing/2014/main" id="{5D27361C-6F7F-4039-924C-77ED3BDD8011}"/>
-              </a:ext>
-            </a:extLst>
-          </p:cNvPr>
-          <p:cNvCxnSpPr>
-            <a:cxnSpLocks/>
-            <a:stCxn id="5" idx="3"/>
-            <a:endCxn id="19" idx="1"/>
-          </p:cNvCxnSpPr>
-          <p:nvPr/>
-        </p:nvCxnSpPr>
-        <p:spPr>
-          <a:xfrm>
-            <a:off x="8372856" y="3927348"/>
-            <a:ext cx="553785" cy="0"/>
-          </a:xfrm>
-          <a:prstGeom prst="straightConnector1">
-            <a:avLst/>
-          </a:prstGeom>
-          <a:ln w="12700">
-            <a:solidFill>
-              <a:srgbClr val="545B64"/>
-            </a:solidFill>
-            <a:headEnd type="none" w="med" len="sm"/>
-            <a:tailEnd type="arrow" w="med" len="sm"/>
-          </a:ln>
-        </p:spPr>
-        <p:style>
-          <a:lnRef idx="1">
-            <a:schemeClr val="accent1"/>
-          </a:lnRef>
-          <a:fillRef idx="0">
-            <a:schemeClr val="accent1"/>
-          </a:fillRef>
-          <a:effectRef idx="0">
-            <a:schemeClr val="accent1"/>
-          </a:effectRef>
-          <a:fontRef idx="minor">
-            <a:schemeClr val="tx1"/>
-          </a:fontRef>
-        </p:style>
-      </p:cxnSp>
-      <p:cxnSp>
-        <p:nvCxnSpPr>
-          <p:cNvPr id="11" name="Straight Arrow Connector 10">
-            <a:extLst>
-              <a:ext uri="{FF2B5EF4-FFF2-40B4-BE49-F238E27FC236}">
-                <a16:creationId xmlns:a16="http://schemas.microsoft.com/office/drawing/2014/main" id="{9126FF32-6254-482D-A66D-BA06AB8EECE9}"/>
-              </a:ext>
-            </a:extLst>
-          </p:cNvPr>
-          <p:cNvCxnSpPr>
-            <a:cxnSpLocks/>
             <a:stCxn id="5" idx="1"/>
             <a:endCxn id="48" idx="3"/>
           </p:cNvCxnSpPr>
@@ -14448,8 +10841,8 @@
             <a:solidFill>
               <a:srgbClr val="545B64"/>
             </a:solidFill>
-            <a:headEnd type="none" w="med" len="sm"/>
-            <a:tailEnd type="arrow" w="med" len="sm"/>
+            <a:headEnd type="arrow" w="med" len="sm"/>
+            <a:tailEnd type="none" w="med" len="sm"/>
           </a:ln>
         </p:spPr>
         <p:style>

</xml_diff>